<commit_message>
ADD: random forest to ppt
</commit_message>
<xml_diff>
--- a/ufo_presentation_v1.pptx
+++ b/ufo_presentation_v1.pptx
@@ -5,7 +5,7 @@
     <p:sldMasterId id="2147483660" r:id="rId1"/>
   </p:sldMasterIdLst>
   <p:notesMasterIdLst>
-    <p:notesMasterId r:id="rId13"/>
+    <p:notesMasterId r:id="rId16"/>
   </p:notesMasterIdLst>
   <p:sldIdLst>
     <p:sldId id="256" r:id="rId2"/>
@@ -19,6 +19,9 @@
     <p:sldId id="262" r:id="rId10"/>
     <p:sldId id="265" r:id="rId11"/>
     <p:sldId id="266" r:id="rId12"/>
+    <p:sldId id="267" r:id="rId13"/>
+    <p:sldId id="268" r:id="rId14"/>
+    <p:sldId id="269" r:id="rId15"/>
   </p:sldIdLst>
   <p:sldSz cx="12192000" cy="6858000"/>
   <p:notesSz cx="6858000" cy="9144000"/>
@@ -4201,7 +4204,7 @@
             <a:lum/>
             <a:extLst>
               <a:ext uri="{837473B0-CC2E-450A-ABE3-18F120FF3D39}">
-                <a1611:picAttrSrcUrl xmlns:a1611="http://schemas.microsoft.com/office/drawing/2016/11/main" r:id="rId3"/>
+                <a1611:picAttrSrcUrl xmlns:a1611="http://schemas.microsoft.com/office/drawing/2016/11/main" xmlns="" r:id="rId3"/>
               </a:ext>
             </a:extLst>
           </a:blip>
@@ -4845,6 +4848,1778 @@
 </p:sld>
 </file>
 
+<file path=ppt/slides/slide12.xml><?xml version="1.0" encoding="utf-8"?>
+<p:sld xmlns:a="http://schemas.openxmlformats.org/drawingml/2006/main" xmlns:r="http://schemas.openxmlformats.org/officeDocument/2006/relationships" xmlns:p="http://schemas.openxmlformats.org/presentationml/2006/main">
+  <p:cSld>
+    <p:spTree>
+      <p:nvGrpSpPr>
+        <p:cNvPr id="1" name=""/>
+        <p:cNvGrpSpPr/>
+        <p:nvPr/>
+      </p:nvGrpSpPr>
+      <p:grpSpPr>
+        <a:xfrm>
+          <a:off x="0" y="0"/>
+          <a:ext cx="0" cy="0"/>
+          <a:chOff x="0" y="0"/>
+          <a:chExt cx="0" cy="0"/>
+        </a:xfrm>
+      </p:grpSpPr>
+      <p:sp>
+        <p:nvSpPr>
+          <p:cNvPr id="2" name="標題 1"/>
+          <p:cNvSpPr>
+            <a:spLocks noGrp="1"/>
+          </p:cNvSpPr>
+          <p:nvPr>
+            <p:ph type="title"/>
+          </p:nvPr>
+        </p:nvSpPr>
+        <p:spPr>
+          <a:xfrm>
+            <a:off x="1371600" y="685800"/>
+            <a:ext cx="9601200" cy="835090"/>
+          </a:xfrm>
+        </p:spPr>
+        <p:txBody>
+          <a:bodyPr/>
+          <a:lstStyle/>
+          <a:p>
+            <a:r>
+              <a:rPr lang="en-US" dirty="0" smtClean="0"/>
+              <a:t>Radom Forest</a:t>
+            </a:r>
+            <a:endParaRPr lang="en-US" dirty="0"/>
+          </a:p>
+        </p:txBody>
+      </p:sp>
+      <p:graphicFrame>
+        <p:nvGraphicFramePr>
+          <p:cNvPr id="4" name="內容版面配置區 3"/>
+          <p:cNvGraphicFramePr>
+            <a:graphicFrameLocks noGrp="1"/>
+          </p:cNvGraphicFramePr>
+          <p:nvPr>
+            <p:ph idx="1"/>
+            <p:extLst/>
+          </p:nvPr>
+        </p:nvGraphicFramePr>
+        <p:xfrm>
+          <a:off x="810910" y="1926001"/>
+          <a:ext cx="5235327" cy="2301588"/>
+        </p:xfrm>
+        <a:graphic>
+          <a:graphicData uri="http://schemas.openxmlformats.org/drawingml/2006/table">
+            <a:tbl>
+              <a:tblPr firstRow="1" firstCol="1">
+                <a:tableStyleId>{5C22544A-7EE6-4342-B048-85BDC9FD1C3A}</a:tableStyleId>
+              </a:tblPr>
+              <a:tblGrid>
+                <a:gridCol w="1745109">
+                  <a:extLst>
+                    <a:ext uri="{9D8B030D-6E8A-4147-A177-3AD203B41FA5}">
+                      <a16:colId xmlns:a16="http://schemas.microsoft.com/office/drawing/2014/main" val="3766869113"/>
+                    </a:ext>
+                  </a:extLst>
+                </a:gridCol>
+                <a:gridCol w="1745109">
+                  <a:extLst>
+                    <a:ext uri="{9D8B030D-6E8A-4147-A177-3AD203B41FA5}">
+                      <a16:colId xmlns:a16="http://schemas.microsoft.com/office/drawing/2014/main" val="1875346058"/>
+                    </a:ext>
+                  </a:extLst>
+                </a:gridCol>
+                <a:gridCol w="1745109">
+                  <a:extLst>
+                    <a:ext uri="{9D8B030D-6E8A-4147-A177-3AD203B41FA5}">
+                      <a16:colId xmlns:a16="http://schemas.microsoft.com/office/drawing/2014/main" val="1822370682"/>
+                    </a:ext>
+                  </a:extLst>
+                </a:gridCol>
+              </a:tblGrid>
+              <a:tr h="767196">
+                <a:tc>
+                  <a:txBody>
+                    <a:bodyPr/>
+                    <a:lstStyle/>
+                    <a:p>
+                      <a:pPr algn="r"/>
+                      <a:r>
+                        <a:rPr lang="en-US" dirty="0" smtClean="0"/>
+                        <a:t>Prediction</a:t>
+                      </a:r>
+                    </a:p>
+                    <a:p>
+                      <a:pPr algn="l"/>
+                      <a:r>
+                        <a:rPr lang="en-US" dirty="0" smtClean="0"/>
+                        <a:t>Actual</a:t>
+                      </a:r>
+                      <a:endParaRPr lang="en-US" dirty="0"/>
+                    </a:p>
+                  </a:txBody>
+                  <a:tcPr/>
+                </a:tc>
+                <a:tc>
+                  <a:txBody>
+                    <a:bodyPr/>
+                    <a:lstStyle/>
+                    <a:p>
+                      <a:pPr algn="ctr"/>
+                      <a:r>
+                        <a:rPr lang="en-US" dirty="0" smtClean="0"/>
+                        <a:t>0</a:t>
+                      </a:r>
+                      <a:endParaRPr lang="en-US" dirty="0"/>
+                    </a:p>
+                  </a:txBody>
+                  <a:tcPr/>
+                </a:tc>
+                <a:tc>
+                  <a:txBody>
+                    <a:bodyPr/>
+                    <a:lstStyle/>
+                    <a:p>
+                      <a:pPr algn="ctr"/>
+                      <a:r>
+                        <a:rPr lang="en-US" dirty="0" smtClean="0"/>
+                        <a:t>1</a:t>
+                      </a:r>
+                      <a:endParaRPr lang="en-US" dirty="0"/>
+                    </a:p>
+                  </a:txBody>
+                  <a:tcPr/>
+                </a:tc>
+                <a:extLst>
+                  <a:ext uri="{0D108BD9-81ED-4DB2-BD59-A6C34878D82A}">
+                    <a16:rowId xmlns:a16="http://schemas.microsoft.com/office/drawing/2014/main" val="2541860142"/>
+                  </a:ext>
+                </a:extLst>
+              </a:tr>
+              <a:tr h="767196">
+                <a:tc>
+                  <a:txBody>
+                    <a:bodyPr/>
+                    <a:lstStyle/>
+                    <a:p>
+                      <a:pPr algn="ctr"/>
+                      <a:r>
+                        <a:rPr lang="en-US" dirty="0" smtClean="0"/>
+                        <a:t>0</a:t>
+                      </a:r>
+                      <a:endParaRPr lang="en-US" dirty="0"/>
+                    </a:p>
+                  </a:txBody>
+                  <a:tcPr/>
+                </a:tc>
+                <a:tc>
+                  <a:txBody>
+                    <a:bodyPr/>
+                    <a:lstStyle/>
+                    <a:p>
+                      <a:pPr algn="ctr"/>
+                      <a:r>
+                        <a:rPr lang="en-US" dirty="0" smtClean="0"/>
+                        <a:t>34541</a:t>
+                      </a:r>
+                      <a:endParaRPr lang="en-US" dirty="0"/>
+                    </a:p>
+                  </a:txBody>
+                  <a:tcPr/>
+                </a:tc>
+                <a:tc>
+                  <a:txBody>
+                    <a:bodyPr/>
+                    <a:lstStyle/>
+                    <a:p>
+                      <a:pPr algn="ctr"/>
+                      <a:r>
+                        <a:rPr lang="en-US" dirty="0" smtClean="0"/>
+                        <a:t>2</a:t>
+                      </a:r>
+                      <a:endParaRPr lang="en-US" dirty="0"/>
+                    </a:p>
+                  </a:txBody>
+                  <a:tcPr/>
+                </a:tc>
+                <a:extLst>
+                  <a:ext uri="{0D108BD9-81ED-4DB2-BD59-A6C34878D82A}">
+                    <a16:rowId xmlns:a16="http://schemas.microsoft.com/office/drawing/2014/main" val="112516665"/>
+                  </a:ext>
+                </a:extLst>
+              </a:tr>
+              <a:tr h="767196">
+                <a:tc>
+                  <a:txBody>
+                    <a:bodyPr/>
+                    <a:lstStyle/>
+                    <a:p>
+                      <a:pPr algn="ctr"/>
+                      <a:r>
+                        <a:rPr lang="en-US" dirty="0" smtClean="0"/>
+                        <a:t>1</a:t>
+                      </a:r>
+                      <a:endParaRPr lang="en-US" dirty="0"/>
+                    </a:p>
+                  </a:txBody>
+                  <a:tcPr/>
+                </a:tc>
+                <a:tc>
+                  <a:txBody>
+                    <a:bodyPr/>
+                    <a:lstStyle/>
+                    <a:p>
+                      <a:pPr algn="ctr"/>
+                      <a:r>
+                        <a:rPr lang="en-US" dirty="0" smtClean="0"/>
+                        <a:t>276</a:t>
+                      </a:r>
+                      <a:endParaRPr lang="en-US" dirty="0"/>
+                    </a:p>
+                  </a:txBody>
+                  <a:tcPr/>
+                </a:tc>
+                <a:tc>
+                  <a:txBody>
+                    <a:bodyPr/>
+                    <a:lstStyle/>
+                    <a:p>
+                      <a:pPr algn="ctr"/>
+                      <a:r>
+                        <a:rPr lang="en-US" dirty="0" smtClean="0"/>
+                        <a:t>989</a:t>
+                      </a:r>
+                      <a:endParaRPr lang="en-US" dirty="0"/>
+                    </a:p>
+                  </a:txBody>
+                  <a:tcPr/>
+                </a:tc>
+                <a:extLst>
+                  <a:ext uri="{0D108BD9-81ED-4DB2-BD59-A6C34878D82A}">
+                    <a16:rowId xmlns:a16="http://schemas.microsoft.com/office/drawing/2014/main" val="283221556"/>
+                  </a:ext>
+                </a:extLst>
+              </a:tr>
+            </a:tbl>
+          </a:graphicData>
+        </a:graphic>
+      </p:graphicFrame>
+      <p:graphicFrame>
+        <p:nvGraphicFramePr>
+          <p:cNvPr id="8" name="內容版面配置區 3"/>
+          <p:cNvGraphicFramePr>
+            <a:graphicFrameLocks/>
+          </p:cNvGraphicFramePr>
+          <p:nvPr>
+            <p:extLst/>
+          </p:nvPr>
+        </p:nvGraphicFramePr>
+        <p:xfrm>
+          <a:off x="6721149" y="1929904"/>
+          <a:ext cx="5315340" cy="2297685"/>
+        </p:xfrm>
+        <a:graphic>
+          <a:graphicData uri="http://schemas.openxmlformats.org/drawingml/2006/table">
+            <a:tbl>
+              <a:tblPr firstRow="1" firstCol="1">
+                <a:tableStyleId>{5C22544A-7EE6-4342-B048-85BDC9FD1C3A}</a:tableStyleId>
+              </a:tblPr>
+              <a:tblGrid>
+                <a:gridCol w="1771780">
+                  <a:extLst>
+                    <a:ext uri="{9D8B030D-6E8A-4147-A177-3AD203B41FA5}">
+                      <a16:colId xmlns:a16="http://schemas.microsoft.com/office/drawing/2014/main" val="3766869113"/>
+                    </a:ext>
+                  </a:extLst>
+                </a:gridCol>
+                <a:gridCol w="1771780">
+                  <a:extLst>
+                    <a:ext uri="{9D8B030D-6E8A-4147-A177-3AD203B41FA5}">
+                      <a16:colId xmlns:a16="http://schemas.microsoft.com/office/drawing/2014/main" val="1875346058"/>
+                    </a:ext>
+                  </a:extLst>
+                </a:gridCol>
+                <a:gridCol w="1771780">
+                  <a:extLst>
+                    <a:ext uri="{9D8B030D-6E8A-4147-A177-3AD203B41FA5}">
+                      <a16:colId xmlns:a16="http://schemas.microsoft.com/office/drawing/2014/main" val="1822370682"/>
+                    </a:ext>
+                  </a:extLst>
+                </a:gridCol>
+              </a:tblGrid>
+              <a:tr h="765895">
+                <a:tc>
+                  <a:txBody>
+                    <a:bodyPr/>
+                    <a:lstStyle/>
+                    <a:p>
+                      <a:pPr algn="r"/>
+                      <a:r>
+                        <a:rPr lang="en-US" dirty="0" smtClean="0"/>
+                        <a:t>Prediction</a:t>
+                      </a:r>
+                    </a:p>
+                    <a:p>
+                      <a:pPr algn="l"/>
+                      <a:r>
+                        <a:rPr lang="en-US" dirty="0" smtClean="0"/>
+                        <a:t>Actual</a:t>
+                      </a:r>
+                      <a:endParaRPr lang="en-US" dirty="0"/>
+                    </a:p>
+                  </a:txBody>
+                  <a:tcPr/>
+                </a:tc>
+                <a:tc>
+                  <a:txBody>
+                    <a:bodyPr/>
+                    <a:lstStyle/>
+                    <a:p>
+                      <a:pPr algn="ctr"/>
+                      <a:r>
+                        <a:rPr lang="en-US" dirty="0" smtClean="0"/>
+                        <a:t>0</a:t>
+                      </a:r>
+                      <a:endParaRPr lang="en-US" dirty="0"/>
+                    </a:p>
+                  </a:txBody>
+                  <a:tcPr/>
+                </a:tc>
+                <a:tc>
+                  <a:txBody>
+                    <a:bodyPr/>
+                    <a:lstStyle/>
+                    <a:p>
+                      <a:pPr algn="ctr"/>
+                      <a:r>
+                        <a:rPr lang="en-US" dirty="0" smtClean="0"/>
+                        <a:t>1</a:t>
+                      </a:r>
+                      <a:endParaRPr lang="en-US" dirty="0"/>
+                    </a:p>
+                  </a:txBody>
+                  <a:tcPr/>
+                </a:tc>
+                <a:extLst>
+                  <a:ext uri="{0D108BD9-81ED-4DB2-BD59-A6C34878D82A}">
+                    <a16:rowId xmlns:a16="http://schemas.microsoft.com/office/drawing/2014/main" val="2541860142"/>
+                  </a:ext>
+                </a:extLst>
+              </a:tr>
+              <a:tr h="765895">
+                <a:tc>
+                  <a:txBody>
+                    <a:bodyPr/>
+                    <a:lstStyle/>
+                    <a:p>
+                      <a:pPr algn="ctr"/>
+                      <a:r>
+                        <a:rPr lang="en-US" dirty="0" smtClean="0"/>
+                        <a:t>0</a:t>
+                      </a:r>
+                      <a:endParaRPr lang="en-US" dirty="0"/>
+                    </a:p>
+                  </a:txBody>
+                  <a:tcPr/>
+                </a:tc>
+                <a:tc>
+                  <a:txBody>
+                    <a:bodyPr/>
+                    <a:lstStyle/>
+                    <a:p>
+                      <a:pPr algn="ctr"/>
+                      <a:r>
+                        <a:rPr lang="en-US" dirty="0" smtClean="0"/>
+                        <a:t>22974</a:t>
+                      </a:r>
+                      <a:endParaRPr lang="en-US" dirty="0"/>
+                    </a:p>
+                  </a:txBody>
+                  <a:tcPr/>
+                </a:tc>
+                <a:tc>
+                  <a:txBody>
+                    <a:bodyPr/>
+                    <a:lstStyle/>
+                    <a:p>
+                      <a:pPr algn="ctr"/>
+                      <a:r>
+                        <a:rPr lang="en-US" dirty="0" smtClean="0"/>
+                        <a:t>55</a:t>
+                      </a:r>
+                      <a:endParaRPr lang="en-US" dirty="0"/>
+                    </a:p>
+                  </a:txBody>
+                  <a:tcPr/>
+                </a:tc>
+                <a:extLst>
+                  <a:ext uri="{0D108BD9-81ED-4DB2-BD59-A6C34878D82A}">
+                    <a16:rowId xmlns:a16="http://schemas.microsoft.com/office/drawing/2014/main" val="112516665"/>
+                  </a:ext>
+                </a:extLst>
+              </a:tr>
+              <a:tr h="765895">
+                <a:tc>
+                  <a:txBody>
+                    <a:bodyPr/>
+                    <a:lstStyle/>
+                    <a:p>
+                      <a:pPr algn="ctr"/>
+                      <a:r>
+                        <a:rPr lang="en-US" dirty="0" smtClean="0"/>
+                        <a:t>1</a:t>
+                      </a:r>
+                      <a:endParaRPr lang="en-US" dirty="0"/>
+                    </a:p>
+                  </a:txBody>
+                  <a:tcPr/>
+                </a:tc>
+                <a:tc>
+                  <a:txBody>
+                    <a:bodyPr/>
+                    <a:lstStyle/>
+                    <a:p>
+                      <a:pPr algn="ctr"/>
+                      <a:r>
+                        <a:rPr lang="en-US" dirty="0" smtClean="0"/>
+                        <a:t>756</a:t>
+                      </a:r>
+                      <a:endParaRPr lang="en-US" dirty="0"/>
+                    </a:p>
+                  </a:txBody>
+                  <a:tcPr/>
+                </a:tc>
+                <a:tc>
+                  <a:txBody>
+                    <a:bodyPr/>
+                    <a:lstStyle/>
+                    <a:p>
+                      <a:pPr algn="ctr"/>
+                      <a:r>
+                        <a:rPr lang="en-US" dirty="0" smtClean="0"/>
+                        <a:t>88</a:t>
+                      </a:r>
+                      <a:endParaRPr lang="en-US" dirty="0"/>
+                    </a:p>
+                  </a:txBody>
+                  <a:tcPr/>
+                </a:tc>
+                <a:extLst>
+                  <a:ext uri="{0D108BD9-81ED-4DB2-BD59-A6C34878D82A}">
+                    <a16:rowId xmlns:a16="http://schemas.microsoft.com/office/drawing/2014/main" val="283221556"/>
+                  </a:ext>
+                </a:extLst>
+              </a:tr>
+            </a:tbl>
+          </a:graphicData>
+        </a:graphic>
+      </p:graphicFrame>
+      <p:sp>
+        <p:nvSpPr>
+          <p:cNvPr id="9" name="文字方塊 8"/>
+          <p:cNvSpPr txBox="1"/>
+          <p:nvPr/>
+        </p:nvSpPr>
+        <p:spPr>
+          <a:xfrm>
+            <a:off x="1770454" y="1510788"/>
+            <a:ext cx="3168431" cy="369332"/>
+          </a:xfrm>
+          <a:prstGeom prst="rect">
+            <a:avLst/>
+          </a:prstGeom>
+          <a:noFill/>
+        </p:spPr>
+        <p:txBody>
+          <a:bodyPr wrap="none" rtlCol="0">
+            <a:spAutoFit/>
+          </a:bodyPr>
+          <a:lstStyle/>
+          <a:p>
+            <a:r>
+              <a:rPr lang="en-US" dirty="0" smtClean="0"/>
+              <a:t>Training Data Confusion Matrix</a:t>
+            </a:r>
+            <a:endParaRPr lang="en-US" dirty="0"/>
+          </a:p>
+        </p:txBody>
+      </p:sp>
+      <p:sp>
+        <p:nvSpPr>
+          <p:cNvPr id="10" name="文字方塊 9"/>
+          <p:cNvSpPr txBox="1"/>
+          <p:nvPr/>
+        </p:nvSpPr>
+        <p:spPr>
+          <a:xfrm>
+            <a:off x="7974060" y="1555897"/>
+            <a:ext cx="2800190" cy="369332"/>
+          </a:xfrm>
+          <a:prstGeom prst="rect">
+            <a:avLst/>
+          </a:prstGeom>
+          <a:noFill/>
+        </p:spPr>
+        <p:txBody>
+          <a:bodyPr wrap="none" rtlCol="0">
+            <a:spAutoFit/>
+          </a:bodyPr>
+          <a:lstStyle/>
+          <a:p>
+            <a:r>
+              <a:rPr lang="en-US" dirty="0" smtClean="0"/>
+              <a:t>Test Data Confusion Matrix</a:t>
+            </a:r>
+            <a:endParaRPr lang="en-US" dirty="0"/>
+          </a:p>
+        </p:txBody>
+      </p:sp>
+      <p:sp>
+        <p:nvSpPr>
+          <p:cNvPr id="11" name="文字方塊 10"/>
+          <p:cNvSpPr txBox="1"/>
+          <p:nvPr/>
+        </p:nvSpPr>
+        <p:spPr>
+          <a:xfrm>
+            <a:off x="2379305" y="4227589"/>
+            <a:ext cx="1950727" cy="369332"/>
+          </a:xfrm>
+          <a:prstGeom prst="rect">
+            <a:avLst/>
+          </a:prstGeom>
+          <a:noFill/>
+        </p:spPr>
+        <p:txBody>
+          <a:bodyPr wrap="none" rtlCol="0">
+            <a:spAutoFit/>
+          </a:bodyPr>
+          <a:lstStyle/>
+          <a:p>
+            <a:r>
+              <a:rPr lang="en-US" dirty="0" smtClean="0"/>
+              <a:t>Accuracy : 0.9922</a:t>
+            </a:r>
+            <a:endParaRPr lang="en-US" dirty="0"/>
+          </a:p>
+        </p:txBody>
+      </p:sp>
+      <p:sp>
+        <p:nvSpPr>
+          <p:cNvPr id="12" name="文字方塊 11"/>
+          <p:cNvSpPr txBox="1"/>
+          <p:nvPr/>
+        </p:nvSpPr>
+        <p:spPr>
+          <a:xfrm>
+            <a:off x="8333475" y="4227590"/>
+            <a:ext cx="1950727" cy="369332"/>
+          </a:xfrm>
+          <a:prstGeom prst="rect">
+            <a:avLst/>
+          </a:prstGeom>
+          <a:noFill/>
+        </p:spPr>
+        <p:txBody>
+          <a:bodyPr wrap="none" rtlCol="0">
+            <a:spAutoFit/>
+          </a:bodyPr>
+          <a:lstStyle/>
+          <a:p>
+            <a:r>
+              <a:rPr lang="en-US" dirty="0" smtClean="0"/>
+              <a:t>Accuracy : 0.9660</a:t>
+            </a:r>
+            <a:endParaRPr lang="en-US" dirty="0"/>
+          </a:p>
+        </p:txBody>
+      </p:sp>
+      <p:pic>
+        <p:nvPicPr>
+          <p:cNvPr id="3" name="圖片 2"/>
+          <p:cNvPicPr>
+            <a:picLocks noChangeAspect="1"/>
+          </p:cNvPicPr>
+          <p:nvPr/>
+        </p:nvPicPr>
+        <p:blipFill rotWithShape="1">
+          <a:blip r:embed="rId2"/>
+          <a:srcRect l="12678" t="54854" r="57217" b="28023"/>
+          <a:stretch/>
+        </p:blipFill>
+        <p:spPr>
+          <a:xfrm>
+            <a:off x="3117733" y="4632700"/>
+            <a:ext cx="6442760" cy="2061233"/>
+          </a:xfrm>
+          <a:prstGeom prst="rect">
+            <a:avLst/>
+          </a:prstGeom>
+        </p:spPr>
+      </p:pic>
+    </p:spTree>
+    <p:extLst>
+      <p:ext uri="{BB962C8B-B14F-4D97-AF65-F5344CB8AC3E}">
+        <p14:creationId xmlns:p14="http://schemas.microsoft.com/office/powerpoint/2010/main" val="3384561204"/>
+      </p:ext>
+    </p:extLst>
+  </p:cSld>
+  <p:clrMapOvr>
+    <a:masterClrMapping/>
+  </p:clrMapOvr>
+</p:sld>
+</file>
+
+<file path=ppt/slides/slide13.xml><?xml version="1.0" encoding="utf-8"?>
+<p:sld xmlns:a="http://schemas.openxmlformats.org/drawingml/2006/main" xmlns:r="http://schemas.openxmlformats.org/officeDocument/2006/relationships" xmlns:p="http://schemas.openxmlformats.org/presentationml/2006/main">
+  <p:cSld>
+    <p:spTree>
+      <p:nvGrpSpPr>
+        <p:cNvPr id="1" name=""/>
+        <p:cNvGrpSpPr/>
+        <p:nvPr/>
+      </p:nvGrpSpPr>
+      <p:grpSpPr>
+        <a:xfrm>
+          <a:off x="0" y="0"/>
+          <a:ext cx="0" cy="0"/>
+          <a:chOff x="0" y="0"/>
+          <a:chExt cx="0" cy="0"/>
+        </a:xfrm>
+      </p:grpSpPr>
+      <p:sp>
+        <p:nvSpPr>
+          <p:cNvPr id="2" name="標題 1"/>
+          <p:cNvSpPr>
+            <a:spLocks noGrp="1"/>
+          </p:cNvSpPr>
+          <p:nvPr>
+            <p:ph type="title"/>
+          </p:nvPr>
+        </p:nvSpPr>
+        <p:spPr>
+          <a:xfrm>
+            <a:off x="1371600" y="685800"/>
+            <a:ext cx="9601200" cy="835090"/>
+          </a:xfrm>
+        </p:spPr>
+        <p:txBody>
+          <a:bodyPr/>
+          <a:lstStyle/>
+          <a:p>
+            <a:r>
+              <a:rPr lang="en-US" dirty="0" smtClean="0"/>
+              <a:t>Radom Forest: Threshold = 0.05</a:t>
+            </a:r>
+            <a:endParaRPr lang="en-US" dirty="0"/>
+          </a:p>
+        </p:txBody>
+      </p:sp>
+      <p:graphicFrame>
+        <p:nvGraphicFramePr>
+          <p:cNvPr id="4" name="內容版面配置區 3"/>
+          <p:cNvGraphicFramePr>
+            <a:graphicFrameLocks noGrp="1"/>
+          </p:cNvGraphicFramePr>
+          <p:nvPr>
+            <p:ph idx="1"/>
+            <p:extLst/>
+          </p:nvPr>
+        </p:nvGraphicFramePr>
+        <p:xfrm>
+          <a:off x="810910" y="1926001"/>
+          <a:ext cx="5235327" cy="2301588"/>
+        </p:xfrm>
+        <a:graphic>
+          <a:graphicData uri="http://schemas.openxmlformats.org/drawingml/2006/table">
+            <a:tbl>
+              <a:tblPr firstRow="1" firstCol="1">
+                <a:tableStyleId>{5C22544A-7EE6-4342-B048-85BDC9FD1C3A}</a:tableStyleId>
+              </a:tblPr>
+              <a:tblGrid>
+                <a:gridCol w="1745109">
+                  <a:extLst>
+                    <a:ext uri="{9D8B030D-6E8A-4147-A177-3AD203B41FA5}">
+                      <a16:colId xmlns:a16="http://schemas.microsoft.com/office/drawing/2014/main" val="3766869113"/>
+                    </a:ext>
+                  </a:extLst>
+                </a:gridCol>
+                <a:gridCol w="1745109">
+                  <a:extLst>
+                    <a:ext uri="{9D8B030D-6E8A-4147-A177-3AD203B41FA5}">
+                      <a16:colId xmlns:a16="http://schemas.microsoft.com/office/drawing/2014/main" val="1875346058"/>
+                    </a:ext>
+                  </a:extLst>
+                </a:gridCol>
+                <a:gridCol w="1745109">
+                  <a:extLst>
+                    <a:ext uri="{9D8B030D-6E8A-4147-A177-3AD203B41FA5}">
+                      <a16:colId xmlns:a16="http://schemas.microsoft.com/office/drawing/2014/main" val="1822370682"/>
+                    </a:ext>
+                  </a:extLst>
+                </a:gridCol>
+              </a:tblGrid>
+              <a:tr h="767196">
+                <a:tc>
+                  <a:txBody>
+                    <a:bodyPr/>
+                    <a:lstStyle/>
+                    <a:p>
+                      <a:pPr algn="r"/>
+                      <a:r>
+                        <a:rPr lang="en-US" dirty="0" smtClean="0"/>
+                        <a:t>Prediction</a:t>
+                      </a:r>
+                    </a:p>
+                    <a:p>
+                      <a:pPr algn="l"/>
+                      <a:r>
+                        <a:rPr lang="en-US" dirty="0" smtClean="0"/>
+                        <a:t>Actual</a:t>
+                      </a:r>
+                      <a:endParaRPr lang="en-US" dirty="0"/>
+                    </a:p>
+                  </a:txBody>
+                  <a:tcPr/>
+                </a:tc>
+                <a:tc>
+                  <a:txBody>
+                    <a:bodyPr/>
+                    <a:lstStyle/>
+                    <a:p>
+                      <a:pPr algn="ctr"/>
+                      <a:r>
+                        <a:rPr lang="en-US" dirty="0" smtClean="0"/>
+                        <a:t>0</a:t>
+                      </a:r>
+                      <a:endParaRPr lang="en-US" dirty="0"/>
+                    </a:p>
+                  </a:txBody>
+                  <a:tcPr/>
+                </a:tc>
+                <a:tc>
+                  <a:txBody>
+                    <a:bodyPr/>
+                    <a:lstStyle/>
+                    <a:p>
+                      <a:pPr algn="ctr"/>
+                      <a:r>
+                        <a:rPr lang="en-US" dirty="0" smtClean="0"/>
+                        <a:t>1</a:t>
+                      </a:r>
+                      <a:endParaRPr lang="en-US" dirty="0"/>
+                    </a:p>
+                  </a:txBody>
+                  <a:tcPr/>
+                </a:tc>
+                <a:extLst>
+                  <a:ext uri="{0D108BD9-81ED-4DB2-BD59-A6C34878D82A}">
+                    <a16:rowId xmlns:a16="http://schemas.microsoft.com/office/drawing/2014/main" val="2541860142"/>
+                  </a:ext>
+                </a:extLst>
+              </a:tr>
+              <a:tr h="767196">
+                <a:tc>
+                  <a:txBody>
+                    <a:bodyPr/>
+                    <a:lstStyle/>
+                    <a:p>
+                      <a:pPr algn="ctr"/>
+                      <a:r>
+                        <a:rPr lang="en-US" dirty="0" smtClean="0"/>
+                        <a:t>0</a:t>
+                      </a:r>
+                      <a:endParaRPr lang="en-US" dirty="0"/>
+                    </a:p>
+                  </a:txBody>
+                  <a:tcPr/>
+                </a:tc>
+                <a:tc>
+                  <a:txBody>
+                    <a:bodyPr/>
+                    <a:lstStyle/>
+                    <a:p>
+                      <a:pPr algn="ctr"/>
+                      <a:r>
+                        <a:rPr lang="en-US" dirty="0" smtClean="0"/>
+                        <a:t>31675</a:t>
+                      </a:r>
+                      <a:endParaRPr lang="en-US" dirty="0"/>
+                    </a:p>
+                  </a:txBody>
+                  <a:tcPr/>
+                </a:tc>
+                <a:tc>
+                  <a:txBody>
+                    <a:bodyPr/>
+                    <a:lstStyle/>
+                    <a:p>
+                      <a:pPr algn="ctr"/>
+                      <a:r>
+                        <a:rPr lang="en-US" dirty="0" smtClean="0"/>
+                        <a:t>2868</a:t>
+                      </a:r>
+                      <a:endParaRPr lang="en-US" dirty="0"/>
+                    </a:p>
+                  </a:txBody>
+                  <a:tcPr/>
+                </a:tc>
+                <a:extLst>
+                  <a:ext uri="{0D108BD9-81ED-4DB2-BD59-A6C34878D82A}">
+                    <a16:rowId xmlns:a16="http://schemas.microsoft.com/office/drawing/2014/main" val="112516665"/>
+                  </a:ext>
+                </a:extLst>
+              </a:tr>
+              <a:tr h="767196">
+                <a:tc>
+                  <a:txBody>
+                    <a:bodyPr/>
+                    <a:lstStyle/>
+                    <a:p>
+                      <a:pPr algn="ctr"/>
+                      <a:r>
+                        <a:rPr lang="en-US" dirty="0" smtClean="0"/>
+                        <a:t>1</a:t>
+                      </a:r>
+                      <a:endParaRPr lang="en-US" dirty="0"/>
+                    </a:p>
+                  </a:txBody>
+                  <a:tcPr/>
+                </a:tc>
+                <a:tc>
+                  <a:txBody>
+                    <a:bodyPr/>
+                    <a:lstStyle/>
+                    <a:p>
+                      <a:pPr algn="ctr"/>
+                      <a:r>
+                        <a:rPr lang="en-US" dirty="0" smtClean="0"/>
+                        <a:t>0</a:t>
+                      </a:r>
+                      <a:endParaRPr lang="en-US" dirty="0"/>
+                    </a:p>
+                  </a:txBody>
+                  <a:tcPr/>
+                </a:tc>
+                <a:tc>
+                  <a:txBody>
+                    <a:bodyPr/>
+                    <a:lstStyle/>
+                    <a:p>
+                      <a:pPr algn="ctr"/>
+                      <a:r>
+                        <a:rPr lang="en-US" dirty="0" smtClean="0"/>
+                        <a:t>1265</a:t>
+                      </a:r>
+                      <a:endParaRPr lang="en-US" dirty="0"/>
+                    </a:p>
+                  </a:txBody>
+                  <a:tcPr/>
+                </a:tc>
+                <a:extLst>
+                  <a:ext uri="{0D108BD9-81ED-4DB2-BD59-A6C34878D82A}">
+                    <a16:rowId xmlns:a16="http://schemas.microsoft.com/office/drawing/2014/main" val="283221556"/>
+                  </a:ext>
+                </a:extLst>
+              </a:tr>
+            </a:tbl>
+          </a:graphicData>
+        </a:graphic>
+      </p:graphicFrame>
+      <p:graphicFrame>
+        <p:nvGraphicFramePr>
+          <p:cNvPr id="8" name="內容版面配置區 3"/>
+          <p:cNvGraphicFramePr>
+            <a:graphicFrameLocks/>
+          </p:cNvGraphicFramePr>
+          <p:nvPr>
+            <p:extLst>
+              <p:ext uri="{D42A27DB-BD31-4B8C-83A1-F6EECF244321}">
+                <p14:modId xmlns:p14="http://schemas.microsoft.com/office/powerpoint/2010/main" val="4056730315"/>
+              </p:ext>
+            </p:extLst>
+          </p:nvPr>
+        </p:nvGraphicFramePr>
+        <p:xfrm>
+          <a:off x="6721149" y="1929904"/>
+          <a:ext cx="5315340" cy="2297685"/>
+        </p:xfrm>
+        <a:graphic>
+          <a:graphicData uri="http://schemas.openxmlformats.org/drawingml/2006/table">
+            <a:tbl>
+              <a:tblPr firstRow="1" firstCol="1">
+                <a:tableStyleId>{5C22544A-7EE6-4342-B048-85BDC9FD1C3A}</a:tableStyleId>
+              </a:tblPr>
+              <a:tblGrid>
+                <a:gridCol w="1771780">
+                  <a:extLst>
+                    <a:ext uri="{9D8B030D-6E8A-4147-A177-3AD203B41FA5}">
+                      <a16:colId xmlns:a16="http://schemas.microsoft.com/office/drawing/2014/main" val="3766869113"/>
+                    </a:ext>
+                  </a:extLst>
+                </a:gridCol>
+                <a:gridCol w="1771780">
+                  <a:extLst>
+                    <a:ext uri="{9D8B030D-6E8A-4147-A177-3AD203B41FA5}">
+                      <a16:colId xmlns:a16="http://schemas.microsoft.com/office/drawing/2014/main" val="1875346058"/>
+                    </a:ext>
+                  </a:extLst>
+                </a:gridCol>
+                <a:gridCol w="1771780">
+                  <a:extLst>
+                    <a:ext uri="{9D8B030D-6E8A-4147-A177-3AD203B41FA5}">
+                      <a16:colId xmlns:a16="http://schemas.microsoft.com/office/drawing/2014/main" val="1822370682"/>
+                    </a:ext>
+                  </a:extLst>
+                </a:gridCol>
+              </a:tblGrid>
+              <a:tr h="765895">
+                <a:tc>
+                  <a:txBody>
+                    <a:bodyPr/>
+                    <a:lstStyle/>
+                    <a:p>
+                      <a:pPr algn="r"/>
+                      <a:r>
+                        <a:rPr lang="en-US" dirty="0" smtClean="0"/>
+                        <a:t>Prediction</a:t>
+                      </a:r>
+                    </a:p>
+                    <a:p>
+                      <a:pPr algn="l"/>
+                      <a:r>
+                        <a:rPr lang="en-US" dirty="0" smtClean="0"/>
+                        <a:t>Actual</a:t>
+                      </a:r>
+                      <a:endParaRPr lang="en-US" dirty="0"/>
+                    </a:p>
+                  </a:txBody>
+                  <a:tcPr/>
+                </a:tc>
+                <a:tc>
+                  <a:txBody>
+                    <a:bodyPr/>
+                    <a:lstStyle/>
+                    <a:p>
+                      <a:pPr algn="ctr"/>
+                      <a:r>
+                        <a:rPr lang="en-US" dirty="0" smtClean="0"/>
+                        <a:t>0</a:t>
+                      </a:r>
+                      <a:endParaRPr lang="en-US" dirty="0"/>
+                    </a:p>
+                  </a:txBody>
+                  <a:tcPr/>
+                </a:tc>
+                <a:tc>
+                  <a:txBody>
+                    <a:bodyPr/>
+                    <a:lstStyle/>
+                    <a:p>
+                      <a:pPr algn="ctr"/>
+                      <a:r>
+                        <a:rPr lang="en-US" dirty="0" smtClean="0"/>
+                        <a:t>1</a:t>
+                      </a:r>
+                      <a:endParaRPr lang="en-US" dirty="0"/>
+                    </a:p>
+                  </a:txBody>
+                  <a:tcPr/>
+                </a:tc>
+                <a:extLst>
+                  <a:ext uri="{0D108BD9-81ED-4DB2-BD59-A6C34878D82A}">
+                    <a16:rowId xmlns:a16="http://schemas.microsoft.com/office/drawing/2014/main" val="2541860142"/>
+                  </a:ext>
+                </a:extLst>
+              </a:tr>
+              <a:tr h="765895">
+                <a:tc>
+                  <a:txBody>
+                    <a:bodyPr/>
+                    <a:lstStyle/>
+                    <a:p>
+                      <a:pPr algn="ctr"/>
+                      <a:r>
+                        <a:rPr lang="en-US" dirty="0" smtClean="0"/>
+                        <a:t>0</a:t>
+                      </a:r>
+                      <a:endParaRPr lang="en-US" dirty="0"/>
+                    </a:p>
+                  </a:txBody>
+                  <a:tcPr/>
+                </a:tc>
+                <a:tc>
+                  <a:txBody>
+                    <a:bodyPr/>
+                    <a:lstStyle/>
+                    <a:p>
+                      <a:pPr algn="ctr"/>
+                      <a:r>
+                        <a:rPr lang="en-US" dirty="0" smtClean="0"/>
+                        <a:t>18819</a:t>
+                      </a:r>
+                      <a:endParaRPr lang="en-US" dirty="0"/>
+                    </a:p>
+                  </a:txBody>
+                  <a:tcPr/>
+                </a:tc>
+                <a:tc>
+                  <a:txBody>
+                    <a:bodyPr/>
+                    <a:lstStyle/>
+                    <a:p>
+                      <a:pPr algn="ctr"/>
+                      <a:r>
+                        <a:rPr lang="en-US" dirty="0" smtClean="0"/>
+                        <a:t>4210</a:t>
+                      </a:r>
+                      <a:endParaRPr lang="en-US" dirty="0"/>
+                    </a:p>
+                  </a:txBody>
+                  <a:tcPr/>
+                </a:tc>
+                <a:extLst>
+                  <a:ext uri="{0D108BD9-81ED-4DB2-BD59-A6C34878D82A}">
+                    <a16:rowId xmlns:a16="http://schemas.microsoft.com/office/drawing/2014/main" val="112516665"/>
+                  </a:ext>
+                </a:extLst>
+              </a:tr>
+              <a:tr h="765895">
+                <a:tc>
+                  <a:txBody>
+                    <a:bodyPr/>
+                    <a:lstStyle/>
+                    <a:p>
+                      <a:pPr algn="ctr"/>
+                      <a:r>
+                        <a:rPr lang="en-US" dirty="0" smtClean="0"/>
+                        <a:t>1</a:t>
+                      </a:r>
+                      <a:endParaRPr lang="en-US" dirty="0"/>
+                    </a:p>
+                  </a:txBody>
+                  <a:tcPr/>
+                </a:tc>
+                <a:tc>
+                  <a:txBody>
+                    <a:bodyPr/>
+                    <a:lstStyle/>
+                    <a:p>
+                      <a:pPr algn="ctr"/>
+                      <a:r>
+                        <a:rPr lang="en-US" dirty="0" smtClean="0"/>
+                        <a:t>472</a:t>
+                      </a:r>
+                      <a:endParaRPr lang="en-US" dirty="0"/>
+                    </a:p>
+                  </a:txBody>
+                  <a:tcPr/>
+                </a:tc>
+                <a:tc>
+                  <a:txBody>
+                    <a:bodyPr/>
+                    <a:lstStyle/>
+                    <a:p>
+                      <a:pPr algn="ctr"/>
+                      <a:r>
+                        <a:rPr lang="en-US" dirty="0" smtClean="0"/>
+                        <a:t>372</a:t>
+                      </a:r>
+                      <a:endParaRPr lang="en-US" dirty="0"/>
+                    </a:p>
+                  </a:txBody>
+                  <a:tcPr/>
+                </a:tc>
+                <a:extLst>
+                  <a:ext uri="{0D108BD9-81ED-4DB2-BD59-A6C34878D82A}">
+                    <a16:rowId xmlns:a16="http://schemas.microsoft.com/office/drawing/2014/main" val="283221556"/>
+                  </a:ext>
+                </a:extLst>
+              </a:tr>
+            </a:tbl>
+          </a:graphicData>
+        </a:graphic>
+      </p:graphicFrame>
+      <p:sp>
+        <p:nvSpPr>
+          <p:cNvPr id="9" name="文字方塊 8"/>
+          <p:cNvSpPr txBox="1"/>
+          <p:nvPr/>
+        </p:nvSpPr>
+        <p:spPr>
+          <a:xfrm>
+            <a:off x="1770454" y="1510788"/>
+            <a:ext cx="3168431" cy="369332"/>
+          </a:xfrm>
+          <a:prstGeom prst="rect">
+            <a:avLst/>
+          </a:prstGeom>
+          <a:noFill/>
+        </p:spPr>
+        <p:txBody>
+          <a:bodyPr wrap="none" rtlCol="0">
+            <a:spAutoFit/>
+          </a:bodyPr>
+          <a:lstStyle/>
+          <a:p>
+            <a:r>
+              <a:rPr lang="en-US" dirty="0" smtClean="0"/>
+              <a:t>Training Data Confusion Matrix</a:t>
+            </a:r>
+            <a:endParaRPr lang="en-US" dirty="0"/>
+          </a:p>
+        </p:txBody>
+      </p:sp>
+      <p:sp>
+        <p:nvSpPr>
+          <p:cNvPr id="10" name="文字方塊 9"/>
+          <p:cNvSpPr txBox="1"/>
+          <p:nvPr/>
+        </p:nvSpPr>
+        <p:spPr>
+          <a:xfrm>
+            <a:off x="7974060" y="1555897"/>
+            <a:ext cx="2800190" cy="369332"/>
+          </a:xfrm>
+          <a:prstGeom prst="rect">
+            <a:avLst/>
+          </a:prstGeom>
+          <a:noFill/>
+        </p:spPr>
+        <p:txBody>
+          <a:bodyPr wrap="none" rtlCol="0">
+            <a:spAutoFit/>
+          </a:bodyPr>
+          <a:lstStyle/>
+          <a:p>
+            <a:r>
+              <a:rPr lang="en-US" dirty="0" smtClean="0"/>
+              <a:t>Test Data Confusion Matrix</a:t>
+            </a:r>
+            <a:endParaRPr lang="en-US" dirty="0"/>
+          </a:p>
+        </p:txBody>
+      </p:sp>
+      <p:sp>
+        <p:nvSpPr>
+          <p:cNvPr id="11" name="文字方塊 10"/>
+          <p:cNvSpPr txBox="1"/>
+          <p:nvPr/>
+        </p:nvSpPr>
+        <p:spPr>
+          <a:xfrm>
+            <a:off x="2379305" y="4227589"/>
+            <a:ext cx="1938223" cy="369332"/>
+          </a:xfrm>
+          <a:prstGeom prst="rect">
+            <a:avLst/>
+          </a:prstGeom>
+          <a:noFill/>
+        </p:spPr>
+        <p:txBody>
+          <a:bodyPr wrap="none" rtlCol="0">
+            <a:spAutoFit/>
+          </a:bodyPr>
+          <a:lstStyle/>
+          <a:p>
+            <a:r>
+              <a:rPr lang="en-US" dirty="0" smtClean="0"/>
+              <a:t>Accuracy : 0.9199</a:t>
+            </a:r>
+            <a:endParaRPr lang="en-US" dirty="0"/>
+          </a:p>
+        </p:txBody>
+      </p:sp>
+      <p:sp>
+        <p:nvSpPr>
+          <p:cNvPr id="12" name="文字方塊 11"/>
+          <p:cNvSpPr txBox="1"/>
+          <p:nvPr/>
+        </p:nvSpPr>
+        <p:spPr>
+          <a:xfrm>
+            <a:off x="8333475" y="4227590"/>
+            <a:ext cx="1950727" cy="369332"/>
+          </a:xfrm>
+          <a:prstGeom prst="rect">
+            <a:avLst/>
+          </a:prstGeom>
+          <a:noFill/>
+        </p:spPr>
+        <p:txBody>
+          <a:bodyPr wrap="none" rtlCol="0">
+            <a:spAutoFit/>
+          </a:bodyPr>
+          <a:lstStyle/>
+          <a:p>
+            <a:r>
+              <a:rPr lang="en-US" dirty="0" smtClean="0"/>
+              <a:t>Accuracy : 0.9223</a:t>
+            </a:r>
+            <a:endParaRPr lang="en-US" dirty="0"/>
+          </a:p>
+        </p:txBody>
+      </p:sp>
+      <p:pic>
+        <p:nvPicPr>
+          <p:cNvPr id="3" name="圖片 2"/>
+          <p:cNvPicPr>
+            <a:picLocks noChangeAspect="1"/>
+          </p:cNvPicPr>
+          <p:nvPr/>
+        </p:nvPicPr>
+        <p:blipFill rotWithShape="1">
+          <a:blip r:embed="rId2"/>
+          <a:srcRect l="12942" t="51705" r="57649" b="32555"/>
+          <a:stretch/>
+        </p:blipFill>
+        <p:spPr>
+          <a:xfrm>
+            <a:off x="3253533" y="4632700"/>
+            <a:ext cx="6621987" cy="1993669"/>
+          </a:xfrm>
+          <a:prstGeom prst="rect">
+            <a:avLst/>
+          </a:prstGeom>
+        </p:spPr>
+      </p:pic>
+    </p:spTree>
+    <p:extLst>
+      <p:ext uri="{BB962C8B-B14F-4D97-AF65-F5344CB8AC3E}">
+        <p14:creationId xmlns:p14="http://schemas.microsoft.com/office/powerpoint/2010/main" val="1884826917"/>
+      </p:ext>
+    </p:extLst>
+  </p:cSld>
+  <p:clrMapOvr>
+    <a:masterClrMapping/>
+  </p:clrMapOvr>
+</p:sld>
+</file>
+
+<file path=ppt/slides/slide14.xml><?xml version="1.0" encoding="utf-8"?>
+<p:sld xmlns:a="http://schemas.openxmlformats.org/drawingml/2006/main" xmlns:r="http://schemas.openxmlformats.org/officeDocument/2006/relationships" xmlns:p="http://schemas.openxmlformats.org/presentationml/2006/main">
+  <p:cSld>
+    <p:spTree>
+      <p:nvGrpSpPr>
+        <p:cNvPr id="1" name=""/>
+        <p:cNvGrpSpPr/>
+        <p:nvPr/>
+      </p:nvGrpSpPr>
+      <p:grpSpPr>
+        <a:xfrm>
+          <a:off x="0" y="0"/>
+          <a:ext cx="0" cy="0"/>
+          <a:chOff x="0" y="0"/>
+          <a:chExt cx="0" cy="0"/>
+        </a:xfrm>
+      </p:grpSpPr>
+      <p:sp>
+        <p:nvSpPr>
+          <p:cNvPr id="2" name="標題 1"/>
+          <p:cNvSpPr>
+            <a:spLocks noGrp="1"/>
+          </p:cNvSpPr>
+          <p:nvPr>
+            <p:ph type="title"/>
+          </p:nvPr>
+        </p:nvSpPr>
+        <p:spPr/>
+        <p:txBody>
+          <a:bodyPr/>
+          <a:lstStyle/>
+          <a:p>
+            <a:r>
+              <a:rPr lang="en-US" dirty="0" smtClean="0"/>
+              <a:t>Random Forest: Feature Importance</a:t>
+            </a:r>
+            <a:endParaRPr lang="en-US" dirty="0"/>
+          </a:p>
+        </p:txBody>
+      </p:sp>
+      <p:graphicFrame>
+        <p:nvGraphicFramePr>
+          <p:cNvPr id="4" name="內容版面配置區 3"/>
+          <p:cNvGraphicFramePr>
+            <a:graphicFrameLocks noGrp="1"/>
+          </p:cNvGraphicFramePr>
+          <p:nvPr>
+            <p:ph idx="1"/>
+            <p:extLst/>
+          </p:nvPr>
+        </p:nvGraphicFramePr>
+        <p:xfrm>
+          <a:off x="1371600" y="1679510"/>
+          <a:ext cx="9601200" cy="4079240"/>
+        </p:xfrm>
+        <a:graphic>
+          <a:graphicData uri="http://schemas.openxmlformats.org/drawingml/2006/table">
+            <a:tbl>
+              <a:tblPr firstRow="1" bandRow="1">
+                <a:tableStyleId>{5C22544A-7EE6-4342-B048-85BDC9FD1C3A}</a:tableStyleId>
+              </a:tblPr>
+              <a:tblGrid>
+                <a:gridCol w="4800600">
+                  <a:extLst>
+                    <a:ext uri="{9D8B030D-6E8A-4147-A177-3AD203B41FA5}">
+                      <a16:colId xmlns:a16="http://schemas.microsoft.com/office/drawing/2014/main" val="2078251370"/>
+                    </a:ext>
+                  </a:extLst>
+                </a:gridCol>
+                <a:gridCol w="4800600">
+                  <a:extLst>
+                    <a:ext uri="{9D8B030D-6E8A-4147-A177-3AD203B41FA5}">
+                      <a16:colId xmlns:a16="http://schemas.microsoft.com/office/drawing/2014/main" val="3087714098"/>
+                    </a:ext>
+                  </a:extLst>
+                </a:gridCol>
+              </a:tblGrid>
+              <a:tr h="370840">
+                <a:tc>
+                  <a:txBody>
+                    <a:bodyPr/>
+                    <a:lstStyle/>
+                    <a:p>
+                      <a:pPr algn="ctr"/>
+                      <a:r>
+                        <a:rPr lang="en-US" dirty="0" smtClean="0"/>
+                        <a:t>Features</a:t>
+                      </a:r>
+                      <a:endParaRPr lang="en-US" dirty="0"/>
+                    </a:p>
+                  </a:txBody>
+                  <a:tcPr/>
+                </a:tc>
+                <a:tc>
+                  <a:txBody>
+                    <a:bodyPr/>
+                    <a:lstStyle/>
+                    <a:p>
+                      <a:pPr algn="ctr"/>
+                      <a:r>
+                        <a:rPr lang="en-US" dirty="0" smtClean="0"/>
+                        <a:t>Importance</a:t>
+                      </a:r>
+                      <a:endParaRPr lang="en-US" dirty="0"/>
+                    </a:p>
+                  </a:txBody>
+                  <a:tcPr/>
+                </a:tc>
+                <a:extLst>
+                  <a:ext uri="{0D108BD9-81ED-4DB2-BD59-A6C34878D82A}">
+                    <a16:rowId xmlns:a16="http://schemas.microsoft.com/office/drawing/2014/main" val="2163909821"/>
+                  </a:ext>
+                </a:extLst>
+              </a:tr>
+              <a:tr h="370840">
+                <a:tc>
+                  <a:txBody>
+                    <a:bodyPr/>
+                    <a:lstStyle/>
+                    <a:p>
+                      <a:pPr algn="ctr"/>
+                      <a:r>
+                        <a:rPr lang="en-US" dirty="0" smtClean="0"/>
+                        <a:t>Time</a:t>
+                      </a:r>
+                      <a:endParaRPr lang="en-US" dirty="0"/>
+                    </a:p>
+                  </a:txBody>
+                  <a:tcPr/>
+                </a:tc>
+                <a:tc>
+                  <a:txBody>
+                    <a:bodyPr/>
+                    <a:lstStyle/>
+                    <a:p>
+                      <a:pPr algn="ctr"/>
+                      <a:r>
+                        <a:rPr lang="en-US" dirty="0" smtClean="0"/>
+                        <a:t>0.010399</a:t>
+                      </a:r>
+                    </a:p>
+                  </a:txBody>
+                  <a:tcPr/>
+                </a:tc>
+                <a:extLst>
+                  <a:ext uri="{0D108BD9-81ED-4DB2-BD59-A6C34878D82A}">
+                    <a16:rowId xmlns:a16="http://schemas.microsoft.com/office/drawing/2014/main" val="2439416288"/>
+                  </a:ext>
+                </a:extLst>
+              </a:tr>
+              <a:tr h="370840">
+                <a:tc>
+                  <a:txBody>
+                    <a:bodyPr/>
+                    <a:lstStyle/>
+                    <a:p>
+                      <a:pPr algn="ctr"/>
+                      <a:r>
+                        <a:rPr lang="en-US" dirty="0" smtClean="0"/>
+                        <a:t>Proximity to USAFB</a:t>
+                      </a:r>
+                      <a:endParaRPr lang="en-US" dirty="0"/>
+                    </a:p>
+                  </a:txBody>
+                  <a:tcPr/>
+                </a:tc>
+                <a:tc>
+                  <a:txBody>
+                    <a:bodyPr/>
+                    <a:lstStyle/>
+                    <a:p>
+                      <a:pPr algn="ctr"/>
+                      <a:r>
+                        <a:rPr lang="en-US" dirty="0" smtClean="0"/>
+                        <a:t>0.004348</a:t>
+                      </a:r>
+                      <a:endParaRPr lang="en-US" dirty="0"/>
+                    </a:p>
+                  </a:txBody>
+                  <a:tcPr/>
+                </a:tc>
+                <a:extLst>
+                  <a:ext uri="{0D108BD9-81ED-4DB2-BD59-A6C34878D82A}">
+                    <a16:rowId xmlns:a16="http://schemas.microsoft.com/office/drawing/2014/main" val="3762594384"/>
+                  </a:ext>
+                </a:extLst>
+              </a:tr>
+              <a:tr h="370840">
+                <a:tc>
+                  <a:txBody>
+                    <a:bodyPr/>
+                    <a:lstStyle/>
+                    <a:p>
+                      <a:pPr algn="ctr"/>
+                      <a:r>
+                        <a:rPr lang="en-US" dirty="0" smtClean="0"/>
+                        <a:t>Date</a:t>
+                      </a:r>
+                      <a:endParaRPr lang="en-US" dirty="0"/>
+                    </a:p>
+                  </a:txBody>
+                  <a:tcPr/>
+                </a:tc>
+                <a:tc>
+                  <a:txBody>
+                    <a:bodyPr/>
+                    <a:lstStyle/>
+                    <a:p>
+                      <a:pPr algn="ctr"/>
+                      <a:r>
+                        <a:rPr lang="en-US" dirty="0" smtClean="0"/>
+                        <a:t>0.002605</a:t>
+                      </a:r>
+                      <a:endParaRPr lang="en-US" dirty="0"/>
+                    </a:p>
+                  </a:txBody>
+                  <a:tcPr/>
+                </a:tc>
+                <a:extLst>
+                  <a:ext uri="{0D108BD9-81ED-4DB2-BD59-A6C34878D82A}">
+                    <a16:rowId xmlns:a16="http://schemas.microsoft.com/office/drawing/2014/main" val="2301117064"/>
+                  </a:ext>
+                </a:extLst>
+              </a:tr>
+              <a:tr h="370840">
+                <a:tc>
+                  <a:txBody>
+                    <a:bodyPr/>
+                    <a:lstStyle/>
+                    <a:p>
+                      <a:pPr algn="ctr"/>
+                      <a:r>
+                        <a:rPr lang="en-US" dirty="0" smtClean="0"/>
+                        <a:t>Days</a:t>
+                      </a:r>
+                      <a:r>
+                        <a:rPr lang="en-US" baseline="0" dirty="0" smtClean="0"/>
+                        <a:t> L</a:t>
+                      </a:r>
+                      <a:r>
+                        <a:rPr lang="en-US" dirty="0" smtClean="0"/>
+                        <a:t>apsed</a:t>
+                      </a:r>
+                      <a:r>
+                        <a:rPr lang="en-US" baseline="0" dirty="0" smtClean="0"/>
+                        <a:t> </a:t>
+                      </a:r>
+                      <a:r>
+                        <a:rPr lang="en-US" dirty="0" smtClean="0"/>
+                        <a:t>after</a:t>
+                      </a:r>
+                      <a:r>
+                        <a:rPr lang="en-US" baseline="0" dirty="0" smtClean="0"/>
+                        <a:t> S</a:t>
+                      </a:r>
+                      <a:r>
+                        <a:rPr lang="en-US" dirty="0" smtClean="0"/>
+                        <a:t>ighting</a:t>
+                      </a:r>
+                      <a:endParaRPr lang="en-US" dirty="0"/>
+                    </a:p>
+                  </a:txBody>
+                  <a:tcPr/>
+                </a:tc>
+                <a:tc>
+                  <a:txBody>
+                    <a:bodyPr/>
+                    <a:lstStyle/>
+                    <a:p>
+                      <a:pPr algn="ctr"/>
+                      <a:r>
+                        <a:rPr lang="en-US" dirty="0" smtClean="0"/>
+                        <a:t>0.001957</a:t>
+                      </a:r>
+                      <a:endParaRPr lang="en-US" dirty="0"/>
+                    </a:p>
+                  </a:txBody>
+                  <a:tcPr/>
+                </a:tc>
+                <a:extLst>
+                  <a:ext uri="{0D108BD9-81ED-4DB2-BD59-A6C34878D82A}">
+                    <a16:rowId xmlns:a16="http://schemas.microsoft.com/office/drawing/2014/main" val="283412461"/>
+                  </a:ext>
+                </a:extLst>
+              </a:tr>
+              <a:tr h="370840">
+                <a:tc>
+                  <a:txBody>
+                    <a:bodyPr/>
+                    <a:lstStyle/>
+                    <a:p>
+                      <a:pPr algn="ctr"/>
+                      <a:r>
+                        <a:rPr lang="en-US" dirty="0" smtClean="0"/>
+                        <a:t>Duration (seconds)</a:t>
+                      </a:r>
+                      <a:endParaRPr lang="en-US" dirty="0"/>
+                    </a:p>
+                  </a:txBody>
+                  <a:tcPr/>
+                </a:tc>
+                <a:tc>
+                  <a:txBody>
+                    <a:bodyPr/>
+                    <a:lstStyle/>
+                    <a:p>
+                      <a:pPr algn="ctr"/>
+                      <a:r>
+                        <a:rPr lang="en-US" dirty="0" smtClean="0"/>
+                        <a:t>0.001336</a:t>
+                      </a:r>
+                      <a:endParaRPr lang="en-US" dirty="0"/>
+                    </a:p>
+                  </a:txBody>
+                  <a:tcPr/>
+                </a:tc>
+                <a:extLst>
+                  <a:ext uri="{0D108BD9-81ED-4DB2-BD59-A6C34878D82A}">
+                    <a16:rowId xmlns:a16="http://schemas.microsoft.com/office/drawing/2014/main" val="3392307502"/>
+                  </a:ext>
+                </a:extLst>
+              </a:tr>
+              <a:tr h="370840">
+                <a:tc>
+                  <a:txBody>
+                    <a:bodyPr/>
+                    <a:lstStyle/>
+                    <a:p>
+                      <a:pPr algn="ctr"/>
+                      <a:r>
+                        <a:rPr lang="en-US" dirty="0" smtClean="0"/>
+                        <a:t>Day of the Week</a:t>
+                      </a:r>
+                      <a:endParaRPr lang="en-US" dirty="0"/>
+                    </a:p>
+                  </a:txBody>
+                  <a:tcPr/>
+                </a:tc>
+                <a:tc>
+                  <a:txBody>
+                    <a:bodyPr/>
+                    <a:lstStyle/>
+                    <a:p>
+                      <a:pPr algn="ctr"/>
+                      <a:r>
+                        <a:rPr lang="en-US" dirty="0" smtClean="0"/>
+                        <a:t>0.001215</a:t>
+                      </a:r>
+                      <a:endParaRPr lang="en-US" dirty="0"/>
+                    </a:p>
+                  </a:txBody>
+                  <a:tcPr/>
+                </a:tc>
+                <a:extLst>
+                  <a:ext uri="{0D108BD9-81ED-4DB2-BD59-A6C34878D82A}">
+                    <a16:rowId xmlns:a16="http://schemas.microsoft.com/office/drawing/2014/main" val="2640857516"/>
+                  </a:ext>
+                </a:extLst>
+              </a:tr>
+              <a:tr h="370840">
+                <a:tc>
+                  <a:txBody>
+                    <a:bodyPr/>
+                    <a:lstStyle/>
+                    <a:p>
+                      <a:pPr algn="ctr"/>
+                      <a:r>
+                        <a:rPr lang="en-US" dirty="0" smtClean="0"/>
+                        <a:t>Shape</a:t>
+                      </a:r>
+                      <a:endParaRPr lang="en-US" dirty="0"/>
+                    </a:p>
+                  </a:txBody>
+                  <a:tcPr/>
+                </a:tc>
+                <a:tc>
+                  <a:txBody>
+                    <a:bodyPr/>
+                    <a:lstStyle/>
+                    <a:p>
+                      <a:pPr algn="ctr"/>
+                      <a:r>
+                        <a:rPr lang="en-US" dirty="0" smtClean="0"/>
+                        <a:t>0.001099</a:t>
+                      </a:r>
+                      <a:endParaRPr lang="en-US" dirty="0"/>
+                    </a:p>
+                  </a:txBody>
+                  <a:tcPr/>
+                </a:tc>
+                <a:extLst>
+                  <a:ext uri="{0D108BD9-81ED-4DB2-BD59-A6C34878D82A}">
+                    <a16:rowId xmlns:a16="http://schemas.microsoft.com/office/drawing/2014/main" val="126986533"/>
+                  </a:ext>
+                </a:extLst>
+              </a:tr>
+              <a:tr h="370840">
+                <a:tc>
+                  <a:txBody>
+                    <a:bodyPr/>
+                    <a:lstStyle/>
+                    <a:p>
+                      <a:pPr algn="ctr"/>
+                      <a:r>
+                        <a:rPr lang="en-US" dirty="0" smtClean="0"/>
+                        <a:t>State</a:t>
+                      </a:r>
+                      <a:endParaRPr lang="en-US" dirty="0"/>
+                    </a:p>
+                  </a:txBody>
+                  <a:tcPr/>
+                </a:tc>
+                <a:tc>
+                  <a:txBody>
+                    <a:bodyPr/>
+                    <a:lstStyle/>
+                    <a:p>
+                      <a:pPr algn="ctr"/>
+                      <a:r>
+                        <a:rPr lang="en-US" dirty="0" smtClean="0"/>
+                        <a:t>0.000900</a:t>
+                      </a:r>
+                      <a:endParaRPr lang="en-US" dirty="0"/>
+                    </a:p>
+                  </a:txBody>
+                  <a:tcPr/>
+                </a:tc>
+                <a:extLst>
+                  <a:ext uri="{0D108BD9-81ED-4DB2-BD59-A6C34878D82A}">
+                    <a16:rowId xmlns:a16="http://schemas.microsoft.com/office/drawing/2014/main" val="2154236658"/>
+                  </a:ext>
+                </a:extLst>
+              </a:tr>
+              <a:tr h="370840">
+                <a:tc>
+                  <a:txBody>
+                    <a:bodyPr/>
+                    <a:lstStyle/>
+                    <a:p>
+                      <a:pPr algn="ctr"/>
+                      <a:r>
+                        <a:rPr lang="en-US" dirty="0" smtClean="0"/>
+                        <a:t>Extreme Weather</a:t>
+                      </a:r>
+                      <a:endParaRPr lang="en-US" dirty="0"/>
+                    </a:p>
+                  </a:txBody>
+                  <a:tcPr/>
+                </a:tc>
+                <a:tc>
+                  <a:txBody>
+                    <a:bodyPr/>
+                    <a:lstStyle/>
+                    <a:p>
+                      <a:pPr algn="ctr"/>
+                      <a:r>
+                        <a:rPr lang="en-US" dirty="0" smtClean="0"/>
+                        <a:t>0.000421</a:t>
+                      </a:r>
+                      <a:endParaRPr lang="en-US" dirty="0"/>
+                    </a:p>
+                  </a:txBody>
+                  <a:tcPr/>
+                </a:tc>
+                <a:extLst>
+                  <a:ext uri="{0D108BD9-81ED-4DB2-BD59-A6C34878D82A}">
+                    <a16:rowId xmlns:a16="http://schemas.microsoft.com/office/drawing/2014/main" val="1136461689"/>
+                  </a:ext>
+                </a:extLst>
+              </a:tr>
+              <a:tr h="370840">
+                <a:tc>
+                  <a:txBody>
+                    <a:bodyPr/>
+                    <a:lstStyle/>
+                    <a:p>
+                      <a:pPr algn="ctr"/>
+                      <a:r>
+                        <a:rPr lang="en-US" dirty="0" smtClean="0"/>
+                        <a:t>Moon Phase</a:t>
+                      </a:r>
+                      <a:endParaRPr lang="en-US" dirty="0"/>
+                    </a:p>
+                  </a:txBody>
+                  <a:tcPr/>
+                </a:tc>
+                <a:tc>
+                  <a:txBody>
+                    <a:bodyPr/>
+                    <a:lstStyle/>
+                    <a:p>
+                      <a:pPr algn="ctr"/>
+                      <a:r>
+                        <a:rPr lang="en-US" dirty="0" smtClean="0"/>
+                        <a:t>0.000001</a:t>
+                      </a:r>
+                      <a:endParaRPr lang="en-US" dirty="0"/>
+                    </a:p>
+                  </a:txBody>
+                  <a:tcPr/>
+                </a:tc>
+                <a:extLst>
+                  <a:ext uri="{0D108BD9-81ED-4DB2-BD59-A6C34878D82A}">
+                    <a16:rowId xmlns:a16="http://schemas.microsoft.com/office/drawing/2014/main" val="1470718876"/>
+                  </a:ext>
+                </a:extLst>
+              </a:tr>
+            </a:tbl>
+          </a:graphicData>
+        </a:graphic>
+      </p:graphicFrame>
+    </p:spTree>
+    <p:extLst>
+      <p:ext uri="{BB962C8B-B14F-4D97-AF65-F5344CB8AC3E}">
+        <p14:creationId xmlns:p14="http://schemas.microsoft.com/office/powerpoint/2010/main" val="2761170100"/>
+      </p:ext>
+    </p:extLst>
+  </p:cSld>
+  <p:clrMapOvr>
+    <a:masterClrMapping/>
+  </p:clrMapOvr>
+</p:sld>
+</file>
+
 <file path=ppt/slides/slide2.xml><?xml version="1.0" encoding="utf-8"?>
 <p:sld xmlns:a="http://schemas.openxmlformats.org/drawingml/2006/main" xmlns:r="http://schemas.openxmlformats.org/officeDocument/2006/relationships" xmlns:p="http://schemas.openxmlformats.org/presentationml/2006/main">
   <p:cSld>
@@ -4916,7 +6691,7 @@
                 <a14:useLocalDpi xmlns:a14="http://schemas.microsoft.com/office/drawing/2010/main" val="0"/>
               </a:ext>
               <a:ext uri="{96DAC541-7B7A-43D3-8B79-37D633B846F1}">
-                <asvg:svgBlip xmlns:asvg="http://schemas.microsoft.com/office/drawing/2016/SVG/main" r:embed="rId3"/>
+                <asvg:svgBlip xmlns:asvg="http://schemas.microsoft.com/office/drawing/2016/SVG/main" xmlns="" r:embed="rId3"/>
               </a:ext>
             </a:extLst>
           </a:blip>
@@ -5231,7 +7006,7 @@
                 <a14:useLocalDpi xmlns:a14="http://schemas.microsoft.com/office/drawing/2010/main" val="0"/>
               </a:ext>
               <a:ext uri="{96DAC541-7B7A-43D3-8B79-37D633B846F1}">
-                <asvg:svgBlip xmlns:asvg="http://schemas.microsoft.com/office/drawing/2016/SVG/main" r:embed="rId3"/>
+                <asvg:svgBlip xmlns:asvg="http://schemas.microsoft.com/office/drawing/2016/SVG/main" xmlns="" r:embed="rId3"/>
               </a:ext>
             </a:extLst>
           </a:blip>
@@ -5637,7 +7412,7 @@
                 <a14:useLocalDpi xmlns:a14="http://schemas.microsoft.com/office/drawing/2010/main" val="0"/>
               </a:ext>
               <a:ext uri="{96DAC541-7B7A-43D3-8B79-37D633B846F1}">
-                <asvg:svgBlip xmlns:asvg="http://schemas.microsoft.com/office/drawing/2016/SVG/main" r:embed="rId3"/>
+                <asvg:svgBlip xmlns:asvg="http://schemas.microsoft.com/office/drawing/2016/SVG/main" xmlns="" r:embed="rId3"/>
               </a:ext>
             </a:extLst>
           </a:blip>

</xml_diff>

<commit_message>
Add random forest part to deck
</commit_message>
<xml_diff>
--- a/ufo_presentation_v1.pptx
+++ b/ufo_presentation_v1.pptx
@@ -5,7 +5,7 @@
     <p:sldMasterId id="2147483660" r:id="rId1"/>
   </p:sldMasterIdLst>
   <p:notesMasterIdLst>
-    <p:notesMasterId r:id="rId16"/>
+    <p:notesMasterId r:id="rId19"/>
   </p:notesMasterIdLst>
   <p:sldIdLst>
     <p:sldId id="256" r:id="rId2"/>
@@ -19,9 +19,12 @@
     <p:sldId id="262" r:id="rId10"/>
     <p:sldId id="265" r:id="rId11"/>
     <p:sldId id="266" r:id="rId12"/>
-    <p:sldId id="267" r:id="rId13"/>
-    <p:sldId id="268" r:id="rId14"/>
-    <p:sldId id="269" r:id="rId15"/>
+    <p:sldId id="271" r:id="rId13"/>
+    <p:sldId id="272" r:id="rId14"/>
+    <p:sldId id="273" r:id="rId15"/>
+    <p:sldId id="268" r:id="rId16"/>
+    <p:sldId id="269" r:id="rId17"/>
+    <p:sldId id="270" r:id="rId18"/>
   </p:sldIdLst>
   <p:sldSz cx="12192000" cy="6858000"/>
   <p:notesSz cx="6858000" cy="9144000"/>
@@ -4642,66 +4645,6 @@
           </a:p>
         </p:txBody>
       </p:sp>
-      <p:pic>
-        <p:nvPicPr>
-          <p:cNvPr id="6" name="Picture 5">
-            <a:extLst>
-              <a:ext uri="{FF2B5EF4-FFF2-40B4-BE49-F238E27FC236}">
-                <a16:creationId xmlns:a16="http://schemas.microsoft.com/office/drawing/2014/main" id="{79063620-4283-4A42-9E4B-CB4A720EB53C}"/>
-              </a:ext>
-            </a:extLst>
-          </p:cNvPr>
-          <p:cNvPicPr>
-            <a:picLocks noChangeAspect="1"/>
-          </p:cNvPicPr>
-          <p:nvPr/>
-        </p:nvPicPr>
-        <p:blipFill>
-          <a:blip r:embed="rId2"/>
-          <a:stretch>
-            <a:fillRect/>
-          </a:stretch>
-        </p:blipFill>
-        <p:spPr>
-          <a:xfrm>
-            <a:off x="1838227" y="2360284"/>
-            <a:ext cx="2352675" cy="1590675"/>
-          </a:xfrm>
-          <a:prstGeom prst="rect">
-            <a:avLst/>
-          </a:prstGeom>
-        </p:spPr>
-      </p:pic>
-      <p:pic>
-        <p:nvPicPr>
-          <p:cNvPr id="7" name="Picture 6">
-            <a:extLst>
-              <a:ext uri="{FF2B5EF4-FFF2-40B4-BE49-F238E27FC236}">
-                <a16:creationId xmlns:a16="http://schemas.microsoft.com/office/drawing/2014/main" id="{7C0CC162-EC08-46DB-BC7A-2293DBB523C9}"/>
-              </a:ext>
-            </a:extLst>
-          </p:cNvPr>
-          <p:cNvPicPr>
-            <a:picLocks noChangeAspect="1"/>
-          </p:cNvPicPr>
-          <p:nvPr/>
-        </p:nvPicPr>
-        <p:blipFill>
-          <a:blip r:embed="rId3"/>
-          <a:stretch>
-            <a:fillRect/>
-          </a:stretch>
-        </p:blipFill>
-        <p:spPr>
-          <a:xfrm>
-            <a:off x="1838227" y="4464574"/>
-            <a:ext cx="6257925" cy="1638300"/>
-          </a:xfrm>
-          <a:prstGeom prst="rect">
-            <a:avLst/>
-          </a:prstGeom>
-        </p:spPr>
-      </p:pic>
       <p:sp>
         <p:nvSpPr>
           <p:cNvPr id="8" name="TextBox 7">
@@ -4716,7 +4659,7 @@
         </p:nvSpPr>
         <p:spPr>
           <a:xfrm>
-            <a:off x="7717997" y="1753702"/>
+            <a:off x="7717997" y="2316630"/>
             <a:ext cx="4062953" cy="1477328"/>
           </a:xfrm>
           <a:prstGeom prst="rect">
@@ -4787,7 +4730,7 @@
         </p:nvSpPr>
         <p:spPr>
           <a:xfrm>
-            <a:off x="7717998" y="3487837"/>
+            <a:off x="7717998" y="4050765"/>
             <a:ext cx="4062953" cy="1200329"/>
           </a:xfrm>
           <a:prstGeom prst="rect">
@@ -4835,6 +4778,2418 @@
           </a:p>
         </p:txBody>
       </p:sp>
+      <p:graphicFrame>
+        <p:nvGraphicFramePr>
+          <p:cNvPr id="2" name="Table 1">
+            <a:extLst>
+              <a:ext uri="{FF2B5EF4-FFF2-40B4-BE49-F238E27FC236}">
+                <a16:creationId xmlns:a16="http://schemas.microsoft.com/office/drawing/2014/main" id="{F0950AC4-64C5-4C3B-8FC8-B5FD5A0A1925}"/>
+              </a:ext>
+            </a:extLst>
+          </p:cNvPr>
+          <p:cNvGraphicFramePr>
+            <a:graphicFrameLocks noGrp="1"/>
+          </p:cNvGraphicFramePr>
+          <p:nvPr>
+            <p:extLst>
+              <p:ext uri="{D42A27DB-BD31-4B8C-83A1-F6EECF244321}">
+                <p14:modId xmlns:p14="http://schemas.microsoft.com/office/powerpoint/2010/main" val="3569908766"/>
+              </p:ext>
+            </p:extLst>
+          </p:nvPr>
+        </p:nvGraphicFramePr>
+        <p:xfrm>
+          <a:off x="1371600" y="4944973"/>
+          <a:ext cx="5839905" cy="1483360"/>
+        </p:xfrm>
+        <a:graphic>
+          <a:graphicData uri="http://schemas.openxmlformats.org/drawingml/2006/table">
+            <a:tbl>
+              <a:tblPr firstRow="1" bandRow="1">
+                <a:tableStyleId>{5C22544A-7EE6-4342-B048-85BDC9FD1C3A}</a:tableStyleId>
+              </a:tblPr>
+              <a:tblGrid>
+                <a:gridCol w="2129582">
+                  <a:extLst>
+                    <a:ext uri="{9D8B030D-6E8A-4147-A177-3AD203B41FA5}">
+                      <a16:colId xmlns:a16="http://schemas.microsoft.com/office/drawing/2014/main" val="1147175383"/>
+                    </a:ext>
+                  </a:extLst>
+                </a:gridCol>
+                <a:gridCol w="1153705">
+                  <a:extLst>
+                    <a:ext uri="{9D8B030D-6E8A-4147-A177-3AD203B41FA5}">
+                      <a16:colId xmlns:a16="http://schemas.microsoft.com/office/drawing/2014/main" val="1613692371"/>
+                    </a:ext>
+                  </a:extLst>
+                </a:gridCol>
+                <a:gridCol w="1078771">
+                  <a:extLst>
+                    <a:ext uri="{9D8B030D-6E8A-4147-A177-3AD203B41FA5}">
+                      <a16:colId xmlns:a16="http://schemas.microsoft.com/office/drawing/2014/main" val="3466944981"/>
+                    </a:ext>
+                  </a:extLst>
+                </a:gridCol>
+                <a:gridCol w="1477847">
+                  <a:extLst>
+                    <a:ext uri="{9D8B030D-6E8A-4147-A177-3AD203B41FA5}">
+                      <a16:colId xmlns:a16="http://schemas.microsoft.com/office/drawing/2014/main" val="1518426146"/>
+                    </a:ext>
+                  </a:extLst>
+                </a:gridCol>
+              </a:tblGrid>
+              <a:tr h="370840">
+                <a:tc>
+                  <a:txBody>
+                    <a:bodyPr/>
+                    <a:lstStyle/>
+                    <a:p>
+                      <a:pPr algn="ctr"/>
+                      <a:endParaRPr lang="en-US" dirty="0">
+                        <a:solidFill>
+                          <a:schemeClr val="accent4"/>
+                        </a:solidFill>
+                      </a:endParaRPr>
+                    </a:p>
+                  </a:txBody>
+                  <a:tcPr>
+                    <a:lnL w="12700" cmpd="sng">
+                      <a:noFill/>
+                    </a:lnL>
+                    <a:lnR w="38100" cap="flat" cmpd="sng" algn="ctr">
+                      <a:solidFill>
+                        <a:schemeClr val="tx2"/>
+                      </a:solidFill>
+                      <a:prstDash val="solid"/>
+                      <a:round/>
+                      <a:headEnd type="none" w="med" len="med"/>
+                      <a:tailEnd type="none" w="med" len="med"/>
+                    </a:lnR>
+                    <a:lnT w="12700" cmpd="sng">
+                      <a:noFill/>
+                    </a:lnT>
+                    <a:lnB w="38100" cap="flat" cmpd="sng" algn="ctr">
+                      <a:solidFill>
+                        <a:schemeClr val="tx2"/>
+                      </a:solidFill>
+                      <a:prstDash val="solid"/>
+                      <a:round/>
+                      <a:headEnd type="none" w="med" len="med"/>
+                      <a:tailEnd type="none" w="med" len="med"/>
+                    </a:lnB>
+                    <a:lnTlToBr w="12700" cmpd="sng">
+                      <a:noFill/>
+                      <a:prstDash val="solid"/>
+                    </a:lnTlToBr>
+                    <a:lnBlToTr w="12700" cmpd="sng">
+                      <a:noFill/>
+                      <a:prstDash val="solid"/>
+                    </a:lnBlToTr>
+                    <a:noFill/>
+                  </a:tcPr>
+                </a:tc>
+                <a:tc>
+                  <a:txBody>
+                    <a:bodyPr/>
+                    <a:lstStyle/>
+                    <a:p>
+                      <a:pPr algn="ctr"/>
+                      <a:r>
+                        <a:rPr lang="en-US" dirty="0">
+                          <a:solidFill>
+                            <a:schemeClr val="accent4"/>
+                          </a:solidFill>
+                        </a:rPr>
+                        <a:t>Precision</a:t>
+                      </a:r>
+                    </a:p>
+                  </a:txBody>
+                  <a:tcPr>
+                    <a:lnL w="38100" cap="flat" cmpd="sng" algn="ctr">
+                      <a:solidFill>
+                        <a:schemeClr val="tx2"/>
+                      </a:solidFill>
+                      <a:prstDash val="solid"/>
+                      <a:round/>
+                      <a:headEnd type="none" w="med" len="med"/>
+                      <a:tailEnd type="none" w="med" len="med"/>
+                    </a:lnL>
+                    <a:lnR w="38100" cap="flat" cmpd="sng" algn="ctr">
+                      <a:noFill/>
+                      <a:prstDash val="solid"/>
+                      <a:round/>
+                      <a:headEnd type="none" w="med" len="med"/>
+                      <a:tailEnd type="none" w="med" len="med"/>
+                    </a:lnR>
+                    <a:lnT w="12700" cmpd="sng">
+                      <a:noFill/>
+                    </a:lnT>
+                    <a:lnB w="38100" cap="flat" cmpd="sng" algn="ctr">
+                      <a:solidFill>
+                        <a:schemeClr val="tx2"/>
+                      </a:solidFill>
+                      <a:prstDash val="solid"/>
+                      <a:round/>
+                      <a:headEnd type="none" w="med" len="med"/>
+                      <a:tailEnd type="none" w="med" len="med"/>
+                    </a:lnB>
+                    <a:lnTlToBr w="12700" cmpd="sng">
+                      <a:noFill/>
+                      <a:prstDash val="solid"/>
+                    </a:lnTlToBr>
+                    <a:lnBlToTr w="12700" cmpd="sng">
+                      <a:noFill/>
+                      <a:prstDash val="solid"/>
+                    </a:lnBlToTr>
+                    <a:noFill/>
+                  </a:tcPr>
+                </a:tc>
+                <a:tc>
+                  <a:txBody>
+                    <a:bodyPr/>
+                    <a:lstStyle/>
+                    <a:p>
+                      <a:pPr algn="ctr"/>
+                      <a:r>
+                        <a:rPr lang="en-US" dirty="0">
+                          <a:solidFill>
+                            <a:schemeClr val="accent4"/>
+                          </a:solidFill>
+                        </a:rPr>
+                        <a:t>Recall</a:t>
+                      </a:r>
+                    </a:p>
+                  </a:txBody>
+                  <a:tcPr>
+                    <a:lnL w="38100" cap="flat" cmpd="sng" algn="ctr">
+                      <a:noFill/>
+                      <a:prstDash val="solid"/>
+                      <a:round/>
+                      <a:headEnd type="none" w="med" len="med"/>
+                      <a:tailEnd type="none" w="med" len="med"/>
+                    </a:lnL>
+                    <a:lnR w="38100" cap="flat" cmpd="sng" algn="ctr">
+                      <a:noFill/>
+                      <a:prstDash val="solid"/>
+                      <a:round/>
+                      <a:headEnd type="none" w="med" len="med"/>
+                      <a:tailEnd type="none" w="med" len="med"/>
+                    </a:lnR>
+                    <a:lnT w="12700" cmpd="sng">
+                      <a:noFill/>
+                    </a:lnT>
+                    <a:lnB w="38100" cap="flat" cmpd="sng" algn="ctr">
+                      <a:solidFill>
+                        <a:schemeClr val="tx2"/>
+                      </a:solidFill>
+                      <a:prstDash val="solid"/>
+                      <a:round/>
+                      <a:headEnd type="none" w="med" len="med"/>
+                      <a:tailEnd type="none" w="med" len="med"/>
+                    </a:lnB>
+                    <a:lnTlToBr w="12700" cmpd="sng">
+                      <a:noFill/>
+                      <a:prstDash val="solid"/>
+                    </a:lnTlToBr>
+                    <a:lnBlToTr w="12700" cmpd="sng">
+                      <a:noFill/>
+                      <a:prstDash val="solid"/>
+                    </a:lnBlToTr>
+                    <a:noFill/>
+                  </a:tcPr>
+                </a:tc>
+                <a:tc>
+                  <a:txBody>
+                    <a:bodyPr/>
+                    <a:lstStyle/>
+                    <a:p>
+                      <a:pPr algn="ctr"/>
+                      <a:r>
+                        <a:rPr lang="en-US" dirty="0">
+                          <a:solidFill>
+                            <a:schemeClr val="accent4"/>
+                          </a:solidFill>
+                        </a:rPr>
+                        <a:t>Support</a:t>
+                      </a:r>
+                    </a:p>
+                  </a:txBody>
+                  <a:tcPr>
+                    <a:lnL w="38100" cap="flat" cmpd="sng" algn="ctr">
+                      <a:noFill/>
+                      <a:prstDash val="solid"/>
+                      <a:round/>
+                      <a:headEnd type="none" w="med" len="med"/>
+                      <a:tailEnd type="none" w="med" len="med"/>
+                    </a:lnL>
+                    <a:lnR w="12700" cmpd="sng">
+                      <a:noFill/>
+                    </a:lnR>
+                    <a:lnT w="12700" cmpd="sng">
+                      <a:noFill/>
+                    </a:lnT>
+                    <a:lnB w="38100" cap="flat" cmpd="sng" algn="ctr">
+                      <a:solidFill>
+                        <a:schemeClr val="tx2"/>
+                      </a:solidFill>
+                      <a:prstDash val="solid"/>
+                      <a:round/>
+                      <a:headEnd type="none" w="med" len="med"/>
+                      <a:tailEnd type="none" w="med" len="med"/>
+                    </a:lnB>
+                    <a:lnTlToBr w="12700" cmpd="sng">
+                      <a:noFill/>
+                      <a:prstDash val="solid"/>
+                    </a:lnTlToBr>
+                    <a:lnBlToTr w="12700" cmpd="sng">
+                      <a:noFill/>
+                      <a:prstDash val="solid"/>
+                    </a:lnBlToTr>
+                    <a:noFill/>
+                  </a:tcPr>
+                </a:tc>
+                <a:extLst>
+                  <a:ext uri="{0D108BD9-81ED-4DB2-BD59-A6C34878D82A}">
+                    <a16:rowId xmlns:a16="http://schemas.microsoft.com/office/drawing/2014/main" val="106281018"/>
+                  </a:ext>
+                </a:extLst>
+              </a:tr>
+              <a:tr h="370840">
+                <a:tc>
+                  <a:txBody>
+                    <a:bodyPr/>
+                    <a:lstStyle/>
+                    <a:p>
+                      <a:pPr algn="ctr"/>
+                      <a:r>
+                        <a:rPr lang="en-US" b="1" dirty="0">
+                          <a:solidFill>
+                            <a:schemeClr val="accent4"/>
+                          </a:solidFill>
+                        </a:rPr>
+                        <a:t>0.0 (Unexplained)</a:t>
+                      </a:r>
+                    </a:p>
+                  </a:txBody>
+                  <a:tcPr>
+                    <a:lnL w="12700" cmpd="sng">
+                      <a:noFill/>
+                    </a:lnL>
+                    <a:lnR w="38100" cap="flat" cmpd="sng" algn="ctr">
+                      <a:solidFill>
+                        <a:schemeClr val="tx2"/>
+                      </a:solidFill>
+                      <a:prstDash val="solid"/>
+                      <a:round/>
+                      <a:headEnd type="none" w="med" len="med"/>
+                      <a:tailEnd type="none" w="med" len="med"/>
+                    </a:lnR>
+                    <a:lnT w="38100" cap="flat" cmpd="sng" algn="ctr">
+                      <a:solidFill>
+                        <a:schemeClr val="tx2"/>
+                      </a:solidFill>
+                      <a:prstDash val="solid"/>
+                      <a:round/>
+                      <a:headEnd type="none" w="med" len="med"/>
+                      <a:tailEnd type="none" w="med" len="med"/>
+                    </a:lnT>
+                    <a:lnB w="38100" cap="flat" cmpd="sng" algn="ctr">
+                      <a:noFill/>
+                      <a:prstDash val="solid"/>
+                      <a:round/>
+                      <a:headEnd type="none" w="med" len="med"/>
+                      <a:tailEnd type="none" w="med" len="med"/>
+                    </a:lnB>
+                    <a:lnTlToBr w="12700" cmpd="sng">
+                      <a:noFill/>
+                      <a:prstDash val="solid"/>
+                    </a:lnTlToBr>
+                    <a:lnBlToTr w="12700" cmpd="sng">
+                      <a:noFill/>
+                      <a:prstDash val="solid"/>
+                    </a:lnBlToTr>
+                    <a:noFill/>
+                  </a:tcPr>
+                </a:tc>
+                <a:tc>
+                  <a:txBody>
+                    <a:bodyPr/>
+                    <a:lstStyle/>
+                    <a:p>
+                      <a:pPr algn="ctr"/>
+                      <a:r>
+                        <a:rPr lang="en-US" dirty="0">
+                          <a:solidFill>
+                            <a:schemeClr val="accent4"/>
+                          </a:solidFill>
+                        </a:rPr>
+                        <a:t>0.97</a:t>
+                      </a:r>
+                    </a:p>
+                  </a:txBody>
+                  <a:tcPr>
+                    <a:lnL w="38100" cap="flat" cmpd="sng" algn="ctr">
+                      <a:solidFill>
+                        <a:schemeClr val="tx2"/>
+                      </a:solidFill>
+                      <a:prstDash val="solid"/>
+                      <a:round/>
+                      <a:headEnd type="none" w="med" len="med"/>
+                      <a:tailEnd type="none" w="med" len="med"/>
+                    </a:lnL>
+                    <a:lnR w="38100" cap="flat" cmpd="sng" algn="ctr">
+                      <a:noFill/>
+                      <a:prstDash val="solid"/>
+                      <a:round/>
+                      <a:headEnd type="none" w="med" len="med"/>
+                      <a:tailEnd type="none" w="med" len="med"/>
+                    </a:lnR>
+                    <a:lnT w="38100" cap="flat" cmpd="sng" algn="ctr">
+                      <a:solidFill>
+                        <a:schemeClr val="tx2"/>
+                      </a:solidFill>
+                      <a:prstDash val="solid"/>
+                      <a:round/>
+                      <a:headEnd type="none" w="med" len="med"/>
+                      <a:tailEnd type="none" w="med" len="med"/>
+                    </a:lnT>
+                    <a:lnB w="38100" cap="flat" cmpd="sng" algn="ctr">
+                      <a:noFill/>
+                      <a:prstDash val="solid"/>
+                      <a:round/>
+                      <a:headEnd type="none" w="med" len="med"/>
+                      <a:tailEnd type="none" w="med" len="med"/>
+                    </a:lnB>
+                    <a:lnTlToBr w="12700" cmpd="sng">
+                      <a:noFill/>
+                      <a:prstDash val="solid"/>
+                    </a:lnTlToBr>
+                    <a:lnBlToTr w="12700" cmpd="sng">
+                      <a:noFill/>
+                      <a:prstDash val="solid"/>
+                    </a:lnBlToTr>
+                    <a:noFill/>
+                  </a:tcPr>
+                </a:tc>
+                <a:tc>
+                  <a:txBody>
+                    <a:bodyPr/>
+                    <a:lstStyle/>
+                    <a:p>
+                      <a:pPr algn="ctr"/>
+                      <a:r>
+                        <a:rPr lang="en-US" dirty="0">
+                          <a:solidFill>
+                            <a:schemeClr val="accent4"/>
+                          </a:solidFill>
+                        </a:rPr>
+                        <a:t>1.00</a:t>
+                      </a:r>
+                    </a:p>
+                  </a:txBody>
+                  <a:tcPr>
+                    <a:lnL w="38100" cap="flat" cmpd="sng" algn="ctr">
+                      <a:noFill/>
+                      <a:prstDash val="solid"/>
+                      <a:round/>
+                      <a:headEnd type="none" w="med" len="med"/>
+                      <a:tailEnd type="none" w="med" len="med"/>
+                    </a:lnL>
+                    <a:lnR w="38100" cap="flat" cmpd="sng" algn="ctr">
+                      <a:noFill/>
+                      <a:prstDash val="solid"/>
+                      <a:round/>
+                      <a:headEnd type="none" w="med" len="med"/>
+                      <a:tailEnd type="none" w="med" len="med"/>
+                    </a:lnR>
+                    <a:lnT w="38100" cap="flat" cmpd="sng" algn="ctr">
+                      <a:solidFill>
+                        <a:schemeClr val="tx2"/>
+                      </a:solidFill>
+                      <a:prstDash val="solid"/>
+                      <a:round/>
+                      <a:headEnd type="none" w="med" len="med"/>
+                      <a:tailEnd type="none" w="med" len="med"/>
+                    </a:lnT>
+                    <a:lnB w="38100" cap="flat" cmpd="sng" algn="ctr">
+                      <a:noFill/>
+                      <a:prstDash val="solid"/>
+                      <a:round/>
+                      <a:headEnd type="none" w="med" len="med"/>
+                      <a:tailEnd type="none" w="med" len="med"/>
+                    </a:lnB>
+                    <a:lnTlToBr w="12700" cmpd="sng">
+                      <a:noFill/>
+                      <a:prstDash val="solid"/>
+                    </a:lnTlToBr>
+                    <a:lnBlToTr w="12700" cmpd="sng">
+                      <a:noFill/>
+                      <a:prstDash val="solid"/>
+                    </a:lnBlToTr>
+                    <a:noFill/>
+                  </a:tcPr>
+                </a:tc>
+                <a:tc>
+                  <a:txBody>
+                    <a:bodyPr/>
+                    <a:lstStyle/>
+                    <a:p>
+                      <a:pPr algn="ctr"/>
+                      <a:r>
+                        <a:rPr lang="en-US" dirty="0">
+                          <a:solidFill>
+                            <a:schemeClr val="accent4"/>
+                          </a:solidFill>
+                        </a:rPr>
+                        <a:t>28,786</a:t>
+                      </a:r>
+                    </a:p>
+                  </a:txBody>
+                  <a:tcPr>
+                    <a:lnL w="38100" cap="flat" cmpd="sng" algn="ctr">
+                      <a:noFill/>
+                      <a:prstDash val="solid"/>
+                      <a:round/>
+                      <a:headEnd type="none" w="med" len="med"/>
+                      <a:tailEnd type="none" w="med" len="med"/>
+                    </a:lnL>
+                    <a:lnR w="12700" cmpd="sng">
+                      <a:noFill/>
+                    </a:lnR>
+                    <a:lnT w="38100" cap="flat" cmpd="sng" algn="ctr">
+                      <a:solidFill>
+                        <a:schemeClr val="tx2"/>
+                      </a:solidFill>
+                      <a:prstDash val="solid"/>
+                      <a:round/>
+                      <a:headEnd type="none" w="med" len="med"/>
+                      <a:tailEnd type="none" w="med" len="med"/>
+                    </a:lnT>
+                    <a:lnB w="38100" cap="flat" cmpd="sng" algn="ctr">
+                      <a:noFill/>
+                      <a:prstDash val="solid"/>
+                      <a:round/>
+                      <a:headEnd type="none" w="med" len="med"/>
+                      <a:tailEnd type="none" w="med" len="med"/>
+                    </a:lnB>
+                    <a:lnTlToBr w="12700" cmpd="sng">
+                      <a:noFill/>
+                      <a:prstDash val="solid"/>
+                    </a:lnTlToBr>
+                    <a:lnBlToTr w="12700" cmpd="sng">
+                      <a:noFill/>
+                      <a:prstDash val="solid"/>
+                    </a:lnBlToTr>
+                    <a:noFill/>
+                  </a:tcPr>
+                </a:tc>
+                <a:extLst>
+                  <a:ext uri="{0D108BD9-81ED-4DB2-BD59-A6C34878D82A}">
+                    <a16:rowId xmlns:a16="http://schemas.microsoft.com/office/drawing/2014/main" val="1154221453"/>
+                  </a:ext>
+                </a:extLst>
+              </a:tr>
+              <a:tr h="370840">
+                <a:tc>
+                  <a:txBody>
+                    <a:bodyPr/>
+                    <a:lstStyle/>
+                    <a:p>
+                      <a:pPr algn="ctr"/>
+                      <a:r>
+                        <a:rPr lang="en-US" b="1" dirty="0">
+                          <a:solidFill>
+                            <a:schemeClr val="accent4"/>
+                          </a:solidFill>
+                        </a:rPr>
+                        <a:t>1.0 (Explained)</a:t>
+                      </a:r>
+                    </a:p>
+                  </a:txBody>
+                  <a:tcPr>
+                    <a:lnL w="12700" cmpd="sng">
+                      <a:noFill/>
+                    </a:lnL>
+                    <a:lnR w="38100" cap="flat" cmpd="sng" algn="ctr">
+                      <a:solidFill>
+                        <a:schemeClr val="tx2"/>
+                      </a:solidFill>
+                      <a:prstDash val="solid"/>
+                      <a:round/>
+                      <a:headEnd type="none" w="med" len="med"/>
+                      <a:tailEnd type="none" w="med" len="med"/>
+                    </a:lnR>
+                    <a:lnT w="38100" cap="flat" cmpd="sng" algn="ctr">
+                      <a:noFill/>
+                      <a:prstDash val="solid"/>
+                      <a:round/>
+                      <a:headEnd type="none" w="med" len="med"/>
+                      <a:tailEnd type="none" w="med" len="med"/>
+                    </a:lnT>
+                    <a:lnB w="38100" cap="flat" cmpd="sng" algn="ctr">
+                      <a:noFill/>
+                      <a:prstDash val="solid"/>
+                      <a:round/>
+                      <a:headEnd type="none" w="med" len="med"/>
+                      <a:tailEnd type="none" w="med" len="med"/>
+                    </a:lnB>
+                    <a:lnTlToBr w="12700" cmpd="sng">
+                      <a:noFill/>
+                      <a:prstDash val="solid"/>
+                    </a:lnTlToBr>
+                    <a:lnBlToTr w="12700" cmpd="sng">
+                      <a:noFill/>
+                      <a:prstDash val="solid"/>
+                    </a:lnBlToTr>
+                    <a:noFill/>
+                  </a:tcPr>
+                </a:tc>
+                <a:tc>
+                  <a:txBody>
+                    <a:bodyPr/>
+                    <a:lstStyle/>
+                    <a:p>
+                      <a:pPr algn="ctr"/>
+                      <a:r>
+                        <a:rPr lang="en-US" dirty="0">
+                          <a:solidFill>
+                            <a:schemeClr val="accent4"/>
+                          </a:solidFill>
+                        </a:rPr>
+                        <a:t>0.72</a:t>
+                      </a:r>
+                    </a:p>
+                  </a:txBody>
+                  <a:tcPr>
+                    <a:lnL w="38100" cap="flat" cmpd="sng" algn="ctr">
+                      <a:solidFill>
+                        <a:schemeClr val="tx2"/>
+                      </a:solidFill>
+                      <a:prstDash val="solid"/>
+                      <a:round/>
+                      <a:headEnd type="none" w="med" len="med"/>
+                      <a:tailEnd type="none" w="med" len="med"/>
+                    </a:lnL>
+                    <a:lnR w="38100" cap="flat" cmpd="sng" algn="ctr">
+                      <a:noFill/>
+                      <a:prstDash val="solid"/>
+                      <a:round/>
+                      <a:headEnd type="none" w="med" len="med"/>
+                      <a:tailEnd type="none" w="med" len="med"/>
+                    </a:lnR>
+                    <a:lnT w="38100" cap="flat" cmpd="sng" algn="ctr">
+                      <a:noFill/>
+                      <a:prstDash val="solid"/>
+                      <a:round/>
+                      <a:headEnd type="none" w="med" len="med"/>
+                      <a:tailEnd type="none" w="med" len="med"/>
+                    </a:lnT>
+                    <a:lnB w="38100" cap="flat" cmpd="sng" algn="ctr">
+                      <a:noFill/>
+                      <a:prstDash val="solid"/>
+                      <a:round/>
+                      <a:headEnd type="none" w="med" len="med"/>
+                      <a:tailEnd type="none" w="med" len="med"/>
+                    </a:lnB>
+                    <a:lnTlToBr w="12700" cmpd="sng">
+                      <a:noFill/>
+                      <a:prstDash val="solid"/>
+                    </a:lnTlToBr>
+                    <a:lnBlToTr w="12700" cmpd="sng">
+                      <a:noFill/>
+                      <a:prstDash val="solid"/>
+                    </a:lnBlToTr>
+                    <a:noFill/>
+                  </a:tcPr>
+                </a:tc>
+                <a:tc>
+                  <a:txBody>
+                    <a:bodyPr/>
+                    <a:lstStyle/>
+                    <a:p>
+                      <a:pPr algn="ctr"/>
+                      <a:r>
+                        <a:rPr lang="en-US" dirty="0">
+                          <a:solidFill>
+                            <a:schemeClr val="accent4"/>
+                          </a:solidFill>
+                        </a:rPr>
+                        <a:t>0.11</a:t>
+                      </a:r>
+                    </a:p>
+                  </a:txBody>
+                  <a:tcPr>
+                    <a:lnL w="38100" cap="flat" cmpd="sng" algn="ctr">
+                      <a:noFill/>
+                      <a:prstDash val="solid"/>
+                      <a:round/>
+                      <a:headEnd type="none" w="med" len="med"/>
+                      <a:tailEnd type="none" w="med" len="med"/>
+                    </a:lnL>
+                    <a:lnR w="38100" cap="flat" cmpd="sng" algn="ctr">
+                      <a:noFill/>
+                      <a:prstDash val="solid"/>
+                      <a:round/>
+                      <a:headEnd type="none" w="med" len="med"/>
+                      <a:tailEnd type="none" w="med" len="med"/>
+                    </a:lnR>
+                    <a:lnT w="38100" cap="flat" cmpd="sng" algn="ctr">
+                      <a:noFill/>
+                      <a:prstDash val="solid"/>
+                      <a:round/>
+                      <a:headEnd type="none" w="med" len="med"/>
+                      <a:tailEnd type="none" w="med" len="med"/>
+                    </a:lnT>
+                    <a:lnB w="38100" cap="flat" cmpd="sng" algn="ctr">
+                      <a:noFill/>
+                      <a:prstDash val="solid"/>
+                      <a:round/>
+                      <a:headEnd type="none" w="med" len="med"/>
+                      <a:tailEnd type="none" w="med" len="med"/>
+                    </a:lnB>
+                    <a:lnTlToBr w="12700" cmpd="sng">
+                      <a:noFill/>
+                      <a:prstDash val="solid"/>
+                    </a:lnTlToBr>
+                    <a:lnBlToTr w="12700" cmpd="sng">
+                      <a:noFill/>
+                      <a:prstDash val="solid"/>
+                    </a:lnBlToTr>
+                    <a:noFill/>
+                  </a:tcPr>
+                </a:tc>
+                <a:tc>
+                  <a:txBody>
+                    <a:bodyPr/>
+                    <a:lstStyle/>
+                    <a:p>
+                      <a:pPr algn="ctr"/>
+                      <a:r>
+                        <a:rPr lang="en-US" dirty="0">
+                          <a:solidFill>
+                            <a:schemeClr val="accent4"/>
+                          </a:solidFill>
+                        </a:rPr>
+                        <a:t>1,055</a:t>
+                      </a:r>
+                    </a:p>
+                  </a:txBody>
+                  <a:tcPr>
+                    <a:lnL w="38100" cap="flat" cmpd="sng" algn="ctr">
+                      <a:noFill/>
+                      <a:prstDash val="solid"/>
+                      <a:round/>
+                      <a:headEnd type="none" w="med" len="med"/>
+                      <a:tailEnd type="none" w="med" len="med"/>
+                    </a:lnL>
+                    <a:lnR w="12700" cmpd="sng">
+                      <a:noFill/>
+                    </a:lnR>
+                    <a:lnT w="38100" cap="flat" cmpd="sng" algn="ctr">
+                      <a:noFill/>
+                      <a:prstDash val="solid"/>
+                      <a:round/>
+                      <a:headEnd type="none" w="med" len="med"/>
+                      <a:tailEnd type="none" w="med" len="med"/>
+                    </a:lnT>
+                    <a:lnB w="38100" cap="flat" cmpd="sng" algn="ctr">
+                      <a:noFill/>
+                      <a:prstDash val="solid"/>
+                      <a:round/>
+                      <a:headEnd type="none" w="med" len="med"/>
+                      <a:tailEnd type="none" w="med" len="med"/>
+                    </a:lnB>
+                    <a:lnTlToBr w="12700" cmpd="sng">
+                      <a:noFill/>
+                      <a:prstDash val="solid"/>
+                    </a:lnTlToBr>
+                    <a:lnBlToTr w="12700" cmpd="sng">
+                      <a:noFill/>
+                      <a:prstDash val="solid"/>
+                    </a:lnBlToTr>
+                    <a:noFill/>
+                  </a:tcPr>
+                </a:tc>
+                <a:extLst>
+                  <a:ext uri="{0D108BD9-81ED-4DB2-BD59-A6C34878D82A}">
+                    <a16:rowId xmlns:a16="http://schemas.microsoft.com/office/drawing/2014/main" val="562113962"/>
+                  </a:ext>
+                </a:extLst>
+              </a:tr>
+              <a:tr h="370840">
+                <a:tc>
+                  <a:txBody>
+                    <a:bodyPr/>
+                    <a:lstStyle/>
+                    <a:p>
+                      <a:pPr algn="ctr"/>
+                      <a:r>
+                        <a:rPr lang="en-US" b="1" dirty="0">
+                          <a:solidFill>
+                            <a:schemeClr val="accent4"/>
+                          </a:solidFill>
+                        </a:rPr>
+                        <a:t>Avg/Total</a:t>
+                      </a:r>
+                    </a:p>
+                  </a:txBody>
+                  <a:tcPr>
+                    <a:lnL w="12700" cmpd="sng">
+                      <a:noFill/>
+                    </a:lnL>
+                    <a:lnR w="38100" cap="flat" cmpd="sng" algn="ctr">
+                      <a:solidFill>
+                        <a:schemeClr val="tx2"/>
+                      </a:solidFill>
+                      <a:prstDash val="solid"/>
+                      <a:round/>
+                      <a:headEnd type="none" w="med" len="med"/>
+                      <a:tailEnd type="none" w="med" len="med"/>
+                    </a:lnR>
+                    <a:lnT w="38100" cap="flat" cmpd="sng" algn="ctr">
+                      <a:noFill/>
+                      <a:prstDash val="solid"/>
+                      <a:round/>
+                      <a:headEnd type="none" w="med" len="med"/>
+                      <a:tailEnd type="none" w="med" len="med"/>
+                    </a:lnT>
+                    <a:lnB w="12700" cmpd="sng">
+                      <a:noFill/>
+                    </a:lnB>
+                    <a:lnTlToBr w="12700" cmpd="sng">
+                      <a:noFill/>
+                      <a:prstDash val="solid"/>
+                    </a:lnTlToBr>
+                    <a:lnBlToTr w="12700" cmpd="sng">
+                      <a:noFill/>
+                      <a:prstDash val="solid"/>
+                    </a:lnBlToTr>
+                    <a:noFill/>
+                  </a:tcPr>
+                </a:tc>
+                <a:tc>
+                  <a:txBody>
+                    <a:bodyPr/>
+                    <a:lstStyle/>
+                    <a:p>
+                      <a:pPr algn="ctr"/>
+                      <a:r>
+                        <a:rPr lang="en-US" dirty="0">
+                          <a:solidFill>
+                            <a:schemeClr val="accent4"/>
+                          </a:solidFill>
+                        </a:rPr>
+                        <a:t>0.96</a:t>
+                      </a:r>
+                    </a:p>
+                  </a:txBody>
+                  <a:tcPr>
+                    <a:lnL w="38100" cap="flat" cmpd="sng" algn="ctr">
+                      <a:solidFill>
+                        <a:schemeClr val="tx2"/>
+                      </a:solidFill>
+                      <a:prstDash val="solid"/>
+                      <a:round/>
+                      <a:headEnd type="none" w="med" len="med"/>
+                      <a:tailEnd type="none" w="med" len="med"/>
+                    </a:lnL>
+                    <a:lnR w="38100" cap="flat" cmpd="sng" algn="ctr">
+                      <a:noFill/>
+                      <a:prstDash val="solid"/>
+                      <a:round/>
+                      <a:headEnd type="none" w="med" len="med"/>
+                      <a:tailEnd type="none" w="med" len="med"/>
+                    </a:lnR>
+                    <a:lnT w="38100" cap="flat" cmpd="sng" algn="ctr">
+                      <a:noFill/>
+                      <a:prstDash val="solid"/>
+                      <a:round/>
+                      <a:headEnd type="none" w="med" len="med"/>
+                      <a:tailEnd type="none" w="med" len="med"/>
+                    </a:lnT>
+                    <a:lnB w="12700" cmpd="sng">
+                      <a:noFill/>
+                    </a:lnB>
+                    <a:lnTlToBr w="12700" cmpd="sng">
+                      <a:noFill/>
+                      <a:prstDash val="solid"/>
+                    </a:lnTlToBr>
+                    <a:lnBlToTr w="12700" cmpd="sng">
+                      <a:noFill/>
+                      <a:prstDash val="solid"/>
+                    </a:lnBlToTr>
+                    <a:noFill/>
+                  </a:tcPr>
+                </a:tc>
+                <a:tc>
+                  <a:txBody>
+                    <a:bodyPr/>
+                    <a:lstStyle/>
+                    <a:p>
+                      <a:pPr algn="ctr"/>
+                      <a:r>
+                        <a:rPr lang="en-US" dirty="0">
+                          <a:solidFill>
+                            <a:schemeClr val="accent4"/>
+                          </a:solidFill>
+                        </a:rPr>
+                        <a:t>0.97</a:t>
+                      </a:r>
+                    </a:p>
+                  </a:txBody>
+                  <a:tcPr>
+                    <a:lnL w="38100" cap="flat" cmpd="sng" algn="ctr">
+                      <a:noFill/>
+                      <a:prstDash val="solid"/>
+                      <a:round/>
+                      <a:headEnd type="none" w="med" len="med"/>
+                      <a:tailEnd type="none" w="med" len="med"/>
+                    </a:lnL>
+                    <a:lnR w="38100" cap="flat" cmpd="sng" algn="ctr">
+                      <a:noFill/>
+                      <a:prstDash val="solid"/>
+                      <a:round/>
+                      <a:headEnd type="none" w="med" len="med"/>
+                      <a:tailEnd type="none" w="med" len="med"/>
+                    </a:lnR>
+                    <a:lnT w="38100" cap="flat" cmpd="sng" algn="ctr">
+                      <a:noFill/>
+                      <a:prstDash val="solid"/>
+                      <a:round/>
+                      <a:headEnd type="none" w="med" len="med"/>
+                      <a:tailEnd type="none" w="med" len="med"/>
+                    </a:lnT>
+                    <a:lnB w="12700" cmpd="sng">
+                      <a:noFill/>
+                    </a:lnB>
+                    <a:lnTlToBr w="12700" cmpd="sng">
+                      <a:noFill/>
+                      <a:prstDash val="solid"/>
+                    </a:lnTlToBr>
+                    <a:lnBlToTr w="12700" cmpd="sng">
+                      <a:noFill/>
+                      <a:prstDash val="solid"/>
+                    </a:lnBlToTr>
+                    <a:noFill/>
+                  </a:tcPr>
+                </a:tc>
+                <a:tc>
+                  <a:txBody>
+                    <a:bodyPr/>
+                    <a:lstStyle/>
+                    <a:p>
+                      <a:pPr algn="ctr"/>
+                      <a:r>
+                        <a:rPr lang="en-US" dirty="0">
+                          <a:solidFill>
+                            <a:schemeClr val="accent4"/>
+                          </a:solidFill>
+                        </a:rPr>
+                        <a:t>29,841</a:t>
+                      </a:r>
+                    </a:p>
+                  </a:txBody>
+                  <a:tcPr>
+                    <a:lnL w="38100" cap="flat" cmpd="sng" algn="ctr">
+                      <a:noFill/>
+                      <a:prstDash val="solid"/>
+                      <a:round/>
+                      <a:headEnd type="none" w="med" len="med"/>
+                      <a:tailEnd type="none" w="med" len="med"/>
+                    </a:lnL>
+                    <a:lnR w="12700" cmpd="sng">
+                      <a:noFill/>
+                    </a:lnR>
+                    <a:lnT w="38100" cap="flat" cmpd="sng" algn="ctr">
+                      <a:noFill/>
+                      <a:prstDash val="solid"/>
+                      <a:round/>
+                      <a:headEnd type="none" w="med" len="med"/>
+                      <a:tailEnd type="none" w="med" len="med"/>
+                    </a:lnT>
+                    <a:lnB w="12700" cmpd="sng">
+                      <a:noFill/>
+                    </a:lnB>
+                    <a:lnTlToBr w="12700" cmpd="sng">
+                      <a:noFill/>
+                      <a:prstDash val="solid"/>
+                    </a:lnTlToBr>
+                    <a:lnBlToTr w="12700" cmpd="sng">
+                      <a:noFill/>
+                      <a:prstDash val="solid"/>
+                    </a:lnBlToTr>
+                    <a:noFill/>
+                  </a:tcPr>
+                </a:tc>
+                <a:extLst>
+                  <a:ext uri="{0D108BD9-81ED-4DB2-BD59-A6C34878D82A}">
+                    <a16:rowId xmlns:a16="http://schemas.microsoft.com/office/drawing/2014/main" val="2376074334"/>
+                  </a:ext>
+                </a:extLst>
+              </a:tr>
+            </a:tbl>
+          </a:graphicData>
+        </a:graphic>
+      </p:graphicFrame>
+      <p:graphicFrame>
+        <p:nvGraphicFramePr>
+          <p:cNvPr id="10" name="Table 9">
+            <a:extLst>
+              <a:ext uri="{FF2B5EF4-FFF2-40B4-BE49-F238E27FC236}">
+                <a16:creationId xmlns:a16="http://schemas.microsoft.com/office/drawing/2014/main" id="{7F4B2B30-778B-41FE-A95F-CAC2F8257FDC}"/>
+              </a:ext>
+            </a:extLst>
+          </p:cNvPr>
+          <p:cNvGraphicFramePr>
+            <a:graphicFrameLocks noGrp="1"/>
+          </p:cNvGraphicFramePr>
+          <p:nvPr>
+            <p:extLst>
+              <p:ext uri="{D42A27DB-BD31-4B8C-83A1-F6EECF244321}">
+                <p14:modId xmlns:p14="http://schemas.microsoft.com/office/powerpoint/2010/main" val="4138010748"/>
+              </p:ext>
+            </p:extLst>
+          </p:nvPr>
+        </p:nvGraphicFramePr>
+        <p:xfrm>
+          <a:off x="1613996" y="2316630"/>
+          <a:ext cx="5118754" cy="1828800"/>
+        </p:xfrm>
+        <a:graphic>
+          <a:graphicData uri="http://schemas.openxmlformats.org/drawingml/2006/table">
+            <a:tbl>
+              <a:tblPr firstRow="1" bandRow="1">
+                <a:tableStyleId>{5C22544A-7EE6-4342-B048-85BDC9FD1C3A}</a:tableStyleId>
+              </a:tblPr>
+              <a:tblGrid>
+                <a:gridCol w="1111336">
+                  <a:extLst>
+                    <a:ext uri="{9D8B030D-6E8A-4147-A177-3AD203B41FA5}">
+                      <a16:colId xmlns:a16="http://schemas.microsoft.com/office/drawing/2014/main" val="1147175383"/>
+                    </a:ext>
+                  </a:extLst>
+                </a:gridCol>
+                <a:gridCol w="760170">
+                  <a:extLst>
+                    <a:ext uri="{9D8B030D-6E8A-4147-A177-3AD203B41FA5}">
+                      <a16:colId xmlns:a16="http://schemas.microsoft.com/office/drawing/2014/main" val="335993404"/>
+                    </a:ext>
+                  </a:extLst>
+                </a:gridCol>
+                <a:gridCol w="1006339">
+                  <a:extLst>
+                    <a:ext uri="{9D8B030D-6E8A-4147-A177-3AD203B41FA5}">
+                      <a16:colId xmlns:a16="http://schemas.microsoft.com/office/drawing/2014/main" val="1613692371"/>
+                    </a:ext>
+                  </a:extLst>
+                </a:gridCol>
+                <a:gridCol w="945557">
+                  <a:extLst>
+                    <a:ext uri="{9D8B030D-6E8A-4147-A177-3AD203B41FA5}">
+                      <a16:colId xmlns:a16="http://schemas.microsoft.com/office/drawing/2014/main" val="3466944981"/>
+                    </a:ext>
+                  </a:extLst>
+                </a:gridCol>
+                <a:gridCol w="1295352">
+                  <a:extLst>
+                    <a:ext uri="{9D8B030D-6E8A-4147-A177-3AD203B41FA5}">
+                      <a16:colId xmlns:a16="http://schemas.microsoft.com/office/drawing/2014/main" val="1518426146"/>
+                    </a:ext>
+                  </a:extLst>
+                </a:gridCol>
+              </a:tblGrid>
+              <a:tr h="318135">
+                <a:tc gridSpan="2">
+                  <a:txBody>
+                    <a:bodyPr/>
+                    <a:lstStyle/>
+                    <a:p>
+                      <a:pPr algn="ctr"/>
+                      <a:endParaRPr lang="en-US" dirty="0">
+                        <a:solidFill>
+                          <a:schemeClr val="accent4"/>
+                        </a:solidFill>
+                      </a:endParaRPr>
+                    </a:p>
+                  </a:txBody>
+                  <a:tcPr>
+                    <a:lnL w="38100" cap="flat" cmpd="sng" algn="ctr">
+                      <a:noFill/>
+                      <a:prstDash val="solid"/>
+                      <a:round/>
+                      <a:headEnd type="none" w="med" len="med"/>
+                      <a:tailEnd type="none" w="med" len="med"/>
+                    </a:lnL>
+                    <a:lnR w="38100" cap="flat" cmpd="sng" algn="ctr">
+                      <a:solidFill>
+                        <a:schemeClr val="tx2"/>
+                      </a:solidFill>
+                      <a:prstDash val="solid"/>
+                      <a:round/>
+                      <a:headEnd type="none" w="med" len="med"/>
+                      <a:tailEnd type="none" w="med" len="med"/>
+                    </a:lnR>
+                    <a:lnT w="12700" cmpd="sng">
+                      <a:noFill/>
+                    </a:lnT>
+                    <a:lnB w="38100" cap="flat" cmpd="sng" algn="ctr">
+                      <a:noFill/>
+                      <a:prstDash val="solid"/>
+                      <a:round/>
+                      <a:headEnd type="none" w="med" len="med"/>
+                      <a:tailEnd type="none" w="med" len="med"/>
+                    </a:lnB>
+                    <a:lnTlToBr w="12700" cmpd="sng">
+                      <a:noFill/>
+                      <a:prstDash val="solid"/>
+                    </a:lnTlToBr>
+                    <a:lnBlToTr w="12700" cmpd="sng">
+                      <a:noFill/>
+                      <a:prstDash val="solid"/>
+                    </a:lnBlToTr>
+                    <a:noFill/>
+                  </a:tcPr>
+                </a:tc>
+                <a:tc hMerge="1">
+                  <a:txBody>
+                    <a:bodyPr/>
+                    <a:lstStyle/>
+                    <a:p>
+                      <a:endParaRPr lang="en-US"/>
+                    </a:p>
+                  </a:txBody>
+                  <a:tcPr/>
+                </a:tc>
+                <a:tc gridSpan="3">
+                  <a:txBody>
+                    <a:bodyPr/>
+                    <a:lstStyle/>
+                    <a:p>
+                      <a:pPr algn="ctr"/>
+                      <a:r>
+                        <a:rPr lang="en-US" dirty="0">
+                          <a:solidFill>
+                            <a:schemeClr val="accent4"/>
+                          </a:solidFill>
+                        </a:rPr>
+                        <a:t>Prediction</a:t>
+                      </a:r>
+                    </a:p>
+                  </a:txBody>
+                  <a:tcPr>
+                    <a:lnL w="38100" cap="flat" cmpd="sng" algn="ctr">
+                      <a:solidFill>
+                        <a:schemeClr val="tx2"/>
+                      </a:solidFill>
+                      <a:prstDash val="solid"/>
+                      <a:round/>
+                      <a:headEnd type="none" w="med" len="med"/>
+                      <a:tailEnd type="none" w="med" len="med"/>
+                    </a:lnL>
+                    <a:lnR w="38100" cap="flat" cmpd="sng" algn="ctr">
+                      <a:noFill/>
+                      <a:prstDash val="solid"/>
+                      <a:round/>
+                      <a:headEnd type="none" w="med" len="med"/>
+                      <a:tailEnd type="none" w="med" len="med"/>
+                    </a:lnR>
+                    <a:lnT w="12700" cmpd="sng">
+                      <a:noFill/>
+                    </a:lnT>
+                    <a:lnB w="38100" cap="flat" cmpd="sng" algn="ctr">
+                      <a:noFill/>
+                      <a:prstDash val="solid"/>
+                      <a:round/>
+                      <a:headEnd type="none" w="med" len="med"/>
+                      <a:tailEnd type="none" w="med" len="med"/>
+                    </a:lnB>
+                    <a:lnTlToBr w="12700" cmpd="sng">
+                      <a:noFill/>
+                      <a:prstDash val="solid"/>
+                    </a:lnTlToBr>
+                    <a:lnBlToTr w="12700" cmpd="sng">
+                      <a:noFill/>
+                      <a:prstDash val="solid"/>
+                    </a:lnBlToTr>
+                    <a:noFill/>
+                  </a:tcPr>
+                </a:tc>
+                <a:tc hMerge="1">
+                  <a:txBody>
+                    <a:bodyPr/>
+                    <a:lstStyle/>
+                    <a:p>
+                      <a:pPr algn="ctr"/>
+                      <a:endParaRPr lang="en-US" dirty="0">
+                        <a:solidFill>
+                          <a:schemeClr val="accent4"/>
+                        </a:solidFill>
+                      </a:endParaRPr>
+                    </a:p>
+                  </a:txBody>
+                  <a:tcPr>
+                    <a:lnL w="38100" cap="flat" cmpd="sng" algn="ctr">
+                      <a:noFill/>
+                      <a:prstDash val="solid"/>
+                      <a:round/>
+                      <a:headEnd type="none" w="med" len="med"/>
+                      <a:tailEnd type="none" w="med" len="med"/>
+                    </a:lnL>
+                    <a:lnR w="38100" cap="flat" cmpd="sng" algn="ctr">
+                      <a:noFill/>
+                      <a:prstDash val="solid"/>
+                      <a:round/>
+                      <a:headEnd type="none" w="med" len="med"/>
+                      <a:tailEnd type="none" w="med" len="med"/>
+                    </a:lnR>
+                    <a:lnT w="12700" cmpd="sng">
+                      <a:noFill/>
+                    </a:lnT>
+                    <a:lnB w="38100" cap="flat" cmpd="sng" algn="ctr">
+                      <a:noFill/>
+                      <a:prstDash val="solid"/>
+                      <a:round/>
+                      <a:headEnd type="none" w="med" len="med"/>
+                      <a:tailEnd type="none" w="med" len="med"/>
+                    </a:lnB>
+                    <a:lnTlToBr w="12700" cmpd="sng">
+                      <a:noFill/>
+                      <a:prstDash val="solid"/>
+                    </a:lnTlToBr>
+                    <a:lnBlToTr w="12700" cmpd="sng">
+                      <a:noFill/>
+                      <a:prstDash val="solid"/>
+                    </a:lnBlToTr>
+                    <a:noFill/>
+                  </a:tcPr>
+                </a:tc>
+                <a:tc hMerge="1">
+                  <a:txBody>
+                    <a:bodyPr/>
+                    <a:lstStyle/>
+                    <a:p>
+                      <a:pPr algn="ctr"/>
+                      <a:endParaRPr lang="en-US" dirty="0">
+                        <a:solidFill>
+                          <a:schemeClr val="accent4"/>
+                        </a:solidFill>
+                      </a:endParaRPr>
+                    </a:p>
+                  </a:txBody>
+                  <a:tcPr>
+                    <a:lnL w="38100" cap="flat" cmpd="sng" algn="ctr">
+                      <a:noFill/>
+                      <a:prstDash val="solid"/>
+                      <a:round/>
+                      <a:headEnd type="none" w="med" len="med"/>
+                      <a:tailEnd type="none" w="med" len="med"/>
+                    </a:lnL>
+                    <a:lnR w="12700" cmpd="sng">
+                      <a:noFill/>
+                    </a:lnR>
+                    <a:lnT w="12700" cmpd="sng">
+                      <a:noFill/>
+                    </a:lnT>
+                    <a:lnB w="38100" cap="flat" cmpd="sng" algn="ctr">
+                      <a:noFill/>
+                      <a:prstDash val="solid"/>
+                      <a:round/>
+                      <a:headEnd type="none" w="med" len="med"/>
+                      <a:tailEnd type="none" w="med" len="med"/>
+                    </a:lnB>
+                    <a:lnTlToBr w="12700" cmpd="sng">
+                      <a:noFill/>
+                      <a:prstDash val="solid"/>
+                    </a:lnTlToBr>
+                    <a:lnBlToTr w="12700" cmpd="sng">
+                      <a:noFill/>
+                      <a:prstDash val="solid"/>
+                    </a:lnBlToTr>
+                    <a:noFill/>
+                  </a:tcPr>
+                </a:tc>
+                <a:extLst>
+                  <a:ext uri="{0D108BD9-81ED-4DB2-BD59-A6C34878D82A}">
+                    <a16:rowId xmlns:a16="http://schemas.microsoft.com/office/drawing/2014/main" val="1607750557"/>
+                  </a:ext>
+                </a:extLst>
+              </a:tr>
+              <a:tr h="318135">
+                <a:tc gridSpan="2">
+                  <a:txBody>
+                    <a:bodyPr/>
+                    <a:lstStyle/>
+                    <a:p>
+                      <a:pPr algn="ctr"/>
+                      <a:endParaRPr lang="en-US" dirty="0">
+                        <a:solidFill>
+                          <a:schemeClr val="accent4"/>
+                        </a:solidFill>
+                      </a:endParaRPr>
+                    </a:p>
+                  </a:txBody>
+                  <a:tcPr>
+                    <a:lnL w="38100" cap="flat" cmpd="sng" algn="ctr">
+                      <a:noFill/>
+                      <a:prstDash val="solid"/>
+                      <a:round/>
+                      <a:headEnd type="none" w="med" len="med"/>
+                      <a:tailEnd type="none" w="med" len="med"/>
+                    </a:lnL>
+                    <a:lnR w="38100" cap="flat" cmpd="sng" algn="ctr">
+                      <a:solidFill>
+                        <a:schemeClr val="tx2"/>
+                      </a:solidFill>
+                      <a:prstDash val="solid"/>
+                      <a:round/>
+                      <a:headEnd type="none" w="med" len="med"/>
+                      <a:tailEnd type="none" w="med" len="med"/>
+                    </a:lnR>
+                    <a:lnT w="38100" cap="flat" cmpd="sng" algn="ctr">
+                      <a:noFill/>
+                      <a:prstDash val="solid"/>
+                      <a:round/>
+                      <a:headEnd type="none" w="med" len="med"/>
+                      <a:tailEnd type="none" w="med" len="med"/>
+                    </a:lnT>
+                    <a:lnB w="38100" cap="flat" cmpd="sng" algn="ctr">
+                      <a:solidFill>
+                        <a:schemeClr val="tx2"/>
+                      </a:solidFill>
+                      <a:prstDash val="solid"/>
+                      <a:round/>
+                      <a:headEnd type="none" w="med" len="med"/>
+                      <a:tailEnd type="none" w="med" len="med"/>
+                    </a:lnB>
+                    <a:lnTlToBr w="12700" cmpd="sng">
+                      <a:noFill/>
+                      <a:prstDash val="solid"/>
+                    </a:lnTlToBr>
+                    <a:lnBlToTr w="12700" cmpd="sng">
+                      <a:noFill/>
+                      <a:prstDash val="solid"/>
+                    </a:lnBlToTr>
+                    <a:noFill/>
+                  </a:tcPr>
+                </a:tc>
+                <a:tc hMerge="1">
+                  <a:txBody>
+                    <a:bodyPr/>
+                    <a:lstStyle/>
+                    <a:p>
+                      <a:endParaRPr lang="en-US"/>
+                    </a:p>
+                  </a:txBody>
+                  <a:tcPr/>
+                </a:tc>
+                <a:tc>
+                  <a:txBody>
+                    <a:bodyPr/>
+                    <a:lstStyle/>
+                    <a:p>
+                      <a:pPr algn="ctr"/>
+                      <a:r>
+                        <a:rPr lang="en-US" dirty="0">
+                          <a:solidFill>
+                            <a:schemeClr val="accent4"/>
+                          </a:solidFill>
+                        </a:rPr>
+                        <a:t>0</a:t>
+                      </a:r>
+                    </a:p>
+                  </a:txBody>
+                  <a:tcPr>
+                    <a:lnL w="38100" cap="flat" cmpd="sng" algn="ctr">
+                      <a:solidFill>
+                        <a:schemeClr val="tx2"/>
+                      </a:solidFill>
+                      <a:prstDash val="solid"/>
+                      <a:round/>
+                      <a:headEnd type="none" w="med" len="med"/>
+                      <a:tailEnd type="none" w="med" len="med"/>
+                    </a:lnL>
+                    <a:lnR w="38100" cap="flat" cmpd="sng" algn="ctr">
+                      <a:noFill/>
+                      <a:prstDash val="solid"/>
+                      <a:round/>
+                      <a:headEnd type="none" w="med" len="med"/>
+                      <a:tailEnd type="none" w="med" len="med"/>
+                    </a:lnR>
+                    <a:lnT w="38100" cap="flat" cmpd="sng" algn="ctr">
+                      <a:noFill/>
+                      <a:prstDash val="solid"/>
+                      <a:round/>
+                      <a:headEnd type="none" w="med" len="med"/>
+                      <a:tailEnd type="none" w="med" len="med"/>
+                    </a:lnT>
+                    <a:lnB w="38100" cap="flat" cmpd="sng" algn="ctr">
+                      <a:solidFill>
+                        <a:schemeClr val="tx2"/>
+                      </a:solidFill>
+                      <a:prstDash val="solid"/>
+                      <a:round/>
+                      <a:headEnd type="none" w="med" len="med"/>
+                      <a:tailEnd type="none" w="med" len="med"/>
+                    </a:lnB>
+                    <a:lnTlToBr w="12700" cmpd="sng">
+                      <a:noFill/>
+                      <a:prstDash val="solid"/>
+                    </a:lnTlToBr>
+                    <a:lnBlToTr w="12700" cmpd="sng">
+                      <a:noFill/>
+                      <a:prstDash val="solid"/>
+                    </a:lnBlToTr>
+                    <a:noFill/>
+                  </a:tcPr>
+                </a:tc>
+                <a:tc>
+                  <a:txBody>
+                    <a:bodyPr/>
+                    <a:lstStyle/>
+                    <a:p>
+                      <a:pPr algn="ctr"/>
+                      <a:r>
+                        <a:rPr lang="en-US" dirty="0">
+                          <a:solidFill>
+                            <a:schemeClr val="accent4"/>
+                          </a:solidFill>
+                        </a:rPr>
+                        <a:t>1</a:t>
+                      </a:r>
+                    </a:p>
+                  </a:txBody>
+                  <a:tcPr>
+                    <a:lnL w="38100" cap="flat" cmpd="sng" algn="ctr">
+                      <a:noFill/>
+                      <a:prstDash val="solid"/>
+                      <a:round/>
+                      <a:headEnd type="none" w="med" len="med"/>
+                      <a:tailEnd type="none" w="med" len="med"/>
+                    </a:lnL>
+                    <a:lnR w="38100" cap="flat" cmpd="sng" algn="ctr">
+                      <a:noFill/>
+                      <a:prstDash val="solid"/>
+                      <a:round/>
+                      <a:headEnd type="none" w="med" len="med"/>
+                      <a:tailEnd type="none" w="med" len="med"/>
+                    </a:lnR>
+                    <a:lnT w="38100" cap="flat" cmpd="sng" algn="ctr">
+                      <a:noFill/>
+                      <a:prstDash val="solid"/>
+                      <a:round/>
+                      <a:headEnd type="none" w="med" len="med"/>
+                      <a:tailEnd type="none" w="med" len="med"/>
+                    </a:lnT>
+                    <a:lnB w="38100" cap="flat" cmpd="sng" algn="ctr">
+                      <a:solidFill>
+                        <a:schemeClr val="tx2"/>
+                      </a:solidFill>
+                      <a:prstDash val="solid"/>
+                      <a:round/>
+                      <a:headEnd type="none" w="med" len="med"/>
+                      <a:tailEnd type="none" w="med" len="med"/>
+                    </a:lnB>
+                    <a:lnTlToBr w="12700" cmpd="sng">
+                      <a:noFill/>
+                      <a:prstDash val="solid"/>
+                    </a:lnTlToBr>
+                    <a:lnBlToTr w="12700" cmpd="sng">
+                      <a:noFill/>
+                      <a:prstDash val="solid"/>
+                    </a:lnBlToTr>
+                    <a:noFill/>
+                  </a:tcPr>
+                </a:tc>
+                <a:tc>
+                  <a:txBody>
+                    <a:bodyPr/>
+                    <a:lstStyle/>
+                    <a:p>
+                      <a:pPr algn="ctr"/>
+                      <a:r>
+                        <a:rPr lang="en-US" dirty="0">
+                          <a:solidFill>
+                            <a:schemeClr val="accent4"/>
+                          </a:solidFill>
+                        </a:rPr>
+                        <a:t>Total</a:t>
+                      </a:r>
+                    </a:p>
+                  </a:txBody>
+                  <a:tcPr>
+                    <a:lnL w="38100" cap="flat" cmpd="sng" algn="ctr">
+                      <a:noFill/>
+                      <a:prstDash val="solid"/>
+                      <a:round/>
+                      <a:headEnd type="none" w="med" len="med"/>
+                      <a:tailEnd type="none" w="med" len="med"/>
+                    </a:lnL>
+                    <a:lnR w="12700" cmpd="sng">
+                      <a:noFill/>
+                    </a:lnR>
+                    <a:lnT w="38100" cap="flat" cmpd="sng" algn="ctr">
+                      <a:noFill/>
+                      <a:prstDash val="solid"/>
+                      <a:round/>
+                      <a:headEnd type="none" w="med" len="med"/>
+                      <a:tailEnd type="none" w="med" len="med"/>
+                    </a:lnT>
+                    <a:lnB w="38100" cap="flat" cmpd="sng" algn="ctr">
+                      <a:solidFill>
+                        <a:schemeClr val="tx2"/>
+                      </a:solidFill>
+                      <a:prstDash val="solid"/>
+                      <a:round/>
+                      <a:headEnd type="none" w="med" len="med"/>
+                      <a:tailEnd type="none" w="med" len="med"/>
+                    </a:lnB>
+                    <a:lnTlToBr w="12700" cmpd="sng">
+                      <a:noFill/>
+                      <a:prstDash val="solid"/>
+                    </a:lnTlToBr>
+                    <a:lnBlToTr w="12700" cmpd="sng">
+                      <a:noFill/>
+                      <a:prstDash val="solid"/>
+                    </a:lnBlToTr>
+                    <a:noFill/>
+                  </a:tcPr>
+                </a:tc>
+                <a:extLst>
+                  <a:ext uri="{0D108BD9-81ED-4DB2-BD59-A6C34878D82A}">
+                    <a16:rowId xmlns:a16="http://schemas.microsoft.com/office/drawing/2014/main" val="106281018"/>
+                  </a:ext>
+                </a:extLst>
+              </a:tr>
+              <a:tr h="318135">
+                <a:tc rowSpan="3">
+                  <a:txBody>
+                    <a:bodyPr/>
+                    <a:lstStyle/>
+                    <a:p>
+                      <a:pPr algn="l"/>
+                      <a:r>
+                        <a:rPr lang="en-US" sz="2400" dirty="0">
+                          <a:solidFill>
+                            <a:schemeClr val="accent4"/>
+                          </a:solidFill>
+                        </a:rPr>
+                        <a:t>Actual</a:t>
+                      </a:r>
+                    </a:p>
+                  </a:txBody>
+                  <a:tcPr vert="vert270" anchor="ctr">
+                    <a:lnL w="38100" cap="flat" cmpd="sng" algn="ctr">
+                      <a:noFill/>
+                      <a:prstDash val="solid"/>
+                      <a:round/>
+                      <a:headEnd type="none" w="med" len="med"/>
+                      <a:tailEnd type="none" w="med" len="med"/>
+                    </a:lnL>
+                    <a:lnR w="38100" cap="flat" cmpd="sng" algn="ctr">
+                      <a:noFill/>
+                      <a:prstDash val="solid"/>
+                      <a:round/>
+                      <a:headEnd type="none" w="med" len="med"/>
+                      <a:tailEnd type="none" w="med" len="med"/>
+                    </a:lnR>
+                    <a:lnT w="38100" cap="flat" cmpd="sng" algn="ctr">
+                      <a:solidFill>
+                        <a:schemeClr val="tx2"/>
+                      </a:solidFill>
+                      <a:prstDash val="solid"/>
+                      <a:round/>
+                      <a:headEnd type="none" w="med" len="med"/>
+                      <a:tailEnd type="none" w="med" len="med"/>
+                    </a:lnT>
+                    <a:lnB w="38100" cap="flat" cmpd="sng" algn="ctr">
+                      <a:noFill/>
+                      <a:prstDash val="solid"/>
+                      <a:round/>
+                      <a:headEnd type="none" w="med" len="med"/>
+                      <a:tailEnd type="none" w="med" len="med"/>
+                    </a:lnB>
+                    <a:lnTlToBr w="12700" cmpd="sng">
+                      <a:noFill/>
+                      <a:prstDash val="solid"/>
+                    </a:lnTlToBr>
+                    <a:lnBlToTr w="12700" cmpd="sng">
+                      <a:noFill/>
+                      <a:prstDash val="solid"/>
+                    </a:lnBlToTr>
+                    <a:noFill/>
+                  </a:tcPr>
+                </a:tc>
+                <a:tc>
+                  <a:txBody>
+                    <a:bodyPr/>
+                    <a:lstStyle/>
+                    <a:p>
+                      <a:pPr algn="ctr"/>
+                      <a:r>
+                        <a:rPr lang="en-US" b="1" dirty="0">
+                          <a:solidFill>
+                            <a:schemeClr val="accent4"/>
+                          </a:solidFill>
+                        </a:rPr>
+                        <a:t>0.0</a:t>
+                      </a:r>
+                    </a:p>
+                  </a:txBody>
+                  <a:tcPr>
+                    <a:lnL w="38100" cap="flat" cmpd="sng" algn="ctr">
+                      <a:noFill/>
+                      <a:prstDash val="solid"/>
+                      <a:round/>
+                      <a:headEnd type="none" w="med" len="med"/>
+                      <a:tailEnd type="none" w="med" len="med"/>
+                    </a:lnL>
+                    <a:lnR w="38100" cap="flat" cmpd="sng" algn="ctr">
+                      <a:solidFill>
+                        <a:schemeClr val="tx2"/>
+                      </a:solidFill>
+                      <a:prstDash val="solid"/>
+                      <a:round/>
+                      <a:headEnd type="none" w="med" len="med"/>
+                      <a:tailEnd type="none" w="med" len="med"/>
+                    </a:lnR>
+                    <a:lnT w="38100" cap="flat" cmpd="sng" algn="ctr">
+                      <a:solidFill>
+                        <a:schemeClr val="tx2"/>
+                      </a:solidFill>
+                      <a:prstDash val="solid"/>
+                      <a:round/>
+                      <a:headEnd type="none" w="med" len="med"/>
+                      <a:tailEnd type="none" w="med" len="med"/>
+                    </a:lnT>
+                    <a:lnB w="38100" cap="flat" cmpd="sng" algn="ctr">
+                      <a:noFill/>
+                      <a:prstDash val="solid"/>
+                      <a:round/>
+                      <a:headEnd type="none" w="med" len="med"/>
+                      <a:tailEnd type="none" w="med" len="med"/>
+                    </a:lnB>
+                    <a:lnTlToBr w="12700" cmpd="sng">
+                      <a:noFill/>
+                      <a:prstDash val="solid"/>
+                    </a:lnTlToBr>
+                    <a:lnBlToTr w="12700" cmpd="sng">
+                      <a:noFill/>
+                      <a:prstDash val="solid"/>
+                    </a:lnBlToTr>
+                    <a:noFill/>
+                  </a:tcPr>
+                </a:tc>
+                <a:tc>
+                  <a:txBody>
+                    <a:bodyPr/>
+                    <a:lstStyle/>
+                    <a:p>
+                      <a:pPr algn="ctr"/>
+                      <a:r>
+                        <a:rPr lang="en-US" dirty="0">
+                          <a:solidFill>
+                            <a:schemeClr val="accent4"/>
+                          </a:solidFill>
+                        </a:rPr>
+                        <a:t>28,742</a:t>
+                      </a:r>
+                    </a:p>
+                  </a:txBody>
+                  <a:tcPr>
+                    <a:lnL w="38100" cap="flat" cmpd="sng" algn="ctr">
+                      <a:solidFill>
+                        <a:schemeClr val="tx2"/>
+                      </a:solidFill>
+                      <a:prstDash val="solid"/>
+                      <a:round/>
+                      <a:headEnd type="none" w="med" len="med"/>
+                      <a:tailEnd type="none" w="med" len="med"/>
+                    </a:lnL>
+                    <a:lnR w="38100" cap="flat" cmpd="sng" algn="ctr">
+                      <a:noFill/>
+                      <a:prstDash val="solid"/>
+                      <a:round/>
+                      <a:headEnd type="none" w="med" len="med"/>
+                      <a:tailEnd type="none" w="med" len="med"/>
+                    </a:lnR>
+                    <a:lnT w="38100" cap="flat" cmpd="sng" algn="ctr">
+                      <a:solidFill>
+                        <a:schemeClr val="tx2"/>
+                      </a:solidFill>
+                      <a:prstDash val="solid"/>
+                      <a:round/>
+                      <a:headEnd type="none" w="med" len="med"/>
+                      <a:tailEnd type="none" w="med" len="med"/>
+                    </a:lnT>
+                    <a:lnB w="38100" cap="flat" cmpd="sng" algn="ctr">
+                      <a:noFill/>
+                      <a:prstDash val="solid"/>
+                      <a:round/>
+                      <a:headEnd type="none" w="med" len="med"/>
+                      <a:tailEnd type="none" w="med" len="med"/>
+                    </a:lnB>
+                    <a:lnTlToBr w="12700" cmpd="sng">
+                      <a:noFill/>
+                      <a:prstDash val="solid"/>
+                    </a:lnTlToBr>
+                    <a:lnBlToTr w="12700" cmpd="sng">
+                      <a:noFill/>
+                      <a:prstDash val="solid"/>
+                    </a:lnBlToTr>
+                    <a:noFill/>
+                  </a:tcPr>
+                </a:tc>
+                <a:tc>
+                  <a:txBody>
+                    <a:bodyPr/>
+                    <a:lstStyle/>
+                    <a:p>
+                      <a:pPr algn="ctr"/>
+                      <a:r>
+                        <a:rPr lang="en-US" dirty="0">
+                          <a:solidFill>
+                            <a:schemeClr val="accent4"/>
+                          </a:solidFill>
+                        </a:rPr>
+                        <a:t>44</a:t>
+                      </a:r>
+                    </a:p>
+                  </a:txBody>
+                  <a:tcPr>
+                    <a:lnL w="38100" cap="flat" cmpd="sng" algn="ctr">
+                      <a:noFill/>
+                      <a:prstDash val="solid"/>
+                      <a:round/>
+                      <a:headEnd type="none" w="med" len="med"/>
+                      <a:tailEnd type="none" w="med" len="med"/>
+                    </a:lnL>
+                    <a:lnR w="38100" cap="flat" cmpd="sng" algn="ctr">
+                      <a:noFill/>
+                      <a:prstDash val="solid"/>
+                      <a:round/>
+                      <a:headEnd type="none" w="med" len="med"/>
+                      <a:tailEnd type="none" w="med" len="med"/>
+                    </a:lnR>
+                    <a:lnT w="38100" cap="flat" cmpd="sng" algn="ctr">
+                      <a:solidFill>
+                        <a:schemeClr val="tx2"/>
+                      </a:solidFill>
+                      <a:prstDash val="solid"/>
+                      <a:round/>
+                      <a:headEnd type="none" w="med" len="med"/>
+                      <a:tailEnd type="none" w="med" len="med"/>
+                    </a:lnT>
+                    <a:lnB w="38100" cap="flat" cmpd="sng" algn="ctr">
+                      <a:noFill/>
+                      <a:prstDash val="solid"/>
+                      <a:round/>
+                      <a:headEnd type="none" w="med" len="med"/>
+                      <a:tailEnd type="none" w="med" len="med"/>
+                    </a:lnB>
+                    <a:lnTlToBr w="12700" cmpd="sng">
+                      <a:noFill/>
+                      <a:prstDash val="solid"/>
+                    </a:lnTlToBr>
+                    <a:lnBlToTr w="12700" cmpd="sng">
+                      <a:noFill/>
+                      <a:prstDash val="solid"/>
+                    </a:lnBlToTr>
+                    <a:noFill/>
+                  </a:tcPr>
+                </a:tc>
+                <a:tc>
+                  <a:txBody>
+                    <a:bodyPr/>
+                    <a:lstStyle/>
+                    <a:p>
+                      <a:pPr algn="ctr"/>
+                      <a:r>
+                        <a:rPr lang="en-US" dirty="0">
+                          <a:solidFill>
+                            <a:schemeClr val="accent4"/>
+                          </a:solidFill>
+                        </a:rPr>
+                        <a:t>28,786</a:t>
+                      </a:r>
+                    </a:p>
+                  </a:txBody>
+                  <a:tcPr>
+                    <a:lnL w="38100" cap="flat" cmpd="sng" algn="ctr">
+                      <a:noFill/>
+                      <a:prstDash val="solid"/>
+                      <a:round/>
+                      <a:headEnd type="none" w="med" len="med"/>
+                      <a:tailEnd type="none" w="med" len="med"/>
+                    </a:lnL>
+                    <a:lnR w="12700" cmpd="sng">
+                      <a:noFill/>
+                    </a:lnR>
+                    <a:lnT w="38100" cap="flat" cmpd="sng" algn="ctr">
+                      <a:solidFill>
+                        <a:schemeClr val="tx2"/>
+                      </a:solidFill>
+                      <a:prstDash val="solid"/>
+                      <a:round/>
+                      <a:headEnd type="none" w="med" len="med"/>
+                      <a:tailEnd type="none" w="med" len="med"/>
+                    </a:lnT>
+                    <a:lnB w="38100" cap="flat" cmpd="sng" algn="ctr">
+                      <a:noFill/>
+                      <a:prstDash val="solid"/>
+                      <a:round/>
+                      <a:headEnd type="none" w="med" len="med"/>
+                      <a:tailEnd type="none" w="med" len="med"/>
+                    </a:lnB>
+                    <a:lnTlToBr w="12700" cmpd="sng">
+                      <a:noFill/>
+                      <a:prstDash val="solid"/>
+                    </a:lnTlToBr>
+                    <a:lnBlToTr w="12700" cmpd="sng">
+                      <a:noFill/>
+                      <a:prstDash val="solid"/>
+                    </a:lnBlToTr>
+                    <a:noFill/>
+                  </a:tcPr>
+                </a:tc>
+                <a:extLst>
+                  <a:ext uri="{0D108BD9-81ED-4DB2-BD59-A6C34878D82A}">
+                    <a16:rowId xmlns:a16="http://schemas.microsoft.com/office/drawing/2014/main" val="1154221453"/>
+                  </a:ext>
+                </a:extLst>
+              </a:tr>
+              <a:tr h="318135">
+                <a:tc vMerge="1">
+                  <a:txBody>
+                    <a:bodyPr/>
+                    <a:lstStyle/>
+                    <a:p>
+                      <a:endParaRPr lang="en-US" dirty="0"/>
+                    </a:p>
+                  </a:txBody>
+                  <a:tcPr>
+                    <a:lnL w="38100" cap="flat" cmpd="sng" algn="ctr">
+                      <a:noFill/>
+                      <a:prstDash val="solid"/>
+                      <a:round/>
+                      <a:headEnd type="none" w="med" len="med"/>
+                      <a:tailEnd type="none" w="med" len="med"/>
+                    </a:lnL>
+                    <a:lnR w="38100" cap="flat" cmpd="sng" algn="ctr">
+                      <a:noFill/>
+                      <a:prstDash val="solid"/>
+                      <a:round/>
+                      <a:headEnd type="none" w="med" len="med"/>
+                      <a:tailEnd type="none" w="med" len="med"/>
+                    </a:lnR>
+                    <a:lnT w="38100" cap="flat" cmpd="sng" algn="ctr">
+                      <a:noFill/>
+                      <a:prstDash val="solid"/>
+                      <a:round/>
+                      <a:headEnd type="none" w="med" len="med"/>
+                      <a:tailEnd type="none" w="med" len="med"/>
+                    </a:lnT>
+                    <a:lnB w="38100" cap="flat" cmpd="sng" algn="ctr">
+                      <a:noFill/>
+                      <a:prstDash val="solid"/>
+                      <a:round/>
+                      <a:headEnd type="none" w="med" len="med"/>
+                      <a:tailEnd type="none" w="med" len="med"/>
+                    </a:lnB>
+                    <a:lnTlToBr w="12700" cmpd="sng">
+                      <a:noFill/>
+                      <a:prstDash val="solid"/>
+                    </a:lnTlToBr>
+                    <a:lnBlToTr w="12700" cmpd="sng">
+                      <a:noFill/>
+                      <a:prstDash val="solid"/>
+                    </a:lnBlToTr>
+                    <a:noFill/>
+                  </a:tcPr>
+                </a:tc>
+                <a:tc>
+                  <a:txBody>
+                    <a:bodyPr/>
+                    <a:lstStyle/>
+                    <a:p>
+                      <a:pPr algn="ctr"/>
+                      <a:r>
+                        <a:rPr lang="en-US" b="1" dirty="0">
+                          <a:solidFill>
+                            <a:schemeClr val="accent4"/>
+                          </a:solidFill>
+                        </a:rPr>
+                        <a:t>1.0</a:t>
+                      </a:r>
+                    </a:p>
+                  </a:txBody>
+                  <a:tcPr>
+                    <a:lnL w="38100" cap="flat" cmpd="sng" algn="ctr">
+                      <a:noFill/>
+                      <a:prstDash val="solid"/>
+                      <a:round/>
+                      <a:headEnd type="none" w="med" len="med"/>
+                      <a:tailEnd type="none" w="med" len="med"/>
+                    </a:lnL>
+                    <a:lnR w="38100" cap="flat" cmpd="sng" algn="ctr">
+                      <a:solidFill>
+                        <a:schemeClr val="tx2"/>
+                      </a:solidFill>
+                      <a:prstDash val="solid"/>
+                      <a:round/>
+                      <a:headEnd type="none" w="med" len="med"/>
+                      <a:tailEnd type="none" w="med" len="med"/>
+                    </a:lnR>
+                    <a:lnT w="38100" cap="flat" cmpd="sng" algn="ctr">
+                      <a:noFill/>
+                      <a:prstDash val="solid"/>
+                      <a:round/>
+                      <a:headEnd type="none" w="med" len="med"/>
+                      <a:tailEnd type="none" w="med" len="med"/>
+                    </a:lnT>
+                    <a:lnB w="38100" cap="flat" cmpd="sng" algn="ctr">
+                      <a:noFill/>
+                      <a:prstDash val="solid"/>
+                      <a:round/>
+                      <a:headEnd type="none" w="med" len="med"/>
+                      <a:tailEnd type="none" w="med" len="med"/>
+                    </a:lnB>
+                    <a:lnTlToBr w="12700" cmpd="sng">
+                      <a:noFill/>
+                      <a:prstDash val="solid"/>
+                    </a:lnTlToBr>
+                    <a:lnBlToTr w="12700" cmpd="sng">
+                      <a:noFill/>
+                      <a:prstDash val="solid"/>
+                    </a:lnBlToTr>
+                    <a:noFill/>
+                  </a:tcPr>
+                </a:tc>
+                <a:tc>
+                  <a:txBody>
+                    <a:bodyPr/>
+                    <a:lstStyle/>
+                    <a:p>
+                      <a:pPr algn="ctr"/>
+                      <a:r>
+                        <a:rPr lang="en-US" dirty="0">
+                          <a:solidFill>
+                            <a:schemeClr val="accent4"/>
+                          </a:solidFill>
+                        </a:rPr>
+                        <a:t>941</a:t>
+                      </a:r>
+                    </a:p>
+                  </a:txBody>
+                  <a:tcPr>
+                    <a:lnL w="38100" cap="flat" cmpd="sng" algn="ctr">
+                      <a:solidFill>
+                        <a:schemeClr val="tx2"/>
+                      </a:solidFill>
+                      <a:prstDash val="solid"/>
+                      <a:round/>
+                      <a:headEnd type="none" w="med" len="med"/>
+                      <a:tailEnd type="none" w="med" len="med"/>
+                    </a:lnL>
+                    <a:lnR w="38100" cap="flat" cmpd="sng" algn="ctr">
+                      <a:noFill/>
+                      <a:prstDash val="solid"/>
+                      <a:round/>
+                      <a:headEnd type="none" w="med" len="med"/>
+                      <a:tailEnd type="none" w="med" len="med"/>
+                    </a:lnR>
+                    <a:lnT w="38100" cap="flat" cmpd="sng" algn="ctr">
+                      <a:noFill/>
+                      <a:prstDash val="solid"/>
+                      <a:round/>
+                      <a:headEnd type="none" w="med" len="med"/>
+                      <a:tailEnd type="none" w="med" len="med"/>
+                    </a:lnT>
+                    <a:lnB w="38100" cap="flat" cmpd="sng" algn="ctr">
+                      <a:noFill/>
+                      <a:prstDash val="solid"/>
+                      <a:round/>
+                      <a:headEnd type="none" w="med" len="med"/>
+                      <a:tailEnd type="none" w="med" len="med"/>
+                    </a:lnB>
+                    <a:lnTlToBr w="12700" cmpd="sng">
+                      <a:noFill/>
+                      <a:prstDash val="solid"/>
+                    </a:lnTlToBr>
+                    <a:lnBlToTr w="12700" cmpd="sng">
+                      <a:noFill/>
+                      <a:prstDash val="solid"/>
+                    </a:lnBlToTr>
+                    <a:noFill/>
+                  </a:tcPr>
+                </a:tc>
+                <a:tc>
+                  <a:txBody>
+                    <a:bodyPr/>
+                    <a:lstStyle/>
+                    <a:p>
+                      <a:pPr algn="ctr"/>
+                      <a:r>
+                        <a:rPr lang="en-US" dirty="0">
+                          <a:solidFill>
+                            <a:schemeClr val="accent4"/>
+                          </a:solidFill>
+                        </a:rPr>
+                        <a:t>114</a:t>
+                      </a:r>
+                    </a:p>
+                  </a:txBody>
+                  <a:tcPr>
+                    <a:lnL w="38100" cap="flat" cmpd="sng" algn="ctr">
+                      <a:noFill/>
+                      <a:prstDash val="solid"/>
+                      <a:round/>
+                      <a:headEnd type="none" w="med" len="med"/>
+                      <a:tailEnd type="none" w="med" len="med"/>
+                    </a:lnL>
+                    <a:lnR w="38100" cap="flat" cmpd="sng" algn="ctr">
+                      <a:noFill/>
+                      <a:prstDash val="solid"/>
+                      <a:round/>
+                      <a:headEnd type="none" w="med" len="med"/>
+                      <a:tailEnd type="none" w="med" len="med"/>
+                    </a:lnR>
+                    <a:lnT w="38100" cap="flat" cmpd="sng" algn="ctr">
+                      <a:noFill/>
+                      <a:prstDash val="solid"/>
+                      <a:round/>
+                      <a:headEnd type="none" w="med" len="med"/>
+                      <a:tailEnd type="none" w="med" len="med"/>
+                    </a:lnT>
+                    <a:lnB w="38100" cap="flat" cmpd="sng" algn="ctr">
+                      <a:noFill/>
+                      <a:prstDash val="solid"/>
+                      <a:round/>
+                      <a:headEnd type="none" w="med" len="med"/>
+                      <a:tailEnd type="none" w="med" len="med"/>
+                    </a:lnB>
+                    <a:lnTlToBr w="12700" cmpd="sng">
+                      <a:noFill/>
+                      <a:prstDash val="solid"/>
+                    </a:lnTlToBr>
+                    <a:lnBlToTr w="12700" cmpd="sng">
+                      <a:noFill/>
+                      <a:prstDash val="solid"/>
+                    </a:lnBlToTr>
+                    <a:noFill/>
+                  </a:tcPr>
+                </a:tc>
+                <a:tc>
+                  <a:txBody>
+                    <a:bodyPr/>
+                    <a:lstStyle/>
+                    <a:p>
+                      <a:pPr algn="ctr"/>
+                      <a:r>
+                        <a:rPr lang="en-US" dirty="0">
+                          <a:solidFill>
+                            <a:schemeClr val="accent4"/>
+                          </a:solidFill>
+                        </a:rPr>
+                        <a:t>1,055</a:t>
+                      </a:r>
+                    </a:p>
+                  </a:txBody>
+                  <a:tcPr>
+                    <a:lnL w="38100" cap="flat" cmpd="sng" algn="ctr">
+                      <a:noFill/>
+                      <a:prstDash val="solid"/>
+                      <a:round/>
+                      <a:headEnd type="none" w="med" len="med"/>
+                      <a:tailEnd type="none" w="med" len="med"/>
+                    </a:lnL>
+                    <a:lnR w="12700" cmpd="sng">
+                      <a:noFill/>
+                    </a:lnR>
+                    <a:lnT w="38100" cap="flat" cmpd="sng" algn="ctr">
+                      <a:noFill/>
+                      <a:prstDash val="solid"/>
+                      <a:round/>
+                      <a:headEnd type="none" w="med" len="med"/>
+                      <a:tailEnd type="none" w="med" len="med"/>
+                    </a:lnT>
+                    <a:lnB w="38100" cap="flat" cmpd="sng" algn="ctr">
+                      <a:noFill/>
+                      <a:prstDash val="solid"/>
+                      <a:round/>
+                      <a:headEnd type="none" w="med" len="med"/>
+                      <a:tailEnd type="none" w="med" len="med"/>
+                    </a:lnB>
+                    <a:lnTlToBr w="12700" cmpd="sng">
+                      <a:noFill/>
+                      <a:prstDash val="solid"/>
+                    </a:lnTlToBr>
+                    <a:lnBlToTr w="12700" cmpd="sng">
+                      <a:noFill/>
+                      <a:prstDash val="solid"/>
+                    </a:lnBlToTr>
+                    <a:noFill/>
+                  </a:tcPr>
+                </a:tc>
+                <a:extLst>
+                  <a:ext uri="{0D108BD9-81ED-4DB2-BD59-A6C34878D82A}">
+                    <a16:rowId xmlns:a16="http://schemas.microsoft.com/office/drawing/2014/main" val="562113962"/>
+                  </a:ext>
+                </a:extLst>
+              </a:tr>
+              <a:tr h="318135">
+                <a:tc vMerge="1">
+                  <a:txBody>
+                    <a:bodyPr/>
+                    <a:lstStyle/>
+                    <a:p>
+                      <a:endParaRPr lang="en-US" dirty="0"/>
+                    </a:p>
+                  </a:txBody>
+                  <a:tcPr>
+                    <a:lnL w="38100" cap="flat" cmpd="sng" algn="ctr">
+                      <a:noFill/>
+                      <a:prstDash val="solid"/>
+                      <a:round/>
+                      <a:headEnd type="none" w="med" len="med"/>
+                      <a:tailEnd type="none" w="med" len="med"/>
+                    </a:lnL>
+                    <a:lnR w="38100" cap="flat" cmpd="sng" algn="ctr">
+                      <a:noFill/>
+                      <a:prstDash val="solid"/>
+                      <a:round/>
+                      <a:headEnd type="none" w="med" len="med"/>
+                      <a:tailEnd type="none" w="med" len="med"/>
+                    </a:lnR>
+                    <a:lnT w="38100" cap="flat" cmpd="sng" algn="ctr">
+                      <a:noFill/>
+                      <a:prstDash val="solid"/>
+                      <a:round/>
+                      <a:headEnd type="none" w="med" len="med"/>
+                      <a:tailEnd type="none" w="med" len="med"/>
+                    </a:lnT>
+                    <a:lnB w="12700" cmpd="sng">
+                      <a:noFill/>
+                    </a:lnB>
+                    <a:lnTlToBr w="12700" cmpd="sng">
+                      <a:noFill/>
+                      <a:prstDash val="solid"/>
+                    </a:lnTlToBr>
+                    <a:lnBlToTr w="12700" cmpd="sng">
+                      <a:noFill/>
+                      <a:prstDash val="solid"/>
+                    </a:lnBlToTr>
+                    <a:noFill/>
+                  </a:tcPr>
+                </a:tc>
+                <a:tc>
+                  <a:txBody>
+                    <a:bodyPr/>
+                    <a:lstStyle/>
+                    <a:p>
+                      <a:pPr algn="ctr"/>
+                      <a:r>
+                        <a:rPr lang="en-US" b="1" dirty="0">
+                          <a:solidFill>
+                            <a:schemeClr val="accent4"/>
+                          </a:solidFill>
+                        </a:rPr>
+                        <a:t>Total</a:t>
+                      </a:r>
+                    </a:p>
+                  </a:txBody>
+                  <a:tcPr>
+                    <a:lnL w="38100" cap="flat" cmpd="sng" algn="ctr">
+                      <a:noFill/>
+                      <a:prstDash val="solid"/>
+                      <a:round/>
+                      <a:headEnd type="none" w="med" len="med"/>
+                      <a:tailEnd type="none" w="med" len="med"/>
+                    </a:lnL>
+                    <a:lnR w="38100" cap="flat" cmpd="sng" algn="ctr">
+                      <a:solidFill>
+                        <a:schemeClr val="tx2"/>
+                      </a:solidFill>
+                      <a:prstDash val="solid"/>
+                      <a:round/>
+                      <a:headEnd type="none" w="med" len="med"/>
+                      <a:tailEnd type="none" w="med" len="med"/>
+                    </a:lnR>
+                    <a:lnT w="38100" cap="flat" cmpd="sng" algn="ctr">
+                      <a:noFill/>
+                      <a:prstDash val="solid"/>
+                      <a:round/>
+                      <a:headEnd type="none" w="med" len="med"/>
+                      <a:tailEnd type="none" w="med" len="med"/>
+                    </a:lnT>
+                    <a:lnB w="12700" cmpd="sng">
+                      <a:noFill/>
+                    </a:lnB>
+                    <a:lnTlToBr w="12700" cmpd="sng">
+                      <a:noFill/>
+                      <a:prstDash val="solid"/>
+                    </a:lnTlToBr>
+                    <a:lnBlToTr w="12700" cmpd="sng">
+                      <a:noFill/>
+                      <a:prstDash val="solid"/>
+                    </a:lnBlToTr>
+                    <a:noFill/>
+                  </a:tcPr>
+                </a:tc>
+                <a:tc>
+                  <a:txBody>
+                    <a:bodyPr/>
+                    <a:lstStyle/>
+                    <a:p>
+                      <a:pPr algn="ctr"/>
+                      <a:r>
+                        <a:rPr lang="en-US" dirty="0">
+                          <a:solidFill>
+                            <a:schemeClr val="accent4"/>
+                          </a:solidFill>
+                        </a:rPr>
+                        <a:t>29,683</a:t>
+                      </a:r>
+                    </a:p>
+                  </a:txBody>
+                  <a:tcPr>
+                    <a:lnL w="38100" cap="flat" cmpd="sng" algn="ctr">
+                      <a:solidFill>
+                        <a:schemeClr val="tx2"/>
+                      </a:solidFill>
+                      <a:prstDash val="solid"/>
+                      <a:round/>
+                      <a:headEnd type="none" w="med" len="med"/>
+                      <a:tailEnd type="none" w="med" len="med"/>
+                    </a:lnL>
+                    <a:lnR w="38100" cap="flat" cmpd="sng" algn="ctr">
+                      <a:noFill/>
+                      <a:prstDash val="solid"/>
+                      <a:round/>
+                      <a:headEnd type="none" w="med" len="med"/>
+                      <a:tailEnd type="none" w="med" len="med"/>
+                    </a:lnR>
+                    <a:lnT w="38100" cap="flat" cmpd="sng" algn="ctr">
+                      <a:noFill/>
+                      <a:prstDash val="solid"/>
+                      <a:round/>
+                      <a:headEnd type="none" w="med" len="med"/>
+                      <a:tailEnd type="none" w="med" len="med"/>
+                    </a:lnT>
+                    <a:lnB w="12700" cmpd="sng">
+                      <a:noFill/>
+                    </a:lnB>
+                    <a:lnTlToBr w="12700" cmpd="sng">
+                      <a:noFill/>
+                      <a:prstDash val="solid"/>
+                    </a:lnTlToBr>
+                    <a:lnBlToTr w="12700" cmpd="sng">
+                      <a:noFill/>
+                      <a:prstDash val="solid"/>
+                    </a:lnBlToTr>
+                    <a:noFill/>
+                  </a:tcPr>
+                </a:tc>
+                <a:tc>
+                  <a:txBody>
+                    <a:bodyPr/>
+                    <a:lstStyle/>
+                    <a:p>
+                      <a:pPr algn="ctr"/>
+                      <a:r>
+                        <a:rPr lang="en-US" dirty="0">
+                          <a:solidFill>
+                            <a:schemeClr val="accent4"/>
+                          </a:solidFill>
+                        </a:rPr>
+                        <a:t>158</a:t>
+                      </a:r>
+                    </a:p>
+                  </a:txBody>
+                  <a:tcPr>
+                    <a:lnL w="38100" cap="flat" cmpd="sng" algn="ctr">
+                      <a:noFill/>
+                      <a:prstDash val="solid"/>
+                      <a:round/>
+                      <a:headEnd type="none" w="med" len="med"/>
+                      <a:tailEnd type="none" w="med" len="med"/>
+                    </a:lnL>
+                    <a:lnR w="38100" cap="flat" cmpd="sng" algn="ctr">
+                      <a:noFill/>
+                      <a:prstDash val="solid"/>
+                      <a:round/>
+                      <a:headEnd type="none" w="med" len="med"/>
+                      <a:tailEnd type="none" w="med" len="med"/>
+                    </a:lnR>
+                    <a:lnT w="38100" cap="flat" cmpd="sng" algn="ctr">
+                      <a:noFill/>
+                      <a:prstDash val="solid"/>
+                      <a:round/>
+                      <a:headEnd type="none" w="med" len="med"/>
+                      <a:tailEnd type="none" w="med" len="med"/>
+                    </a:lnT>
+                    <a:lnB w="12700" cmpd="sng">
+                      <a:noFill/>
+                    </a:lnB>
+                    <a:lnTlToBr w="12700" cmpd="sng">
+                      <a:noFill/>
+                      <a:prstDash val="solid"/>
+                    </a:lnTlToBr>
+                    <a:lnBlToTr w="12700" cmpd="sng">
+                      <a:noFill/>
+                      <a:prstDash val="solid"/>
+                    </a:lnBlToTr>
+                    <a:noFill/>
+                  </a:tcPr>
+                </a:tc>
+                <a:tc>
+                  <a:txBody>
+                    <a:bodyPr/>
+                    <a:lstStyle/>
+                    <a:p>
+                      <a:pPr algn="ctr"/>
+                      <a:r>
+                        <a:rPr lang="en-US" dirty="0">
+                          <a:solidFill>
+                            <a:schemeClr val="accent4"/>
+                          </a:solidFill>
+                        </a:rPr>
+                        <a:t>29,841</a:t>
+                      </a:r>
+                    </a:p>
+                  </a:txBody>
+                  <a:tcPr>
+                    <a:lnL w="38100" cap="flat" cmpd="sng" algn="ctr">
+                      <a:noFill/>
+                      <a:prstDash val="solid"/>
+                      <a:round/>
+                      <a:headEnd type="none" w="med" len="med"/>
+                      <a:tailEnd type="none" w="med" len="med"/>
+                    </a:lnL>
+                    <a:lnR w="12700" cmpd="sng">
+                      <a:noFill/>
+                    </a:lnR>
+                    <a:lnT w="38100" cap="flat" cmpd="sng" algn="ctr">
+                      <a:noFill/>
+                      <a:prstDash val="solid"/>
+                      <a:round/>
+                      <a:headEnd type="none" w="med" len="med"/>
+                      <a:tailEnd type="none" w="med" len="med"/>
+                    </a:lnT>
+                    <a:lnB w="12700" cmpd="sng">
+                      <a:noFill/>
+                    </a:lnB>
+                    <a:lnTlToBr w="12700" cmpd="sng">
+                      <a:noFill/>
+                      <a:prstDash val="solid"/>
+                    </a:lnTlToBr>
+                    <a:lnBlToTr w="12700" cmpd="sng">
+                      <a:noFill/>
+                      <a:prstDash val="solid"/>
+                    </a:lnBlToTr>
+                    <a:noFill/>
+                  </a:tcPr>
+                </a:tc>
+                <a:extLst>
+                  <a:ext uri="{0D108BD9-81ED-4DB2-BD59-A6C34878D82A}">
+                    <a16:rowId xmlns:a16="http://schemas.microsoft.com/office/drawing/2014/main" val="2376074334"/>
+                  </a:ext>
+                </a:extLst>
+              </a:tr>
+            </a:tbl>
+          </a:graphicData>
+        </a:graphic>
+      </p:graphicFrame>
+      <p:sp>
+        <p:nvSpPr>
+          <p:cNvPr id="3" name="Oval 2">
+            <a:extLst>
+              <a:ext uri="{FF2B5EF4-FFF2-40B4-BE49-F238E27FC236}">
+                <a16:creationId xmlns:a16="http://schemas.microsoft.com/office/drawing/2014/main" id="{1771E6CE-56F7-441B-8A04-A6DC8168DD40}"/>
+              </a:ext>
+            </a:extLst>
+          </p:cNvPr>
+          <p:cNvSpPr/>
+          <p:nvPr/>
+        </p:nvSpPr>
+        <p:spPr>
+          <a:xfrm>
+            <a:off x="3638748" y="3374797"/>
+            <a:ext cx="707010" cy="443060"/>
+          </a:xfrm>
+          <a:prstGeom prst="ellipse">
+            <a:avLst/>
+          </a:prstGeom>
+          <a:noFill/>
+          <a:ln>
+            <a:solidFill>
+              <a:srgbClr val="FF0000"/>
+            </a:solidFill>
+          </a:ln>
+        </p:spPr>
+        <p:style>
+          <a:lnRef idx="2">
+            <a:schemeClr val="accent1">
+              <a:shade val="50000"/>
+            </a:schemeClr>
+          </a:lnRef>
+          <a:fillRef idx="1">
+            <a:schemeClr val="accent1"/>
+          </a:fillRef>
+          <a:effectRef idx="0">
+            <a:schemeClr val="accent1"/>
+          </a:effectRef>
+          <a:fontRef idx="minor">
+            <a:schemeClr val="lt1"/>
+          </a:fontRef>
+        </p:style>
+        <p:txBody>
+          <a:bodyPr rtlCol="0" anchor="ctr"/>
+          <a:lstStyle/>
+          <a:p>
+            <a:pPr algn="ctr"/>
+            <a:endParaRPr lang="en-US"/>
+          </a:p>
+        </p:txBody>
+      </p:sp>
+      <p:pic>
+        <p:nvPicPr>
+          <p:cNvPr id="11" name="Graphic 10" descr="Rocket">
+            <a:extLst>
+              <a:ext uri="{FF2B5EF4-FFF2-40B4-BE49-F238E27FC236}">
+                <a16:creationId xmlns:a16="http://schemas.microsoft.com/office/drawing/2014/main" id="{A6C423CF-BF10-4E6E-B7AF-BC65FE434B9F}"/>
+              </a:ext>
+            </a:extLst>
+          </p:cNvPr>
+          <p:cNvPicPr>
+            <a:picLocks noChangeAspect="1"/>
+          </p:cNvPicPr>
+          <p:nvPr/>
+        </p:nvPicPr>
+        <p:blipFill>
+          <a:blip r:embed="rId2">
+            <a:extLst>
+              <a:ext uri="{28A0092B-C50C-407E-A947-70E740481C1C}">
+                <a14:useLocalDpi xmlns:a14="http://schemas.microsoft.com/office/drawing/2010/main" val="0"/>
+              </a:ext>
+              <a:ext uri="{96DAC541-7B7A-43D3-8B79-37D633B846F1}">
+                <asvg:svgBlip xmlns:asvg="http://schemas.microsoft.com/office/drawing/2016/SVG/main" xmlns="" r:embed="rId3"/>
+              </a:ext>
+            </a:extLst>
+          </a:blip>
+          <a:stretch>
+            <a:fillRect/>
+          </a:stretch>
+        </p:blipFill>
+        <p:spPr>
+          <a:xfrm>
+            <a:off x="9987775" y="4925523"/>
+            <a:ext cx="1832518" cy="1832518"/>
+          </a:xfrm>
+          <a:prstGeom prst="rect">
+            <a:avLst/>
+          </a:prstGeom>
+        </p:spPr>
+      </p:pic>
     </p:spTree>
     <p:extLst>
       <p:ext uri="{BB962C8B-B14F-4D97-AF65-F5344CB8AC3E}">
@@ -5460,7 +7815,7 @@
     </p:spTree>
     <p:extLst>
       <p:ext uri="{BB962C8B-B14F-4D97-AF65-F5344CB8AC3E}">
-        <p14:creationId xmlns:p14="http://schemas.microsoft.com/office/powerpoint/2010/main" val="3384561204"/>
+        <p14:creationId xmlns:p14="http://schemas.microsoft.com/office/powerpoint/2010/main" val="1860074528"/>
       </p:ext>
     </p:extLst>
   </p:cSld>
@@ -5733,11 +8088,7 @@
             <a:graphicFrameLocks/>
           </p:cNvGraphicFramePr>
           <p:nvPr>
-            <p:extLst>
-              <p:ext uri="{D42A27DB-BD31-4B8C-83A1-F6EECF244321}">
-                <p14:modId xmlns:p14="http://schemas.microsoft.com/office/powerpoint/2010/main" val="4056730315"/>
-              </p:ext>
-            </p:extLst>
+            <p:extLst/>
           </p:nvPr>
         </p:nvGraphicFramePr>
         <p:xfrm>
@@ -6086,7 +8437,7 @@
     </p:spTree>
     <p:extLst>
       <p:ext uri="{BB962C8B-B14F-4D97-AF65-F5344CB8AC3E}">
-        <p14:creationId xmlns:p14="http://schemas.microsoft.com/office/powerpoint/2010/main" val="1884826917"/>
+        <p14:creationId xmlns:p14="http://schemas.microsoft.com/office/powerpoint/2010/main" val="2507462836"/>
       </p:ext>
     </p:extLst>
   </p:cSld>
@@ -6610,7 +8961,153 @@
     </p:spTree>
     <p:extLst>
       <p:ext uri="{BB962C8B-B14F-4D97-AF65-F5344CB8AC3E}">
-        <p14:creationId xmlns:p14="http://schemas.microsoft.com/office/powerpoint/2010/main" val="2761170100"/>
+        <p14:creationId xmlns:p14="http://schemas.microsoft.com/office/powerpoint/2010/main" val="1209865243"/>
+      </p:ext>
+    </p:extLst>
+  </p:cSld>
+  <p:clrMapOvr>
+    <a:masterClrMapping/>
+  </p:clrMapOvr>
+</p:sld>
+</file>
+
+<file path=ppt/slides/slide15.xml><?xml version="1.0" encoding="utf-8"?>
+<p:sld xmlns:a="http://schemas.openxmlformats.org/drawingml/2006/main" xmlns:r="http://schemas.openxmlformats.org/officeDocument/2006/relationships" xmlns:p="http://schemas.openxmlformats.org/presentationml/2006/main">
+  <p:cSld>
+    <p:spTree>
+      <p:nvGrpSpPr>
+        <p:cNvPr id="1" name=""/>
+        <p:cNvGrpSpPr/>
+        <p:nvPr/>
+      </p:nvGrpSpPr>
+      <p:grpSpPr>
+        <a:xfrm>
+          <a:off x="0" y="0"/>
+          <a:ext cx="0" cy="0"/>
+          <a:chOff x="0" y="0"/>
+          <a:chExt cx="0" cy="0"/>
+        </a:xfrm>
+      </p:grpSpPr>
+      <p:sp>
+        <p:nvSpPr>
+          <p:cNvPr id="2" name="Title 1">
+            <a:extLst>
+              <a:ext uri="{FF2B5EF4-FFF2-40B4-BE49-F238E27FC236}">
+                <a16:creationId xmlns:a16="http://schemas.microsoft.com/office/drawing/2014/main" id="{77F5C092-486F-4778-A139-8237D557A112}"/>
+              </a:ext>
+            </a:extLst>
+          </p:cNvPr>
+          <p:cNvSpPr>
+            <a:spLocks noGrp="1"/>
+          </p:cNvSpPr>
+          <p:nvPr>
+            <p:ph type="title"/>
+          </p:nvPr>
+        </p:nvSpPr>
+        <p:spPr/>
+        <p:txBody>
+          <a:bodyPr/>
+          <a:lstStyle/>
+          <a:p>
+            <a:r>
+              <a:rPr lang="en-US" dirty="0"/>
+              <a:t>K-Means Clustering</a:t>
+            </a:r>
+          </a:p>
+        </p:txBody>
+      </p:sp>
+    </p:spTree>
+    <p:extLst>
+      <p:ext uri="{BB962C8B-B14F-4D97-AF65-F5344CB8AC3E}">
+        <p14:creationId xmlns:p14="http://schemas.microsoft.com/office/powerpoint/2010/main" val="3034939792"/>
+      </p:ext>
+    </p:extLst>
+  </p:cSld>
+  <p:clrMapOvr>
+    <a:masterClrMapping/>
+  </p:clrMapOvr>
+</p:sld>
+</file>
+
+<file path=ppt/slides/slide16.xml><?xml version="1.0" encoding="utf-8"?>
+<p:sld xmlns:a="http://schemas.openxmlformats.org/drawingml/2006/main" xmlns:r="http://schemas.openxmlformats.org/officeDocument/2006/relationships" xmlns:p="http://schemas.openxmlformats.org/presentationml/2006/main">
+  <p:cSld>
+    <p:spTree>
+      <p:nvGrpSpPr>
+        <p:cNvPr id="1" name=""/>
+        <p:cNvGrpSpPr/>
+        <p:nvPr/>
+      </p:nvGrpSpPr>
+      <p:grpSpPr>
+        <a:xfrm>
+          <a:off x="0" y="0"/>
+          <a:ext cx="0" cy="0"/>
+          <a:chOff x="0" y="0"/>
+          <a:chExt cx="0" cy="0"/>
+        </a:xfrm>
+      </p:grpSpPr>
+      <p:sp>
+        <p:nvSpPr>
+          <p:cNvPr id="3" name="Title 2">
+            <a:extLst>
+              <a:ext uri="{FF2B5EF4-FFF2-40B4-BE49-F238E27FC236}">
+                <a16:creationId xmlns:a16="http://schemas.microsoft.com/office/drawing/2014/main" id="{81957D48-6A39-4510-9652-BC2EDBD270BC}"/>
+              </a:ext>
+            </a:extLst>
+          </p:cNvPr>
+          <p:cNvSpPr>
+            <a:spLocks noGrp="1"/>
+          </p:cNvSpPr>
+          <p:nvPr>
+            <p:ph type="title"/>
+          </p:nvPr>
+        </p:nvSpPr>
+        <p:spPr/>
+        <p:txBody>
+          <a:bodyPr/>
+          <a:lstStyle/>
+          <a:p>
+            <a:r>
+              <a:rPr lang="en-US" dirty="0"/>
+              <a:t>Conclusion</a:t>
+            </a:r>
+          </a:p>
+        </p:txBody>
+      </p:sp>
+    </p:spTree>
+    <p:extLst>
+      <p:ext uri="{BB962C8B-B14F-4D97-AF65-F5344CB8AC3E}">
+        <p14:creationId xmlns:p14="http://schemas.microsoft.com/office/powerpoint/2010/main" val="2479365765"/>
+      </p:ext>
+    </p:extLst>
+  </p:cSld>
+  <p:clrMapOvr>
+    <a:masterClrMapping/>
+  </p:clrMapOvr>
+</p:sld>
+</file>
+
+<file path=ppt/slides/slide17.xml><?xml version="1.0" encoding="utf-8"?>
+<p:sld xmlns:a="http://schemas.openxmlformats.org/drawingml/2006/main" xmlns:r="http://schemas.openxmlformats.org/officeDocument/2006/relationships" xmlns:p="http://schemas.openxmlformats.org/presentationml/2006/main">
+  <p:cSld>
+    <p:spTree>
+      <p:nvGrpSpPr>
+        <p:cNvPr id="1" name=""/>
+        <p:cNvGrpSpPr/>
+        <p:nvPr/>
+      </p:nvGrpSpPr>
+      <p:grpSpPr>
+        <a:xfrm>
+          <a:off x="0" y="0"/>
+          <a:ext cx="0" cy="0"/>
+          <a:chOff x="0" y="0"/>
+          <a:chExt cx="0" cy="0"/>
+        </a:xfrm>
+      </p:grpSpPr>
+    </p:spTree>
+    <p:extLst>
+      <p:ext uri="{BB962C8B-B14F-4D97-AF65-F5344CB8AC3E}">
+        <p14:creationId xmlns:p14="http://schemas.microsoft.com/office/powerpoint/2010/main" val="4222474706"/>
       </p:ext>
     </p:extLst>
   </p:cSld>
@@ -6724,7 +9221,7 @@
         <p:spPr>
           <a:xfrm>
             <a:off x="3101419" y="1989056"/>
-            <a:ext cx="6231117" cy="2677656"/>
+            <a:ext cx="6231117" cy="3539430"/>
           </a:xfrm>
           <a:prstGeom prst="rect">
             <a:avLst/>
@@ -6770,6 +9267,23 @@
             <a:r>
               <a:rPr lang="en-US" sz="2800" dirty="0"/>
               <a:t>Insights</a:t>
+            </a:r>
+          </a:p>
+          <a:p>
+            <a:pPr marL="285750" indent="-285750">
+              <a:buFont typeface="Arial" panose="020B0604020202020204" pitchFamily="34" charset="0"/>
+              <a:buChar char="•"/>
+            </a:pPr>
+            <a:endParaRPr lang="en-US" sz="2800" dirty="0"/>
+          </a:p>
+          <a:p>
+            <a:pPr marL="285750" indent="-285750">
+              <a:buFont typeface="Arial" panose="020B0604020202020204" pitchFamily="34" charset="0"/>
+              <a:buChar char="•"/>
+            </a:pPr>
+            <a:r>
+              <a:rPr lang="en-US" sz="2800" dirty="0"/>
+              <a:t>Conclusion</a:t>
             </a:r>
           </a:p>
           <a:p>
@@ -6942,7 +9456,7 @@
           <a:p>
             <a:r>
               <a:rPr lang="en-US" dirty="0"/>
-              <a:t>“1996 Gallup Poll reported that 71 percent of the United States population believed that the U.S. government was covering up information regarding UFOs”</a:t>
+              <a:t>“1996 Gallup Poll reported that 71 percent of the United States population believed that the U.S. government was covering up information regarding UFOs” (Wikipedia)</a:t>
             </a:r>
           </a:p>
         </p:txBody>
@@ -7452,7 +9966,7 @@
         </p:blipFill>
         <p:spPr>
           <a:xfrm>
-            <a:off x="6970564" y="2332404"/>
+            <a:off x="6395528" y="1408576"/>
             <a:ext cx="3850331" cy="2708414"/>
           </a:xfrm>
           <a:prstGeom prst="rect">
@@ -7486,7 +10000,7 @@
         </p:nvSpPr>
         <p:spPr>
           <a:xfrm>
-            <a:off x="6898439" y="1884055"/>
+            <a:off x="6323403" y="960227"/>
             <a:ext cx="2752627" cy="369332"/>
           </a:xfrm>
           <a:prstGeom prst="rect">
@@ -7529,7 +10043,7 @@
         </p:blipFill>
         <p:spPr>
           <a:xfrm>
-            <a:off x="2100918" y="1520999"/>
+            <a:off x="2232891" y="1520999"/>
             <a:ext cx="3649641" cy="2299940"/>
           </a:xfrm>
           <a:prstGeom prst="rect">
@@ -7563,7 +10077,7 @@
         </p:nvSpPr>
         <p:spPr>
           <a:xfrm>
-            <a:off x="2081884" y="1147798"/>
+            <a:off x="2213857" y="1147798"/>
             <a:ext cx="821976" cy="373201"/>
           </a:xfrm>
           <a:prstGeom prst="rect">
@@ -7605,7 +10119,7 @@
         </p:blipFill>
         <p:spPr>
           <a:xfrm>
-            <a:off x="2100919" y="4362052"/>
+            <a:off x="3250991" y="4362052"/>
             <a:ext cx="4218601" cy="2334291"/>
           </a:xfrm>
           <a:prstGeom prst="rect">
@@ -7639,7 +10153,7 @@
         </p:nvSpPr>
         <p:spPr>
           <a:xfrm>
-            <a:off x="2100919" y="3940585"/>
+            <a:off x="3250991" y="3940585"/>
             <a:ext cx="821976" cy="373201"/>
           </a:xfrm>
           <a:prstGeom prst="rect">
@@ -7674,7 +10188,7 @@
         </p:nvSpPr>
         <p:spPr>
           <a:xfrm>
-            <a:off x="2081884" y="210813"/>
+            <a:off x="1469142" y="210813"/>
             <a:ext cx="4584361" cy="584775"/>
           </a:xfrm>
           <a:prstGeom prst="rect">
@@ -7727,6 +10241,45 @@
       </p:grpSpPr>
       <p:pic>
         <p:nvPicPr>
+          <p:cNvPr id="18" name="Graphic 17" descr="Rocket">
+            <a:extLst>
+              <a:ext uri="{FF2B5EF4-FFF2-40B4-BE49-F238E27FC236}">
+                <a16:creationId xmlns:a16="http://schemas.microsoft.com/office/drawing/2014/main" id="{F7B322E4-7E9C-42C5-B7FC-C024C57AEF8F}"/>
+              </a:ext>
+            </a:extLst>
+          </p:cNvPr>
+          <p:cNvPicPr>
+            <a:picLocks noChangeAspect="1"/>
+          </p:cNvPicPr>
+          <p:nvPr/>
+        </p:nvPicPr>
+        <p:blipFill>
+          <a:blip r:embed="rId2">
+            <a:extLst>
+              <a:ext uri="{28A0092B-C50C-407E-A947-70E740481C1C}">
+                <a14:useLocalDpi xmlns:a14="http://schemas.microsoft.com/office/drawing/2010/main" val="0"/>
+              </a:ext>
+              <a:ext uri="{96DAC541-7B7A-43D3-8B79-37D633B846F1}">
+                <asvg:svgBlip xmlns:asvg="http://schemas.microsoft.com/office/drawing/2016/SVG/main" xmlns="" r:embed="rId3"/>
+              </a:ext>
+            </a:extLst>
+          </a:blip>
+          <a:stretch>
+            <a:fillRect/>
+          </a:stretch>
+        </p:blipFill>
+        <p:spPr>
+          <a:xfrm>
+            <a:off x="9987775" y="4897243"/>
+            <a:ext cx="1832518" cy="1832518"/>
+          </a:xfrm>
+          <a:prstGeom prst="rect">
+            <a:avLst/>
+          </a:prstGeom>
+        </p:spPr>
+      </p:pic>
+      <p:pic>
+        <p:nvPicPr>
           <p:cNvPr id="2" name="Picture 1">
             <a:extLst>
               <a:ext uri="{FF2B5EF4-FFF2-40B4-BE49-F238E27FC236}">
@@ -7740,7 +10293,7 @@
           <p:nvPr/>
         </p:nvPicPr>
         <p:blipFill rotWithShape="1">
-          <a:blip r:embed="rId2"/>
+          <a:blip r:embed="rId4"/>
           <a:srcRect l="3356" r="4979"/>
           <a:stretch/>
         </p:blipFill>
@@ -7816,14 +10369,14 @@
           <p:nvPr/>
         </p:nvPicPr>
         <p:blipFill>
-          <a:blip r:embed="rId3"/>
+          <a:blip r:embed="rId5"/>
           <a:stretch>
             <a:fillRect/>
           </a:stretch>
         </p:blipFill>
         <p:spPr>
           <a:xfrm>
-            <a:off x="5021708" y="4137695"/>
+            <a:off x="5115978" y="4137695"/>
             <a:ext cx="3143443" cy="2526556"/>
           </a:xfrm>
           <a:prstGeom prst="rect">
@@ -7857,7 +10410,7 @@
         </p:nvSpPr>
         <p:spPr>
           <a:xfrm>
-            <a:off x="5021709" y="3651951"/>
+            <a:off x="5115979" y="3651951"/>
             <a:ext cx="3362479" cy="338554"/>
           </a:xfrm>
           <a:prstGeom prst="rect">
@@ -7893,7 +10446,7 @@
           <p:nvPr/>
         </p:nvPicPr>
         <p:blipFill>
-          <a:blip r:embed="rId4"/>
+          <a:blip r:embed="rId6"/>
           <a:stretch>
             <a:fillRect/>
           </a:stretch>
@@ -8049,14 +10602,14 @@
           <p:nvPr/>
         </p:nvPicPr>
         <p:blipFill>
-          <a:blip r:embed="rId5"/>
+          <a:blip r:embed="rId7"/>
           <a:stretch>
             <a:fillRect/>
           </a:stretch>
         </p:blipFill>
         <p:spPr>
           <a:xfrm>
-            <a:off x="4964353" y="1210649"/>
+            <a:off x="5058623" y="1210649"/>
             <a:ext cx="3412656" cy="2263841"/>
           </a:xfrm>
           <a:prstGeom prst="rect">
@@ -8090,7 +10643,7 @@
         </p:nvSpPr>
         <p:spPr>
           <a:xfrm>
-            <a:off x="4888611" y="863911"/>
+            <a:off x="4982881" y="863911"/>
             <a:ext cx="1903728" cy="338554"/>
           </a:xfrm>
           <a:prstGeom prst="rect">
@@ -8126,7 +10679,7 @@
           <p:nvPr/>
         </p:nvPicPr>
         <p:blipFill>
-          <a:blip r:embed="rId6"/>
+          <a:blip r:embed="rId8"/>
           <a:stretch>
             <a:fillRect/>
           </a:stretch>
@@ -8168,7 +10721,7 @@
           <p:nvPr/>
         </p:nvPicPr>
         <p:blipFill>
-          <a:blip r:embed="rId7"/>
+          <a:blip r:embed="rId9"/>
           <a:stretch>
             <a:fillRect/>
           </a:stretch>
@@ -8262,6 +10815,45 @@
       </p:grpSpPr>
       <p:pic>
         <p:nvPicPr>
+          <p:cNvPr id="6" name="Graphic 5" descr="Rocket">
+            <a:extLst>
+              <a:ext uri="{FF2B5EF4-FFF2-40B4-BE49-F238E27FC236}">
+                <a16:creationId xmlns:a16="http://schemas.microsoft.com/office/drawing/2014/main" id="{A5B04463-13BD-4A78-BE3D-A05A69074A05}"/>
+              </a:ext>
+            </a:extLst>
+          </p:cNvPr>
+          <p:cNvPicPr>
+            <a:picLocks noChangeAspect="1"/>
+          </p:cNvPicPr>
+          <p:nvPr/>
+        </p:nvPicPr>
+        <p:blipFill>
+          <a:blip r:embed="rId2">
+            <a:extLst>
+              <a:ext uri="{28A0092B-C50C-407E-A947-70E740481C1C}">
+                <a14:useLocalDpi xmlns:a14="http://schemas.microsoft.com/office/drawing/2010/main" val="0"/>
+              </a:ext>
+              <a:ext uri="{96DAC541-7B7A-43D3-8B79-37D633B846F1}">
+                <asvg:svgBlip xmlns:asvg="http://schemas.microsoft.com/office/drawing/2016/SVG/main" xmlns="" r:embed="rId3"/>
+              </a:ext>
+            </a:extLst>
+          </a:blip>
+          <a:stretch>
+            <a:fillRect/>
+          </a:stretch>
+        </p:blipFill>
+        <p:spPr>
+          <a:xfrm>
+            <a:off x="9987775" y="4925523"/>
+            <a:ext cx="1832518" cy="1832518"/>
+          </a:xfrm>
+          <a:prstGeom prst="rect">
+            <a:avLst/>
+          </a:prstGeom>
+        </p:spPr>
+      </p:pic>
+      <p:pic>
+        <p:nvPicPr>
           <p:cNvPr id="2" name="Picture 1">
             <a:extLst>
               <a:ext uri="{FF2B5EF4-FFF2-40B4-BE49-F238E27FC236}">
@@ -8275,7 +10867,7 @@
           <p:nvPr/>
         </p:nvPicPr>
         <p:blipFill>
-          <a:blip r:embed="rId2"/>
+          <a:blip r:embed="rId4"/>
           <a:stretch>
             <a:fillRect/>
           </a:stretch>
@@ -8352,14 +10944,14 @@
           <p:nvPr/>
         </p:nvPicPr>
         <p:blipFill>
-          <a:blip r:embed="rId3"/>
+          <a:blip r:embed="rId5"/>
           <a:stretch>
             <a:fillRect/>
           </a:stretch>
         </p:blipFill>
         <p:spPr>
           <a:xfrm>
-            <a:off x="6096000" y="1708617"/>
+            <a:off x="5877957" y="554187"/>
             <a:ext cx="4918876" cy="4384480"/>
           </a:xfrm>
           <a:prstGeom prst="rect">
@@ -8367,6 +10959,41 @@
           </a:prstGeom>
         </p:spPr>
       </p:pic>
+      <p:sp>
+        <p:nvSpPr>
+          <p:cNvPr id="5" name="TextBox 4">
+            <a:extLst>
+              <a:ext uri="{FF2B5EF4-FFF2-40B4-BE49-F238E27FC236}">
+                <a16:creationId xmlns:a16="http://schemas.microsoft.com/office/drawing/2014/main" id="{A5907F3C-C6C1-4774-9FF5-477F00F25631}"/>
+              </a:ext>
+            </a:extLst>
+          </p:cNvPr>
+          <p:cNvSpPr txBox="1"/>
+          <p:nvPr/>
+        </p:nvSpPr>
+        <p:spPr>
+          <a:xfrm>
+            <a:off x="1395167" y="490194"/>
+            <a:ext cx="3016578" cy="584775"/>
+          </a:xfrm>
+          <a:prstGeom prst="rect">
+            <a:avLst/>
+          </a:prstGeom>
+          <a:noFill/>
+        </p:spPr>
+        <p:txBody>
+          <a:bodyPr wrap="square" rtlCol="0">
+            <a:spAutoFit/>
+          </a:bodyPr>
+          <a:lstStyle/>
+          <a:p>
+            <a:r>
+              <a:rPr lang="en-US" sz="3200" dirty="0"/>
+              <a:t>What Will I See?</a:t>
+            </a:r>
+          </a:p>
+        </p:txBody>
+      </p:sp>
     </p:spTree>
     <p:extLst>
       <p:ext uri="{BB962C8B-B14F-4D97-AF65-F5344CB8AC3E}">

</xml_diff>

<commit_message>
presentation updated with clustering
</commit_message>
<xml_diff>
--- a/ufo_presentation_v1.pptx
+++ b/ufo_presentation_v1.pptx
@@ -5,7 +5,7 @@
     <p:sldMasterId id="2147483660" r:id="rId1"/>
   </p:sldMasterIdLst>
   <p:notesMasterIdLst>
-    <p:notesMasterId r:id="rId13"/>
+    <p:notesMasterId r:id="rId15"/>
   </p:notesMasterIdLst>
   <p:sldIdLst>
     <p:sldId id="256" r:id="rId2"/>
@@ -19,6 +19,8 @@
     <p:sldId id="262" r:id="rId10"/>
     <p:sldId id="265" r:id="rId11"/>
     <p:sldId id="266" r:id="rId12"/>
+    <p:sldId id="267" r:id="rId13"/>
+    <p:sldId id="268" r:id="rId14"/>
   </p:sldIdLst>
   <p:sldSz cx="12192000" cy="6858000"/>
   <p:notesSz cx="6858000" cy="9144000"/>
@@ -4836,6 +4838,389 @@
     <p:extLst>
       <p:ext uri="{BB962C8B-B14F-4D97-AF65-F5344CB8AC3E}">
         <p14:creationId xmlns:p14="http://schemas.microsoft.com/office/powerpoint/2010/main" val="1746054511"/>
+      </p:ext>
+    </p:extLst>
+  </p:cSld>
+  <p:clrMapOvr>
+    <a:masterClrMapping/>
+  </p:clrMapOvr>
+</p:sld>
+</file>
+
+<file path=ppt/slides/slide12.xml><?xml version="1.0" encoding="utf-8"?>
+<p:sld xmlns:a="http://schemas.openxmlformats.org/drawingml/2006/main" xmlns:r="http://schemas.openxmlformats.org/officeDocument/2006/relationships" xmlns:p="http://schemas.openxmlformats.org/presentationml/2006/main">
+  <p:cSld>
+    <p:spTree>
+      <p:nvGrpSpPr>
+        <p:cNvPr id="1" name=""/>
+        <p:cNvGrpSpPr/>
+        <p:nvPr/>
+      </p:nvGrpSpPr>
+      <p:grpSpPr>
+        <a:xfrm>
+          <a:off x="0" y="0"/>
+          <a:ext cx="0" cy="0"/>
+          <a:chOff x="0" y="0"/>
+          <a:chExt cx="0" cy="0"/>
+        </a:xfrm>
+      </p:grpSpPr>
+      <p:sp>
+        <p:nvSpPr>
+          <p:cNvPr id="2" name="Title 1">
+            <a:extLst>
+              <a:ext uri="{FF2B5EF4-FFF2-40B4-BE49-F238E27FC236}">
+                <a16:creationId xmlns:a16="http://schemas.microsoft.com/office/drawing/2014/main" id="{1F379781-1003-4249-BD5C-561A1E07E1CF}"/>
+              </a:ext>
+            </a:extLst>
+          </p:cNvPr>
+          <p:cNvSpPr>
+            <a:spLocks noGrp="1"/>
+          </p:cNvSpPr>
+          <p:nvPr>
+            <p:ph type="title"/>
+          </p:nvPr>
+        </p:nvSpPr>
+        <p:spPr>
+          <a:xfrm>
+            <a:off x="1371600" y="685799"/>
+            <a:ext cx="9601200" cy="6031523"/>
+          </a:xfrm>
+        </p:spPr>
+        <p:txBody>
+          <a:bodyPr>
+            <a:normAutofit/>
+          </a:bodyPr>
+          <a:lstStyle/>
+          <a:p>
+            <a:r>
+              <a:rPr lang="en-US" dirty="0"/>
+              <a:t>Clustering</a:t>
+            </a:r>
+            <a:br>
+              <a:rPr lang="en-US" dirty="0"/>
+            </a:br>
+            <a:r>
+              <a:rPr lang="en-US" sz="1800" dirty="0"/>
+              <a:t> 	</a:t>
+            </a:r>
+            <a:r>
+              <a:rPr lang="en-US" sz="2400" dirty="0"/>
+              <a:t>K-means Clustering</a:t>
+            </a:r>
+            <a:br>
+              <a:rPr lang="en-US" sz="2400" dirty="0"/>
+            </a:br>
+            <a:r>
+              <a:rPr lang="en-US" sz="1800" dirty="0"/>
+              <a:t>	</a:t>
+            </a:r>
+            <a:br>
+              <a:rPr lang="en-US" dirty="0"/>
+            </a:br>
+            <a:endParaRPr lang="en-US" dirty="0"/>
+          </a:p>
+        </p:txBody>
+      </p:sp>
+      <p:pic>
+        <p:nvPicPr>
+          <p:cNvPr id="4" name="Picture 3">
+            <a:extLst>
+              <a:ext uri="{FF2B5EF4-FFF2-40B4-BE49-F238E27FC236}">
+                <a16:creationId xmlns:a16="http://schemas.microsoft.com/office/drawing/2014/main" id="{BEA01E0A-7AAF-4A5A-BC99-A99D229DB34D}"/>
+              </a:ext>
+            </a:extLst>
+          </p:cNvPr>
+          <p:cNvPicPr>
+            <a:picLocks noChangeAspect="1"/>
+          </p:cNvPicPr>
+          <p:nvPr/>
+        </p:nvPicPr>
+        <p:blipFill>
+          <a:blip r:embed="rId2"/>
+          <a:stretch>
+            <a:fillRect/>
+          </a:stretch>
+        </p:blipFill>
+        <p:spPr>
+          <a:xfrm>
+            <a:off x="1219200" y="2315672"/>
+            <a:ext cx="4174360" cy="2771775"/>
+          </a:xfrm>
+          <a:prstGeom prst="rect">
+            <a:avLst/>
+          </a:prstGeom>
+        </p:spPr>
+      </p:pic>
+      <p:pic>
+        <p:nvPicPr>
+          <p:cNvPr id="5" name="Picture 4">
+            <a:extLst>
+              <a:ext uri="{FF2B5EF4-FFF2-40B4-BE49-F238E27FC236}">
+                <a16:creationId xmlns:a16="http://schemas.microsoft.com/office/drawing/2014/main" id="{7EABC4DF-7D30-4AD6-96C4-5ED4098AEB55}"/>
+              </a:ext>
+            </a:extLst>
+          </p:cNvPr>
+          <p:cNvPicPr>
+            <a:picLocks noChangeAspect="1"/>
+          </p:cNvPicPr>
+          <p:nvPr/>
+        </p:nvPicPr>
+        <p:blipFill>
+          <a:blip r:embed="rId3"/>
+          <a:stretch>
+            <a:fillRect/>
+          </a:stretch>
+        </p:blipFill>
+        <p:spPr>
+          <a:xfrm>
+            <a:off x="6172200" y="2163272"/>
+            <a:ext cx="4514850" cy="2924175"/>
+          </a:xfrm>
+          <a:prstGeom prst="rect">
+            <a:avLst/>
+          </a:prstGeom>
+        </p:spPr>
+      </p:pic>
+    </p:spTree>
+    <p:extLst>
+      <p:ext uri="{BB962C8B-B14F-4D97-AF65-F5344CB8AC3E}">
+        <p14:creationId xmlns:p14="http://schemas.microsoft.com/office/powerpoint/2010/main" val="1279758777"/>
+      </p:ext>
+    </p:extLst>
+  </p:cSld>
+  <p:clrMapOvr>
+    <a:masterClrMapping/>
+  </p:clrMapOvr>
+  <p:timing>
+    <p:tnLst>
+      <p:par>
+        <p:cTn id="1" dur="indefinite" restart="never" nodeType="tmRoot">
+          <p:childTnLst>
+            <p:seq concurrent="1" nextAc="seek">
+              <p:cTn id="2" dur="indefinite" nodeType="mainSeq">
+                <p:childTnLst>
+                  <p:par>
+                    <p:cTn id="3" fill="hold">
+                      <p:stCondLst>
+                        <p:cond delay="indefinite"/>
+                      </p:stCondLst>
+                      <p:childTnLst>
+                        <p:par>
+                          <p:cTn id="4" fill="hold">
+                            <p:stCondLst>
+                              <p:cond delay="0"/>
+                            </p:stCondLst>
+                            <p:childTnLst>
+                              <p:par>
+                                <p:cTn id="5" presetID="2" presetClass="entr" presetSubtype="4" fill="hold" nodeType="clickEffect">
+                                  <p:stCondLst>
+                                    <p:cond delay="0"/>
+                                  </p:stCondLst>
+                                  <p:childTnLst>
+                                    <p:set>
+                                      <p:cBhvr>
+                                        <p:cTn id="6" dur="1" fill="hold">
+                                          <p:stCondLst>
+                                            <p:cond delay="0"/>
+                                          </p:stCondLst>
+                                        </p:cTn>
+                                        <p:tgtEl>
+                                          <p:spTgt spid="4"/>
+                                        </p:tgtEl>
+                                        <p:attrNameLst>
+                                          <p:attrName>style.visibility</p:attrName>
+                                        </p:attrNameLst>
+                                      </p:cBhvr>
+                                      <p:to>
+                                        <p:strVal val="visible"/>
+                                      </p:to>
+                                    </p:set>
+                                    <p:anim calcmode="lin" valueType="num">
+                                      <p:cBhvr additive="base">
+                                        <p:cTn id="7" dur="500" fill="hold"/>
+                                        <p:tgtEl>
+                                          <p:spTgt spid="4"/>
+                                        </p:tgtEl>
+                                        <p:attrNameLst>
+                                          <p:attrName>ppt_x</p:attrName>
+                                        </p:attrNameLst>
+                                      </p:cBhvr>
+                                      <p:tavLst>
+                                        <p:tav tm="0">
+                                          <p:val>
+                                            <p:strVal val="#ppt_x"/>
+                                          </p:val>
+                                        </p:tav>
+                                        <p:tav tm="100000">
+                                          <p:val>
+                                            <p:strVal val="#ppt_x"/>
+                                          </p:val>
+                                        </p:tav>
+                                      </p:tavLst>
+                                    </p:anim>
+                                    <p:anim calcmode="lin" valueType="num">
+                                      <p:cBhvr additive="base">
+                                        <p:cTn id="8" dur="500" fill="hold"/>
+                                        <p:tgtEl>
+                                          <p:spTgt spid="4"/>
+                                        </p:tgtEl>
+                                        <p:attrNameLst>
+                                          <p:attrName>ppt_y</p:attrName>
+                                        </p:attrNameLst>
+                                      </p:cBhvr>
+                                      <p:tavLst>
+                                        <p:tav tm="0">
+                                          <p:val>
+                                            <p:strVal val="1+#ppt_h/2"/>
+                                          </p:val>
+                                        </p:tav>
+                                        <p:tav tm="100000">
+                                          <p:val>
+                                            <p:strVal val="#ppt_y"/>
+                                          </p:val>
+                                        </p:tav>
+                                      </p:tavLst>
+                                    </p:anim>
+                                  </p:childTnLst>
+                                </p:cTn>
+                              </p:par>
+                            </p:childTnLst>
+                          </p:cTn>
+                        </p:par>
+                      </p:childTnLst>
+                    </p:cTn>
+                  </p:par>
+                </p:childTnLst>
+              </p:cTn>
+              <p:prevCondLst>
+                <p:cond evt="onPrev" delay="0">
+                  <p:tgtEl>
+                    <p:sldTgt/>
+                  </p:tgtEl>
+                </p:cond>
+              </p:prevCondLst>
+              <p:nextCondLst>
+                <p:cond evt="onNext" delay="0">
+                  <p:tgtEl>
+                    <p:sldTgt/>
+                  </p:tgtEl>
+                </p:cond>
+              </p:nextCondLst>
+            </p:seq>
+          </p:childTnLst>
+        </p:cTn>
+      </p:par>
+    </p:tnLst>
+  </p:timing>
+</p:sld>
+</file>
+
+<file path=ppt/slides/slide13.xml><?xml version="1.0" encoding="utf-8"?>
+<p:sld xmlns:a="http://schemas.openxmlformats.org/drawingml/2006/main" xmlns:r="http://schemas.openxmlformats.org/officeDocument/2006/relationships" xmlns:p="http://schemas.openxmlformats.org/presentationml/2006/main">
+  <p:cSld>
+    <p:spTree>
+      <p:nvGrpSpPr>
+        <p:cNvPr id="1" name=""/>
+        <p:cNvGrpSpPr/>
+        <p:nvPr/>
+      </p:nvGrpSpPr>
+      <p:grpSpPr>
+        <a:xfrm>
+          <a:off x="0" y="0"/>
+          <a:ext cx="0" cy="0"/>
+          <a:chOff x="0" y="0"/>
+          <a:chExt cx="0" cy="0"/>
+        </a:xfrm>
+      </p:grpSpPr>
+      <p:pic>
+        <p:nvPicPr>
+          <p:cNvPr id="3" name="Picture 2">
+            <a:extLst>
+              <a:ext uri="{FF2B5EF4-FFF2-40B4-BE49-F238E27FC236}">
+                <a16:creationId xmlns:a16="http://schemas.microsoft.com/office/drawing/2014/main" id="{D63192EA-6BB5-4A59-B460-00020094C7A9}"/>
+              </a:ext>
+            </a:extLst>
+          </p:cNvPr>
+          <p:cNvPicPr>
+            <a:picLocks noChangeAspect="1"/>
+          </p:cNvPicPr>
+          <p:nvPr/>
+        </p:nvPicPr>
+        <p:blipFill>
+          <a:blip r:embed="rId2"/>
+          <a:stretch>
+            <a:fillRect/>
+          </a:stretch>
+        </p:blipFill>
+        <p:spPr>
+          <a:xfrm>
+            <a:off x="1219200" y="1204913"/>
+            <a:ext cx="5097748" cy="4033838"/>
+          </a:xfrm>
+          <a:prstGeom prst="rect">
+            <a:avLst/>
+          </a:prstGeom>
+        </p:spPr>
+      </p:pic>
+      <p:sp>
+        <p:nvSpPr>
+          <p:cNvPr id="2" name="Title 1">
+            <a:extLst>
+              <a:ext uri="{FF2B5EF4-FFF2-40B4-BE49-F238E27FC236}">
+                <a16:creationId xmlns:a16="http://schemas.microsoft.com/office/drawing/2014/main" id="{95251384-CA12-4E4D-AEEB-6407E3415E0D}"/>
+              </a:ext>
+            </a:extLst>
+          </p:cNvPr>
+          <p:cNvSpPr>
+            <a:spLocks noGrp="1"/>
+          </p:cNvSpPr>
+          <p:nvPr>
+            <p:ph type="title"/>
+          </p:nvPr>
+        </p:nvSpPr>
+        <p:spPr/>
+        <p:txBody>
+          <a:bodyPr/>
+          <a:lstStyle/>
+          <a:p>
+            <a:endParaRPr lang="en-US" dirty="0"/>
+          </a:p>
+        </p:txBody>
+      </p:sp>
+      <p:pic>
+        <p:nvPicPr>
+          <p:cNvPr id="4" name="Picture 3">
+            <a:extLst>
+              <a:ext uri="{FF2B5EF4-FFF2-40B4-BE49-F238E27FC236}">
+                <a16:creationId xmlns:a16="http://schemas.microsoft.com/office/drawing/2014/main" id="{62BA5CF0-1FA4-4F06-8582-D037388883ED}"/>
+              </a:ext>
+            </a:extLst>
+          </p:cNvPr>
+          <p:cNvPicPr>
+            <a:picLocks noChangeAspect="1"/>
+          </p:cNvPicPr>
+          <p:nvPr/>
+        </p:nvPicPr>
+        <p:blipFill>
+          <a:blip r:embed="rId3"/>
+          <a:stretch>
+            <a:fillRect/>
+          </a:stretch>
+        </p:blipFill>
+        <p:spPr>
+          <a:xfrm>
+            <a:off x="6572820" y="1204913"/>
+            <a:ext cx="5342162" cy="4033838"/>
+          </a:xfrm>
+          <a:prstGeom prst="rect">
+            <a:avLst/>
+          </a:prstGeom>
+        </p:spPr>
+      </p:pic>
+    </p:spTree>
+    <p:extLst>
+      <p:ext uri="{BB962C8B-B14F-4D97-AF65-F5344CB8AC3E}">
+        <p14:creationId xmlns:p14="http://schemas.microsoft.com/office/powerpoint/2010/main" val="4138993370"/>
       </p:ext>
     </p:extLst>
   </p:cSld>

</xml_diff>